<commit_message>
Added some visual effects on ppt
</commit_message>
<xml_diff>
--- a/Licenta2018CorfuAlexandru/ExploreBooks.pptx
+++ b/Licenta2018CorfuAlexandru/ExploreBooks.pptx
@@ -4,16 +4,22 @@
   <p:sldMasterIdLst>
     <p:sldMasterId id="2147484084" r:id="rId1"/>
   </p:sldMasterIdLst>
+  <p:notesMasterIdLst>
+    <p:notesMasterId r:id="rId14"/>
+  </p:notesMasterIdLst>
   <p:sldIdLst>
     <p:sldId id="256" r:id="rId2"/>
     <p:sldId id="257" r:id="rId3"/>
     <p:sldId id="258" r:id="rId4"/>
-    <p:sldId id="259" r:id="rId5"/>
-    <p:sldId id="260" r:id="rId6"/>
-    <p:sldId id="261" r:id="rId7"/>
-    <p:sldId id="262" r:id="rId8"/>
-    <p:sldId id="263" r:id="rId9"/>
-    <p:sldId id="264" r:id="rId10"/>
+    <p:sldId id="268" r:id="rId5"/>
+    <p:sldId id="269" r:id="rId6"/>
+    <p:sldId id="270" r:id="rId7"/>
+    <p:sldId id="259" r:id="rId8"/>
+    <p:sldId id="271" r:id="rId9"/>
+    <p:sldId id="260" r:id="rId10"/>
+    <p:sldId id="262" r:id="rId11"/>
+    <p:sldId id="263" r:id="rId12"/>
+    <p:sldId id="264" r:id="rId13"/>
   </p:sldIdLst>
   <p:sldSz cx="12192000" cy="6858000"/>
   <p:notesSz cx="6858000" cy="9144000"/>
@@ -112,7 +118,1299 @@
       </a:defRPr>
     </a:lvl9pPr>
   </p:defaultTextStyle>
+  <p:extLst>
+    <p:ext uri="{EFAFB233-063F-42B5-8137-9DF3F51BA10A}">
+      <p15:sldGuideLst xmlns:p15="http://schemas.microsoft.com/office/powerpoint/2012/main"/>
+    </p:ext>
+  </p:extLst>
 </p:presentation>
+</file>
+
+<file path=ppt/notesMasters/notesMaster1.xml><?xml version="1.0" encoding="utf-8"?>
+<p:notesMaster xmlns:a="http://schemas.openxmlformats.org/drawingml/2006/main" xmlns:r="http://schemas.openxmlformats.org/officeDocument/2006/relationships" xmlns:p="http://schemas.openxmlformats.org/presentationml/2006/main">
+  <p:cSld>
+    <p:bg>
+      <p:bgRef idx="1001">
+        <a:schemeClr val="bg1"/>
+      </p:bgRef>
+    </p:bg>
+    <p:spTree>
+      <p:nvGrpSpPr>
+        <p:cNvPr id="1" name=""/>
+        <p:cNvGrpSpPr/>
+        <p:nvPr/>
+      </p:nvGrpSpPr>
+      <p:grpSpPr>
+        <a:xfrm>
+          <a:off x="0" y="0"/>
+          <a:ext cx="0" cy="0"/>
+          <a:chOff x="0" y="0"/>
+          <a:chExt cx="0" cy="0"/>
+        </a:xfrm>
+      </p:grpSpPr>
+      <p:sp>
+        <p:nvSpPr>
+          <p:cNvPr id="2" name="Header Placeholder 1"/>
+          <p:cNvSpPr>
+            <a:spLocks noGrp="1"/>
+          </p:cNvSpPr>
+          <p:nvPr>
+            <p:ph type="hdr" sz="quarter"/>
+          </p:nvPr>
+        </p:nvSpPr>
+        <p:spPr>
+          <a:xfrm>
+            <a:off x="0" y="0"/>
+            <a:ext cx="2971800" cy="458788"/>
+          </a:xfrm>
+          <a:prstGeom prst="rect">
+            <a:avLst/>
+          </a:prstGeom>
+        </p:spPr>
+        <p:txBody>
+          <a:bodyPr vert="horz" lIns="91440" tIns="45720" rIns="91440" bIns="45720" rtlCol="0"/>
+          <a:lstStyle>
+            <a:lvl1pPr algn="l">
+              <a:defRPr sz="1200"/>
+            </a:lvl1pPr>
+          </a:lstStyle>
+          <a:p>
+            <a:endParaRPr lang="en-US"/>
+          </a:p>
+        </p:txBody>
+      </p:sp>
+      <p:sp>
+        <p:nvSpPr>
+          <p:cNvPr id="3" name="Date Placeholder 2"/>
+          <p:cNvSpPr>
+            <a:spLocks noGrp="1"/>
+          </p:cNvSpPr>
+          <p:nvPr>
+            <p:ph type="dt" idx="1"/>
+          </p:nvPr>
+        </p:nvSpPr>
+        <p:spPr>
+          <a:xfrm>
+            <a:off x="3884613" y="0"/>
+            <a:ext cx="2971800" cy="458788"/>
+          </a:xfrm>
+          <a:prstGeom prst="rect">
+            <a:avLst/>
+          </a:prstGeom>
+        </p:spPr>
+        <p:txBody>
+          <a:bodyPr vert="horz" lIns="91440" tIns="45720" rIns="91440" bIns="45720" rtlCol="0"/>
+          <a:lstStyle>
+            <a:lvl1pPr algn="r">
+              <a:defRPr sz="1200"/>
+            </a:lvl1pPr>
+          </a:lstStyle>
+          <a:p>
+            <a:fld id="{06E26005-0395-4D0E-9653-7BA27BF40DDA}" type="datetimeFigureOut">
+              <a:rPr lang="en-US" smtClean="0"/>
+              <a:t>6/28/2018</a:t>
+            </a:fld>
+            <a:endParaRPr lang="en-US"/>
+          </a:p>
+        </p:txBody>
+      </p:sp>
+      <p:sp>
+        <p:nvSpPr>
+          <p:cNvPr id="4" name="Slide Image Placeholder 3"/>
+          <p:cNvSpPr>
+            <a:spLocks noGrp="1" noRot="1" noChangeAspect="1"/>
+          </p:cNvSpPr>
+          <p:nvPr>
+            <p:ph type="sldImg" idx="2"/>
+          </p:nvPr>
+        </p:nvSpPr>
+        <p:spPr>
+          <a:xfrm>
+            <a:off x="685800" y="1143000"/>
+            <a:ext cx="5486400" cy="3086100"/>
+          </a:xfrm>
+          <a:prstGeom prst="rect">
+            <a:avLst/>
+          </a:prstGeom>
+          <a:noFill/>
+          <a:ln w="12700">
+            <a:solidFill>
+              <a:prstClr val="black"/>
+            </a:solidFill>
+          </a:ln>
+        </p:spPr>
+        <p:txBody>
+          <a:bodyPr vert="horz" lIns="91440" tIns="45720" rIns="91440" bIns="45720" rtlCol="0" anchor="ctr"/>
+          <a:lstStyle/>
+          <a:p>
+            <a:endParaRPr lang="en-US"/>
+          </a:p>
+        </p:txBody>
+      </p:sp>
+      <p:sp>
+        <p:nvSpPr>
+          <p:cNvPr id="5" name="Notes Placeholder 4"/>
+          <p:cNvSpPr>
+            <a:spLocks noGrp="1"/>
+          </p:cNvSpPr>
+          <p:nvPr>
+            <p:ph type="body" sz="quarter" idx="3"/>
+          </p:nvPr>
+        </p:nvSpPr>
+        <p:spPr>
+          <a:xfrm>
+            <a:off x="685800" y="4400550"/>
+            <a:ext cx="5486400" cy="3600450"/>
+          </a:xfrm>
+          <a:prstGeom prst="rect">
+            <a:avLst/>
+          </a:prstGeom>
+        </p:spPr>
+        <p:txBody>
+          <a:bodyPr vert="horz" lIns="91440" tIns="45720" rIns="91440" bIns="45720" rtlCol="0"/>
+          <a:lstStyle/>
+          <a:p>
+            <a:pPr lvl="0"/>
+            <a:r>
+              <a:rPr lang="en-US"/>
+              <a:t>Edit Master text styles</a:t>
+            </a:r>
+          </a:p>
+          <a:p>
+            <a:pPr lvl="1"/>
+            <a:r>
+              <a:rPr lang="en-US"/>
+              <a:t>Second level</a:t>
+            </a:r>
+          </a:p>
+          <a:p>
+            <a:pPr lvl="2"/>
+            <a:r>
+              <a:rPr lang="en-US"/>
+              <a:t>Third level</a:t>
+            </a:r>
+          </a:p>
+          <a:p>
+            <a:pPr lvl="3"/>
+            <a:r>
+              <a:rPr lang="en-US"/>
+              <a:t>Fourth level</a:t>
+            </a:r>
+          </a:p>
+          <a:p>
+            <a:pPr lvl="4"/>
+            <a:r>
+              <a:rPr lang="en-US"/>
+              <a:t>Fifth level</a:t>
+            </a:r>
+          </a:p>
+        </p:txBody>
+      </p:sp>
+      <p:sp>
+        <p:nvSpPr>
+          <p:cNvPr id="6" name="Footer Placeholder 5"/>
+          <p:cNvSpPr>
+            <a:spLocks noGrp="1"/>
+          </p:cNvSpPr>
+          <p:nvPr>
+            <p:ph type="ftr" sz="quarter" idx="4"/>
+          </p:nvPr>
+        </p:nvSpPr>
+        <p:spPr>
+          <a:xfrm>
+            <a:off x="0" y="8685213"/>
+            <a:ext cx="2971800" cy="458787"/>
+          </a:xfrm>
+          <a:prstGeom prst="rect">
+            <a:avLst/>
+          </a:prstGeom>
+        </p:spPr>
+        <p:txBody>
+          <a:bodyPr vert="horz" lIns="91440" tIns="45720" rIns="91440" bIns="45720" rtlCol="0" anchor="b"/>
+          <a:lstStyle>
+            <a:lvl1pPr algn="l">
+              <a:defRPr sz="1200"/>
+            </a:lvl1pPr>
+          </a:lstStyle>
+          <a:p>
+            <a:endParaRPr lang="en-US"/>
+          </a:p>
+        </p:txBody>
+      </p:sp>
+      <p:sp>
+        <p:nvSpPr>
+          <p:cNvPr id="7" name="Slide Number Placeholder 6"/>
+          <p:cNvSpPr>
+            <a:spLocks noGrp="1"/>
+          </p:cNvSpPr>
+          <p:nvPr>
+            <p:ph type="sldNum" sz="quarter" idx="5"/>
+          </p:nvPr>
+        </p:nvSpPr>
+        <p:spPr>
+          <a:xfrm>
+            <a:off x="3884613" y="8685213"/>
+            <a:ext cx="2971800" cy="458787"/>
+          </a:xfrm>
+          <a:prstGeom prst="rect">
+            <a:avLst/>
+          </a:prstGeom>
+        </p:spPr>
+        <p:txBody>
+          <a:bodyPr vert="horz" lIns="91440" tIns="45720" rIns="91440" bIns="45720" rtlCol="0" anchor="b"/>
+          <a:lstStyle>
+            <a:lvl1pPr algn="r">
+              <a:defRPr sz="1200"/>
+            </a:lvl1pPr>
+          </a:lstStyle>
+          <a:p>
+            <a:fld id="{05500ECC-6B4B-41C2-8885-7ACAF0714D2D}" type="slidenum">
+              <a:rPr lang="en-US" smtClean="0"/>
+              <a:t>‹#›</a:t>
+            </a:fld>
+            <a:endParaRPr lang="en-US"/>
+          </a:p>
+        </p:txBody>
+      </p:sp>
+    </p:spTree>
+    <p:extLst>
+      <p:ext uri="{BB962C8B-B14F-4D97-AF65-F5344CB8AC3E}">
+        <p14:creationId xmlns:p14="http://schemas.microsoft.com/office/powerpoint/2010/main" val="3026854835"/>
+      </p:ext>
+    </p:extLst>
+  </p:cSld>
+  <p:clrMap bg1="lt1" tx1="dk1" bg2="lt2" tx2="dk2" accent1="accent1" accent2="accent2" accent3="accent3" accent4="accent4" accent5="accent5" accent6="accent6" hlink="hlink" folHlink="folHlink"/>
+  <p:notesStyle>
+    <a:lvl1pPr marL="0" algn="l" defTabSz="914400" rtl="0" eaLnBrk="1" latinLnBrk="0" hangingPunct="1">
+      <a:defRPr sz="1200" kern="1200">
+        <a:solidFill>
+          <a:schemeClr val="tx1"/>
+        </a:solidFill>
+        <a:latin typeface="+mn-lt"/>
+        <a:ea typeface="+mn-ea"/>
+        <a:cs typeface="+mn-cs"/>
+      </a:defRPr>
+    </a:lvl1pPr>
+    <a:lvl2pPr marL="457200" algn="l" defTabSz="914400" rtl="0" eaLnBrk="1" latinLnBrk="0" hangingPunct="1">
+      <a:defRPr sz="1200" kern="1200">
+        <a:solidFill>
+          <a:schemeClr val="tx1"/>
+        </a:solidFill>
+        <a:latin typeface="+mn-lt"/>
+        <a:ea typeface="+mn-ea"/>
+        <a:cs typeface="+mn-cs"/>
+      </a:defRPr>
+    </a:lvl2pPr>
+    <a:lvl3pPr marL="914400" algn="l" defTabSz="914400" rtl="0" eaLnBrk="1" latinLnBrk="0" hangingPunct="1">
+      <a:defRPr sz="1200" kern="1200">
+        <a:solidFill>
+          <a:schemeClr val="tx1"/>
+        </a:solidFill>
+        <a:latin typeface="+mn-lt"/>
+        <a:ea typeface="+mn-ea"/>
+        <a:cs typeface="+mn-cs"/>
+      </a:defRPr>
+    </a:lvl3pPr>
+    <a:lvl4pPr marL="1371600" algn="l" defTabSz="914400" rtl="0" eaLnBrk="1" latinLnBrk="0" hangingPunct="1">
+      <a:defRPr sz="1200" kern="1200">
+        <a:solidFill>
+          <a:schemeClr val="tx1"/>
+        </a:solidFill>
+        <a:latin typeface="+mn-lt"/>
+        <a:ea typeface="+mn-ea"/>
+        <a:cs typeface="+mn-cs"/>
+      </a:defRPr>
+    </a:lvl4pPr>
+    <a:lvl5pPr marL="1828800" algn="l" defTabSz="914400" rtl="0" eaLnBrk="1" latinLnBrk="0" hangingPunct="1">
+      <a:defRPr sz="1200" kern="1200">
+        <a:solidFill>
+          <a:schemeClr val="tx1"/>
+        </a:solidFill>
+        <a:latin typeface="+mn-lt"/>
+        <a:ea typeface="+mn-ea"/>
+        <a:cs typeface="+mn-cs"/>
+      </a:defRPr>
+    </a:lvl5pPr>
+    <a:lvl6pPr marL="2286000" algn="l" defTabSz="914400" rtl="0" eaLnBrk="1" latinLnBrk="0" hangingPunct="1">
+      <a:defRPr sz="1200" kern="1200">
+        <a:solidFill>
+          <a:schemeClr val="tx1"/>
+        </a:solidFill>
+        <a:latin typeface="+mn-lt"/>
+        <a:ea typeface="+mn-ea"/>
+        <a:cs typeface="+mn-cs"/>
+      </a:defRPr>
+    </a:lvl6pPr>
+    <a:lvl7pPr marL="2743200" algn="l" defTabSz="914400" rtl="0" eaLnBrk="1" latinLnBrk="0" hangingPunct="1">
+      <a:defRPr sz="1200" kern="1200">
+        <a:solidFill>
+          <a:schemeClr val="tx1"/>
+        </a:solidFill>
+        <a:latin typeface="+mn-lt"/>
+        <a:ea typeface="+mn-ea"/>
+        <a:cs typeface="+mn-cs"/>
+      </a:defRPr>
+    </a:lvl7pPr>
+    <a:lvl8pPr marL="3200400" algn="l" defTabSz="914400" rtl="0" eaLnBrk="1" latinLnBrk="0" hangingPunct="1">
+      <a:defRPr sz="1200" kern="1200">
+        <a:solidFill>
+          <a:schemeClr val="tx1"/>
+        </a:solidFill>
+        <a:latin typeface="+mn-lt"/>
+        <a:ea typeface="+mn-ea"/>
+        <a:cs typeface="+mn-cs"/>
+      </a:defRPr>
+    </a:lvl8pPr>
+    <a:lvl9pPr marL="3657600" algn="l" defTabSz="914400" rtl="0" eaLnBrk="1" latinLnBrk="0" hangingPunct="1">
+      <a:defRPr sz="1200" kern="1200">
+        <a:solidFill>
+          <a:schemeClr val="tx1"/>
+        </a:solidFill>
+        <a:latin typeface="+mn-lt"/>
+        <a:ea typeface="+mn-ea"/>
+        <a:cs typeface="+mn-cs"/>
+      </a:defRPr>
+    </a:lvl9pPr>
+  </p:notesStyle>
+</p:notesMaster>
+</file>
+
+<file path=ppt/notesSlides/notesSlide1.xml><?xml version="1.0" encoding="utf-8"?>
+<p:notes xmlns:a="http://schemas.openxmlformats.org/drawingml/2006/main" xmlns:r="http://schemas.openxmlformats.org/officeDocument/2006/relationships" xmlns:p="http://schemas.openxmlformats.org/presentationml/2006/main">
+  <p:cSld>
+    <p:spTree>
+      <p:nvGrpSpPr>
+        <p:cNvPr id="1" name=""/>
+        <p:cNvGrpSpPr/>
+        <p:nvPr/>
+      </p:nvGrpSpPr>
+      <p:grpSpPr>
+        <a:xfrm>
+          <a:off x="0" y="0"/>
+          <a:ext cx="0" cy="0"/>
+          <a:chOff x="0" y="0"/>
+          <a:chExt cx="0" cy="0"/>
+        </a:xfrm>
+      </p:grpSpPr>
+      <p:sp>
+        <p:nvSpPr>
+          <p:cNvPr id="2" name="Slide Image Placeholder 1"/>
+          <p:cNvSpPr>
+            <a:spLocks noGrp="1" noRot="1" noChangeAspect="1"/>
+          </p:cNvSpPr>
+          <p:nvPr>
+            <p:ph type="sldImg"/>
+          </p:nvPr>
+        </p:nvSpPr>
+        <p:spPr/>
+      </p:sp>
+      <p:sp>
+        <p:nvSpPr>
+          <p:cNvPr id="3" name="Notes Placeholder 2"/>
+          <p:cNvSpPr>
+            <a:spLocks noGrp="1"/>
+          </p:cNvSpPr>
+          <p:nvPr>
+            <p:ph type="body" idx="1"/>
+          </p:nvPr>
+        </p:nvSpPr>
+        <p:spPr/>
+        <p:txBody>
+          <a:bodyPr/>
+          <a:lstStyle/>
+          <a:p>
+            <a:r>
+              <a:rPr lang="ro-RO"/>
+              <a:t>Gestionarea cărților se realizează prin plasarea acestora în 4 categorii: </a:t>
+            </a:r>
+            <a:r>
+              <a:rPr lang="ro-RO" i="1"/>
+              <a:t>Plan to read, Reading, Read </a:t>
+            </a:r>
+            <a:r>
+              <a:rPr lang="ro-RO" i="0"/>
+              <a:t>și </a:t>
+            </a:r>
+            <a:r>
+              <a:rPr lang="ro-RO" i="1"/>
+              <a:t>Favorites</a:t>
+            </a:r>
+            <a:endParaRPr lang="ro-RO" i="0"/>
+          </a:p>
+          <a:p>
+            <a:r>
+              <a:rPr lang="ro-RO" i="0"/>
+              <a:t>Citirea cărților: deschiderea unui modal ce permite vizualizarea acestora direct din aplicație</a:t>
+            </a:r>
+          </a:p>
+          <a:p>
+            <a:r>
+              <a:rPr lang="ro-RO" i="0"/>
+              <a:t>Exprimarea opiniei: prin lăsarea de comentarii aferente cărții respective, marcarea capitolelor favorite, dar și prin nota acordată acesteia</a:t>
+            </a:r>
+            <a:endParaRPr lang="ro-RO" i="1"/>
+          </a:p>
+        </p:txBody>
+      </p:sp>
+      <p:sp>
+        <p:nvSpPr>
+          <p:cNvPr id="4" name="Slide Number Placeholder 3"/>
+          <p:cNvSpPr>
+            <a:spLocks noGrp="1"/>
+          </p:cNvSpPr>
+          <p:nvPr>
+            <p:ph type="sldNum" sz="quarter" idx="10"/>
+          </p:nvPr>
+        </p:nvSpPr>
+        <p:spPr/>
+        <p:txBody>
+          <a:bodyPr/>
+          <a:lstStyle/>
+          <a:p>
+            <a:fld id="{05500ECC-6B4B-41C2-8885-7ACAF0714D2D}" type="slidenum">
+              <a:rPr lang="en-US" smtClean="0"/>
+              <a:t>3</a:t>
+            </a:fld>
+            <a:endParaRPr lang="en-US"/>
+          </a:p>
+        </p:txBody>
+      </p:sp>
+    </p:spTree>
+    <p:extLst>
+      <p:ext uri="{BB962C8B-B14F-4D97-AF65-F5344CB8AC3E}">
+        <p14:creationId xmlns:p14="http://schemas.microsoft.com/office/powerpoint/2010/main" val="2152062683"/>
+      </p:ext>
+    </p:extLst>
+  </p:cSld>
+  <p:clrMapOvr>
+    <a:masterClrMapping/>
+  </p:clrMapOvr>
+</p:notes>
+</file>
+
+<file path=ppt/notesSlides/notesSlide2.xml><?xml version="1.0" encoding="utf-8"?>
+<p:notes xmlns:a="http://schemas.openxmlformats.org/drawingml/2006/main" xmlns:r="http://schemas.openxmlformats.org/officeDocument/2006/relationships" xmlns:p="http://schemas.openxmlformats.org/presentationml/2006/main">
+  <p:cSld>
+    <p:spTree>
+      <p:nvGrpSpPr>
+        <p:cNvPr id="1" name=""/>
+        <p:cNvGrpSpPr/>
+        <p:nvPr/>
+      </p:nvGrpSpPr>
+      <p:grpSpPr>
+        <a:xfrm>
+          <a:off x="0" y="0"/>
+          <a:ext cx="0" cy="0"/>
+          <a:chOff x="0" y="0"/>
+          <a:chExt cx="0" cy="0"/>
+        </a:xfrm>
+      </p:grpSpPr>
+      <p:sp>
+        <p:nvSpPr>
+          <p:cNvPr id="2" name="Slide Image Placeholder 1"/>
+          <p:cNvSpPr>
+            <a:spLocks noGrp="1" noRot="1" noChangeAspect="1"/>
+          </p:cNvSpPr>
+          <p:nvPr>
+            <p:ph type="sldImg"/>
+          </p:nvPr>
+        </p:nvSpPr>
+        <p:spPr/>
+      </p:sp>
+      <p:sp>
+        <p:nvSpPr>
+          <p:cNvPr id="3" name="Notes Placeholder 2"/>
+          <p:cNvSpPr>
+            <a:spLocks noGrp="1"/>
+          </p:cNvSpPr>
+          <p:nvPr>
+            <p:ph type="body" idx="1"/>
+          </p:nvPr>
+        </p:nvSpPr>
+        <p:spPr/>
+        <p:txBody>
+          <a:bodyPr/>
+          <a:lstStyle/>
+          <a:p>
+            <a:r>
+              <a:rPr lang="ro-RO"/>
+              <a:t>Sistem creat astfel încât fiecare utilizator poate să contribuie prin diverse tipuri de recomandări: </a:t>
+            </a:r>
+          </a:p>
+          <a:p>
+            <a:r>
+              <a:rPr lang="ro-RO"/>
+              <a:t>	-recomandarea unei cărți similare cărții citite/vizitate</a:t>
+            </a:r>
+          </a:p>
+          <a:p>
+            <a:r>
+              <a:rPr lang="ro-RO"/>
+              <a:t>	-recomandarile din secțiunea </a:t>
+            </a:r>
+            <a:r>
+              <a:rPr lang="ro-RO" i="1"/>
+              <a:t>List of books</a:t>
+            </a:r>
+            <a:r>
+              <a:rPr lang="ro-RO" i="0"/>
+              <a:t> – crearea unor liste de cărți, pe diverse criterii alese de utilizator</a:t>
+            </a:r>
+            <a:endParaRPr lang="en-US"/>
+          </a:p>
+        </p:txBody>
+      </p:sp>
+      <p:sp>
+        <p:nvSpPr>
+          <p:cNvPr id="4" name="Slide Number Placeholder 3"/>
+          <p:cNvSpPr>
+            <a:spLocks noGrp="1"/>
+          </p:cNvSpPr>
+          <p:nvPr>
+            <p:ph type="sldNum" sz="quarter" idx="10"/>
+          </p:nvPr>
+        </p:nvSpPr>
+        <p:spPr/>
+        <p:txBody>
+          <a:bodyPr/>
+          <a:lstStyle/>
+          <a:p>
+            <a:fld id="{05500ECC-6B4B-41C2-8885-7ACAF0714D2D}" type="slidenum">
+              <a:rPr lang="en-US" smtClean="0"/>
+              <a:t>4</a:t>
+            </a:fld>
+            <a:endParaRPr lang="en-US"/>
+          </a:p>
+        </p:txBody>
+      </p:sp>
+    </p:spTree>
+    <p:extLst>
+      <p:ext uri="{BB962C8B-B14F-4D97-AF65-F5344CB8AC3E}">
+        <p14:creationId xmlns:p14="http://schemas.microsoft.com/office/powerpoint/2010/main" val="2516664419"/>
+      </p:ext>
+    </p:extLst>
+  </p:cSld>
+  <p:clrMapOvr>
+    <a:masterClrMapping/>
+  </p:clrMapOvr>
+</p:notes>
+</file>
+
+<file path=ppt/notesSlides/notesSlide3.xml><?xml version="1.0" encoding="utf-8"?>
+<p:notes xmlns:a="http://schemas.openxmlformats.org/drawingml/2006/main" xmlns:r="http://schemas.openxmlformats.org/officeDocument/2006/relationships" xmlns:p="http://schemas.openxmlformats.org/presentationml/2006/main">
+  <p:cSld>
+    <p:spTree>
+      <p:nvGrpSpPr>
+        <p:cNvPr id="1" name=""/>
+        <p:cNvGrpSpPr/>
+        <p:nvPr/>
+      </p:nvGrpSpPr>
+      <p:grpSpPr>
+        <a:xfrm>
+          <a:off x="0" y="0"/>
+          <a:ext cx="0" cy="0"/>
+          <a:chOff x="0" y="0"/>
+          <a:chExt cx="0" cy="0"/>
+        </a:xfrm>
+      </p:grpSpPr>
+      <p:sp>
+        <p:nvSpPr>
+          <p:cNvPr id="2" name="Slide Image Placeholder 1"/>
+          <p:cNvSpPr>
+            <a:spLocks noGrp="1" noRot="1" noChangeAspect="1"/>
+          </p:cNvSpPr>
+          <p:nvPr>
+            <p:ph type="sldImg"/>
+          </p:nvPr>
+        </p:nvSpPr>
+        <p:spPr/>
+      </p:sp>
+      <p:sp>
+        <p:nvSpPr>
+          <p:cNvPr id="3" name="Notes Placeholder 2"/>
+          <p:cNvSpPr>
+            <a:spLocks noGrp="1"/>
+          </p:cNvSpPr>
+          <p:nvPr>
+            <p:ph type="body" idx="1"/>
+          </p:nvPr>
+        </p:nvSpPr>
+        <p:spPr/>
+        <p:txBody>
+          <a:bodyPr/>
+          <a:lstStyle/>
+          <a:p>
+            <a:r>
+              <a:rPr lang="en-US"/>
+              <a:t>&gt;</a:t>
+            </a:r>
+            <a:r>
+              <a:rPr lang="ro-RO"/>
+              <a:t>Sistemul de recomandări bazat pe aplicație va genera utilizatorului recomandări de cărți pe baza istoricului acestuia</a:t>
+            </a:r>
+          </a:p>
+          <a:p>
+            <a:r>
+              <a:rPr lang="en-US"/>
+              <a:t>&gt;Dac</a:t>
+            </a:r>
+            <a:r>
+              <a:rPr lang="ro-RO"/>
+              <a:t>ă este un utilizator nou, va genera cartea cu cea mai mare medie a notelor din aplicație</a:t>
+            </a:r>
+            <a:endParaRPr lang="en-US"/>
+          </a:p>
+        </p:txBody>
+      </p:sp>
+      <p:sp>
+        <p:nvSpPr>
+          <p:cNvPr id="4" name="Slide Number Placeholder 3"/>
+          <p:cNvSpPr>
+            <a:spLocks noGrp="1"/>
+          </p:cNvSpPr>
+          <p:nvPr>
+            <p:ph type="sldNum" sz="quarter" idx="10"/>
+          </p:nvPr>
+        </p:nvSpPr>
+        <p:spPr/>
+        <p:txBody>
+          <a:bodyPr/>
+          <a:lstStyle/>
+          <a:p>
+            <a:fld id="{05500ECC-6B4B-41C2-8885-7ACAF0714D2D}" type="slidenum">
+              <a:rPr lang="en-US" smtClean="0"/>
+              <a:t>5</a:t>
+            </a:fld>
+            <a:endParaRPr lang="en-US"/>
+          </a:p>
+        </p:txBody>
+      </p:sp>
+    </p:spTree>
+    <p:extLst>
+      <p:ext uri="{BB962C8B-B14F-4D97-AF65-F5344CB8AC3E}">
+        <p14:creationId xmlns:p14="http://schemas.microsoft.com/office/powerpoint/2010/main" val="2830845392"/>
+      </p:ext>
+    </p:extLst>
+  </p:cSld>
+  <p:clrMapOvr>
+    <a:masterClrMapping/>
+  </p:clrMapOvr>
+</p:notes>
+</file>
+
+<file path=ppt/notesSlides/notesSlide4.xml><?xml version="1.0" encoding="utf-8"?>
+<p:notes xmlns:a="http://schemas.openxmlformats.org/drawingml/2006/main" xmlns:r="http://schemas.openxmlformats.org/officeDocument/2006/relationships" xmlns:p="http://schemas.openxmlformats.org/presentationml/2006/main">
+  <p:cSld>
+    <p:spTree>
+      <p:nvGrpSpPr>
+        <p:cNvPr id="1" name=""/>
+        <p:cNvGrpSpPr/>
+        <p:nvPr/>
+      </p:nvGrpSpPr>
+      <p:grpSpPr>
+        <a:xfrm>
+          <a:off x="0" y="0"/>
+          <a:ext cx="0" cy="0"/>
+          <a:chOff x="0" y="0"/>
+          <a:chExt cx="0" cy="0"/>
+        </a:xfrm>
+      </p:grpSpPr>
+      <p:sp>
+        <p:nvSpPr>
+          <p:cNvPr id="2" name="Slide Image Placeholder 1"/>
+          <p:cNvSpPr>
+            <a:spLocks noGrp="1" noRot="1" noChangeAspect="1"/>
+          </p:cNvSpPr>
+          <p:nvPr>
+            <p:ph type="sldImg"/>
+          </p:nvPr>
+        </p:nvSpPr>
+        <p:spPr/>
+      </p:sp>
+      <p:sp>
+        <p:nvSpPr>
+          <p:cNvPr id="3" name="Notes Placeholder 2"/>
+          <p:cNvSpPr>
+            <a:spLocks noGrp="1"/>
+          </p:cNvSpPr>
+          <p:nvPr>
+            <p:ph type="body" idx="1"/>
+          </p:nvPr>
+        </p:nvSpPr>
+        <p:spPr/>
+        <p:txBody>
+          <a:bodyPr/>
+          <a:lstStyle/>
+          <a:p>
+            <a:endParaRPr lang="en-US"/>
+          </a:p>
+        </p:txBody>
+      </p:sp>
+      <p:sp>
+        <p:nvSpPr>
+          <p:cNvPr id="4" name="Slide Number Placeholder 3"/>
+          <p:cNvSpPr>
+            <a:spLocks noGrp="1"/>
+          </p:cNvSpPr>
+          <p:nvPr>
+            <p:ph type="sldNum" sz="quarter" idx="10"/>
+          </p:nvPr>
+        </p:nvSpPr>
+        <p:spPr/>
+        <p:txBody>
+          <a:bodyPr/>
+          <a:lstStyle/>
+          <a:p>
+            <a:fld id="{05500ECC-6B4B-41C2-8885-7ACAF0714D2D}" type="slidenum">
+              <a:rPr lang="en-US" smtClean="0"/>
+              <a:t>6</a:t>
+            </a:fld>
+            <a:endParaRPr lang="en-US"/>
+          </a:p>
+        </p:txBody>
+      </p:sp>
+    </p:spTree>
+    <p:extLst>
+      <p:ext uri="{BB962C8B-B14F-4D97-AF65-F5344CB8AC3E}">
+        <p14:creationId xmlns:p14="http://schemas.microsoft.com/office/powerpoint/2010/main" val="2553964814"/>
+      </p:ext>
+    </p:extLst>
+  </p:cSld>
+  <p:clrMapOvr>
+    <a:masterClrMapping/>
+  </p:clrMapOvr>
+</p:notes>
+</file>
+
+<file path=ppt/notesSlides/notesSlide5.xml><?xml version="1.0" encoding="utf-8"?>
+<p:notes xmlns:a="http://schemas.openxmlformats.org/drawingml/2006/main" xmlns:r="http://schemas.openxmlformats.org/officeDocument/2006/relationships" xmlns:p="http://schemas.openxmlformats.org/presentationml/2006/main">
+  <p:cSld>
+    <p:spTree>
+      <p:nvGrpSpPr>
+        <p:cNvPr id="1" name=""/>
+        <p:cNvGrpSpPr/>
+        <p:nvPr/>
+      </p:nvGrpSpPr>
+      <p:grpSpPr>
+        <a:xfrm>
+          <a:off x="0" y="0"/>
+          <a:ext cx="0" cy="0"/>
+          <a:chOff x="0" y="0"/>
+          <a:chExt cx="0" cy="0"/>
+        </a:xfrm>
+      </p:grpSpPr>
+      <p:sp>
+        <p:nvSpPr>
+          <p:cNvPr id="2" name="Slide Image Placeholder 1"/>
+          <p:cNvSpPr>
+            <a:spLocks noGrp="1" noRot="1" noChangeAspect="1"/>
+          </p:cNvSpPr>
+          <p:nvPr>
+            <p:ph type="sldImg"/>
+          </p:nvPr>
+        </p:nvSpPr>
+        <p:spPr/>
+      </p:sp>
+      <p:sp>
+        <p:nvSpPr>
+          <p:cNvPr id="3" name="Notes Placeholder 2"/>
+          <p:cNvSpPr>
+            <a:spLocks noGrp="1"/>
+          </p:cNvSpPr>
+          <p:nvPr>
+            <p:ph type="body" idx="1"/>
+          </p:nvPr>
+        </p:nvSpPr>
+        <p:spPr/>
+        <p:txBody>
+          <a:bodyPr/>
+          <a:lstStyle/>
+          <a:p>
+            <a:r>
+              <a:rPr lang="ro-RO"/>
+              <a:t>Abordarea originală a constat prin tema, alegerea tehnologiilor și felul cum au fost folosite acestea în cadrul aplicației</a:t>
+            </a:r>
+            <a:endParaRPr lang="en-US"/>
+          </a:p>
+        </p:txBody>
+      </p:sp>
+      <p:sp>
+        <p:nvSpPr>
+          <p:cNvPr id="4" name="Slide Number Placeholder 3"/>
+          <p:cNvSpPr>
+            <a:spLocks noGrp="1"/>
+          </p:cNvSpPr>
+          <p:nvPr>
+            <p:ph type="sldNum" sz="quarter" idx="10"/>
+          </p:nvPr>
+        </p:nvSpPr>
+        <p:spPr/>
+        <p:txBody>
+          <a:bodyPr/>
+          <a:lstStyle/>
+          <a:p>
+            <a:fld id="{05500ECC-6B4B-41C2-8885-7ACAF0714D2D}" type="slidenum">
+              <a:rPr lang="en-US" smtClean="0"/>
+              <a:t>7</a:t>
+            </a:fld>
+            <a:endParaRPr lang="en-US"/>
+          </a:p>
+        </p:txBody>
+      </p:sp>
+    </p:spTree>
+    <p:extLst>
+      <p:ext uri="{BB962C8B-B14F-4D97-AF65-F5344CB8AC3E}">
+        <p14:creationId xmlns:p14="http://schemas.microsoft.com/office/powerpoint/2010/main" val="3803577369"/>
+      </p:ext>
+    </p:extLst>
+  </p:cSld>
+  <p:clrMapOvr>
+    <a:masterClrMapping/>
+  </p:clrMapOvr>
+</p:notes>
+</file>
+
+<file path=ppt/notesSlides/notesSlide6.xml><?xml version="1.0" encoding="utf-8"?>
+<p:notes xmlns:a="http://schemas.openxmlformats.org/drawingml/2006/main" xmlns:r="http://schemas.openxmlformats.org/officeDocument/2006/relationships" xmlns:p="http://schemas.openxmlformats.org/presentationml/2006/main">
+  <p:cSld>
+    <p:spTree>
+      <p:nvGrpSpPr>
+        <p:cNvPr id="1" name=""/>
+        <p:cNvGrpSpPr/>
+        <p:nvPr/>
+      </p:nvGrpSpPr>
+      <p:grpSpPr>
+        <a:xfrm>
+          <a:off x="0" y="0"/>
+          <a:ext cx="0" cy="0"/>
+          <a:chOff x="0" y="0"/>
+          <a:chExt cx="0" cy="0"/>
+        </a:xfrm>
+      </p:grpSpPr>
+      <p:sp>
+        <p:nvSpPr>
+          <p:cNvPr id="2" name="Slide Image Placeholder 1"/>
+          <p:cNvSpPr>
+            <a:spLocks noGrp="1" noRot="1" noChangeAspect="1"/>
+          </p:cNvSpPr>
+          <p:nvPr>
+            <p:ph type="sldImg"/>
+          </p:nvPr>
+        </p:nvSpPr>
+        <p:spPr/>
+      </p:sp>
+      <p:sp>
+        <p:nvSpPr>
+          <p:cNvPr id="3" name="Notes Placeholder 2"/>
+          <p:cNvSpPr>
+            <a:spLocks noGrp="1"/>
+          </p:cNvSpPr>
+          <p:nvPr>
+            <p:ph type="body" idx="1"/>
+          </p:nvPr>
+        </p:nvSpPr>
+        <p:spPr/>
+        <p:txBody>
+          <a:bodyPr/>
+          <a:lstStyle/>
+          <a:p>
+            <a:r>
+              <a:rPr lang="ro-RO"/>
+              <a:t>Comunitatea reprezintă tot ce ține de interacțiunile realizate între utilizatori</a:t>
+            </a:r>
+            <a:endParaRPr lang="en-US"/>
+          </a:p>
+        </p:txBody>
+      </p:sp>
+      <p:sp>
+        <p:nvSpPr>
+          <p:cNvPr id="4" name="Slide Number Placeholder 3"/>
+          <p:cNvSpPr>
+            <a:spLocks noGrp="1"/>
+          </p:cNvSpPr>
+          <p:nvPr>
+            <p:ph type="sldNum" sz="quarter" idx="10"/>
+          </p:nvPr>
+        </p:nvSpPr>
+        <p:spPr/>
+        <p:txBody>
+          <a:bodyPr/>
+          <a:lstStyle/>
+          <a:p>
+            <a:fld id="{05500ECC-6B4B-41C2-8885-7ACAF0714D2D}" type="slidenum">
+              <a:rPr lang="en-US" smtClean="0"/>
+              <a:t>8</a:t>
+            </a:fld>
+            <a:endParaRPr lang="en-US"/>
+          </a:p>
+        </p:txBody>
+      </p:sp>
+    </p:spTree>
+    <p:extLst>
+      <p:ext uri="{BB962C8B-B14F-4D97-AF65-F5344CB8AC3E}">
+        <p14:creationId xmlns:p14="http://schemas.microsoft.com/office/powerpoint/2010/main" val="3881567416"/>
+      </p:ext>
+    </p:extLst>
+  </p:cSld>
+  <p:clrMapOvr>
+    <a:masterClrMapping/>
+  </p:clrMapOvr>
+</p:notes>
+</file>
+
+<file path=ppt/notesSlides/notesSlide7.xml><?xml version="1.0" encoding="utf-8"?>
+<p:notes xmlns:a="http://schemas.openxmlformats.org/drawingml/2006/main" xmlns:r="http://schemas.openxmlformats.org/officeDocument/2006/relationships" xmlns:p="http://schemas.openxmlformats.org/presentationml/2006/main">
+  <p:cSld>
+    <p:spTree>
+      <p:nvGrpSpPr>
+        <p:cNvPr id="1" name=""/>
+        <p:cNvGrpSpPr/>
+        <p:nvPr/>
+      </p:nvGrpSpPr>
+      <p:grpSpPr>
+        <a:xfrm>
+          <a:off x="0" y="0"/>
+          <a:ext cx="0" cy="0"/>
+          <a:chOff x="0" y="0"/>
+          <a:chExt cx="0" cy="0"/>
+        </a:xfrm>
+      </p:grpSpPr>
+      <p:sp>
+        <p:nvSpPr>
+          <p:cNvPr id="2" name="Slide Image Placeholder 1"/>
+          <p:cNvSpPr>
+            <a:spLocks noGrp="1" noRot="1" noChangeAspect="1"/>
+          </p:cNvSpPr>
+          <p:nvPr>
+            <p:ph type="sldImg"/>
+          </p:nvPr>
+        </p:nvSpPr>
+        <p:spPr/>
+      </p:sp>
+      <p:sp>
+        <p:nvSpPr>
+          <p:cNvPr id="3" name="Notes Placeholder 2"/>
+          <p:cNvSpPr>
+            <a:spLocks noGrp="1"/>
+          </p:cNvSpPr>
+          <p:nvPr>
+            <p:ph type="body" idx="1"/>
+          </p:nvPr>
+        </p:nvSpPr>
+        <p:spPr/>
+        <p:txBody>
+          <a:bodyPr/>
+          <a:lstStyle/>
+          <a:p>
+            <a:r>
+              <a:rPr lang="en-US"/>
+              <a:t>&gt;ASP.NET:</a:t>
+            </a:r>
+            <a:endParaRPr lang="ro-RO"/>
+          </a:p>
+          <a:p>
+            <a:r>
+              <a:rPr lang="ro-RO"/>
+              <a:t>	</a:t>
+            </a:r>
+            <a:r>
+              <a:rPr lang="en-US"/>
+              <a:t>&gt;ASP.NET Core 2.0 MVC</a:t>
+            </a:r>
+            <a:endParaRPr lang="ro-RO"/>
+          </a:p>
+          <a:p>
+            <a:r>
+              <a:rPr lang="ro-RO"/>
+              <a:t>	</a:t>
+            </a:r>
+            <a:r>
+              <a:rPr lang="en-US"/>
+              <a:t>&gt;.NET framework</a:t>
+            </a:r>
+          </a:p>
+          <a:p>
+            <a:r>
+              <a:rPr lang="en-US"/>
+              <a:t>	&gt;Entity Framework</a:t>
+            </a:r>
+          </a:p>
+          <a:p>
+            <a:r>
+              <a:rPr lang="en-US"/>
+              <a:t>	&gt;Identity</a:t>
+            </a:r>
+          </a:p>
+          <a:p>
+            <a:r>
+              <a:rPr lang="en-US"/>
+              <a:t>&gt;JavaScript:</a:t>
+            </a:r>
+          </a:p>
+          <a:p>
+            <a:r>
+              <a:rPr lang="en-US"/>
+              <a:t>	&gt;jQuery</a:t>
+            </a:r>
+          </a:p>
+          <a:p>
+            <a:r>
+              <a:rPr lang="en-US"/>
+              <a:t>	&gt;AJAX</a:t>
+            </a:r>
+          </a:p>
+        </p:txBody>
+      </p:sp>
+      <p:sp>
+        <p:nvSpPr>
+          <p:cNvPr id="4" name="Slide Number Placeholder 3"/>
+          <p:cNvSpPr>
+            <a:spLocks noGrp="1"/>
+          </p:cNvSpPr>
+          <p:nvPr>
+            <p:ph type="sldNum" sz="quarter" idx="10"/>
+          </p:nvPr>
+        </p:nvSpPr>
+        <p:spPr/>
+        <p:txBody>
+          <a:bodyPr/>
+          <a:lstStyle/>
+          <a:p>
+            <a:fld id="{05500ECC-6B4B-41C2-8885-7ACAF0714D2D}" type="slidenum">
+              <a:rPr lang="en-US" smtClean="0"/>
+              <a:t>9</a:t>
+            </a:fld>
+            <a:endParaRPr lang="en-US"/>
+          </a:p>
+        </p:txBody>
+      </p:sp>
+    </p:spTree>
+    <p:extLst>
+      <p:ext uri="{BB962C8B-B14F-4D97-AF65-F5344CB8AC3E}">
+        <p14:creationId xmlns:p14="http://schemas.microsoft.com/office/powerpoint/2010/main" val="966604121"/>
+      </p:ext>
+    </p:extLst>
+  </p:cSld>
+  <p:clrMapOvr>
+    <a:masterClrMapping/>
+  </p:clrMapOvr>
+</p:notes>
+</file>
+
+<file path=ppt/notesSlides/notesSlide8.xml><?xml version="1.0" encoding="utf-8"?>
+<p:notes xmlns:a="http://schemas.openxmlformats.org/drawingml/2006/main" xmlns:r="http://schemas.openxmlformats.org/officeDocument/2006/relationships" xmlns:p="http://schemas.openxmlformats.org/presentationml/2006/main">
+  <p:cSld>
+    <p:spTree>
+      <p:nvGrpSpPr>
+        <p:cNvPr id="1" name=""/>
+        <p:cNvGrpSpPr/>
+        <p:nvPr/>
+      </p:nvGrpSpPr>
+      <p:grpSpPr>
+        <a:xfrm>
+          <a:off x="0" y="0"/>
+          <a:ext cx="0" cy="0"/>
+          <a:chOff x="0" y="0"/>
+          <a:chExt cx="0" cy="0"/>
+        </a:xfrm>
+      </p:grpSpPr>
+      <p:sp>
+        <p:nvSpPr>
+          <p:cNvPr id="2" name="Slide Image Placeholder 1"/>
+          <p:cNvSpPr>
+            <a:spLocks noGrp="1" noRot="1" noChangeAspect="1"/>
+          </p:cNvSpPr>
+          <p:nvPr>
+            <p:ph type="sldImg"/>
+          </p:nvPr>
+        </p:nvSpPr>
+        <p:spPr/>
+      </p:sp>
+      <p:sp>
+        <p:nvSpPr>
+          <p:cNvPr id="3" name="Notes Placeholder 2"/>
+          <p:cNvSpPr>
+            <a:spLocks noGrp="1"/>
+          </p:cNvSpPr>
+          <p:nvPr>
+            <p:ph type="body" idx="1"/>
+          </p:nvPr>
+        </p:nvSpPr>
+        <p:spPr/>
+        <p:txBody>
+          <a:bodyPr/>
+          <a:lstStyle/>
+          <a:p>
+            <a:r>
+              <a:rPr lang="en-US"/>
+              <a:t>&gt;Autentificarea unui utilizator</a:t>
+            </a:r>
+          </a:p>
+          <a:p>
+            <a:r>
+              <a:rPr lang="en-US"/>
+              <a:t>&gt;Navigarea prin paginile aplicatiei: Profile, Settings, Explore, List of books</a:t>
+            </a:r>
+          </a:p>
+        </p:txBody>
+      </p:sp>
+      <p:sp>
+        <p:nvSpPr>
+          <p:cNvPr id="4" name="Slide Number Placeholder 3"/>
+          <p:cNvSpPr>
+            <a:spLocks noGrp="1"/>
+          </p:cNvSpPr>
+          <p:nvPr>
+            <p:ph type="sldNum" sz="quarter" idx="10"/>
+          </p:nvPr>
+        </p:nvSpPr>
+        <p:spPr/>
+        <p:txBody>
+          <a:bodyPr/>
+          <a:lstStyle/>
+          <a:p>
+            <a:fld id="{05500ECC-6B4B-41C2-8885-7ACAF0714D2D}" type="slidenum">
+              <a:rPr lang="en-US" smtClean="0"/>
+              <a:t>10</a:t>
+            </a:fld>
+            <a:endParaRPr lang="en-US"/>
+          </a:p>
+        </p:txBody>
+      </p:sp>
+    </p:spTree>
+    <p:extLst>
+      <p:ext uri="{BB962C8B-B14F-4D97-AF65-F5344CB8AC3E}">
+        <p14:creationId xmlns:p14="http://schemas.microsoft.com/office/powerpoint/2010/main" val="229973589"/>
+      </p:ext>
+    </p:extLst>
+  </p:cSld>
+  <p:clrMapOvr>
+    <a:masterClrMapping/>
+  </p:clrMapOvr>
+</p:notes>
+</file>
+
+<file path=ppt/notesSlides/notesSlide9.xml><?xml version="1.0" encoding="utf-8"?>
+<p:notes xmlns:a="http://schemas.openxmlformats.org/drawingml/2006/main" xmlns:r="http://schemas.openxmlformats.org/officeDocument/2006/relationships" xmlns:p="http://schemas.openxmlformats.org/presentationml/2006/main">
+  <p:cSld>
+    <p:spTree>
+      <p:nvGrpSpPr>
+        <p:cNvPr id="1" name=""/>
+        <p:cNvGrpSpPr/>
+        <p:nvPr/>
+      </p:nvGrpSpPr>
+      <p:grpSpPr>
+        <a:xfrm>
+          <a:off x="0" y="0"/>
+          <a:ext cx="0" cy="0"/>
+          <a:chOff x="0" y="0"/>
+          <a:chExt cx="0" cy="0"/>
+        </a:xfrm>
+      </p:grpSpPr>
+      <p:sp>
+        <p:nvSpPr>
+          <p:cNvPr id="2" name="Slide Image Placeholder 1"/>
+          <p:cNvSpPr>
+            <a:spLocks noGrp="1" noRot="1" noChangeAspect="1"/>
+          </p:cNvSpPr>
+          <p:nvPr>
+            <p:ph type="sldImg"/>
+          </p:nvPr>
+        </p:nvSpPr>
+        <p:spPr/>
+      </p:sp>
+      <p:sp>
+        <p:nvSpPr>
+          <p:cNvPr id="3" name="Notes Placeholder 2"/>
+          <p:cNvSpPr>
+            <a:spLocks noGrp="1"/>
+          </p:cNvSpPr>
+          <p:nvPr>
+            <p:ph type="body" idx="1"/>
+          </p:nvPr>
+        </p:nvSpPr>
+        <p:spPr/>
+        <p:txBody>
+          <a:bodyPr/>
+          <a:lstStyle/>
+          <a:p>
+            <a:r>
+              <a:rPr lang="en-US"/>
+              <a:t>&gt;Concepte legate de diverse pattern-uri arhitecturale (Onion, MVC) sau repository pattern</a:t>
+            </a:r>
+          </a:p>
+          <a:p>
+            <a:r>
+              <a:rPr lang="en-US"/>
+              <a:t>&gt;</a:t>
+            </a:r>
+            <a:r>
+              <a:rPr lang="ro-RO"/>
+              <a:t>Tehnologiile aprofundate: </a:t>
+            </a:r>
+          </a:p>
+          <a:p>
+            <a:r>
+              <a:rPr lang="ro-RO"/>
+              <a:t>	</a:t>
+            </a:r>
+            <a:r>
+              <a:rPr lang="en-US"/>
+              <a:t>&gt;</a:t>
+            </a:r>
+            <a:r>
+              <a:rPr lang="ro-RO"/>
+              <a:t>ușurința folosirii funcționalităților oferite de .NET framework</a:t>
+            </a:r>
+            <a:endParaRPr lang="en-US"/>
+          </a:p>
+          <a:p>
+            <a:r>
+              <a:rPr lang="en-US"/>
+              <a:t>	&gt;</a:t>
+            </a:r>
+            <a:r>
+              <a:rPr lang="ro-RO"/>
+              <a:t>o mai bună înțelegere a elementelor de pe front, dar și a limbajului JavaScript</a:t>
+            </a:r>
+            <a:endParaRPr lang="en-US"/>
+          </a:p>
+        </p:txBody>
+      </p:sp>
+      <p:sp>
+        <p:nvSpPr>
+          <p:cNvPr id="4" name="Slide Number Placeholder 3"/>
+          <p:cNvSpPr>
+            <a:spLocks noGrp="1"/>
+          </p:cNvSpPr>
+          <p:nvPr>
+            <p:ph type="sldNum" sz="quarter" idx="10"/>
+          </p:nvPr>
+        </p:nvSpPr>
+        <p:spPr/>
+        <p:txBody>
+          <a:bodyPr/>
+          <a:lstStyle/>
+          <a:p>
+            <a:fld id="{05500ECC-6B4B-41C2-8885-7ACAF0714D2D}" type="slidenum">
+              <a:rPr lang="en-US" smtClean="0"/>
+              <a:t>11</a:t>
+            </a:fld>
+            <a:endParaRPr lang="en-US"/>
+          </a:p>
+        </p:txBody>
+      </p:sp>
+    </p:spTree>
+    <p:extLst>
+      <p:ext uri="{BB962C8B-B14F-4D97-AF65-F5344CB8AC3E}">
+        <p14:creationId xmlns:p14="http://schemas.microsoft.com/office/powerpoint/2010/main" val="625813765"/>
+      </p:ext>
+    </p:extLst>
+  </p:cSld>
+  <p:clrMapOvr>
+    <a:masterClrMapping/>
+  </p:clrMapOvr>
+</p:notes>
 </file>
 
 <file path=ppt/slideLayouts/slideLayout1.xml><?xml version="1.0" encoding="utf-8"?>
@@ -6001,6 +7299,455 @@
   <p:clrMapOvr>
     <a:masterClrMapping/>
   </p:clrMapOvr>
+  <mc:AlternateContent xmlns:mc="http://schemas.openxmlformats.org/markup-compatibility/2006">
+    <mc:Choice xmlns:p14="http://schemas.microsoft.com/office/powerpoint/2010/main" Requires="p14">
+      <p:transition spd="slow" p14:dur="3400">
+        <p14:reveal/>
+      </p:transition>
+    </mc:Choice>
+    <mc:Fallback>
+      <p:transition spd="slow">
+        <p:fade/>
+      </p:transition>
+    </mc:Fallback>
+  </mc:AlternateContent>
+</p:sld>
+</file>
+
+<file path=ppt/slides/slide10.xml><?xml version="1.0" encoding="utf-8"?>
+<p:sld xmlns:a="http://schemas.openxmlformats.org/drawingml/2006/main" xmlns:r="http://schemas.openxmlformats.org/officeDocument/2006/relationships" xmlns:p="http://schemas.openxmlformats.org/presentationml/2006/main">
+  <p:cSld>
+    <p:spTree>
+      <p:nvGrpSpPr>
+        <p:cNvPr id="1" name=""/>
+        <p:cNvGrpSpPr/>
+        <p:nvPr/>
+      </p:nvGrpSpPr>
+      <p:grpSpPr>
+        <a:xfrm>
+          <a:off x="0" y="0"/>
+          <a:ext cx="0" cy="0"/>
+          <a:chOff x="0" y="0"/>
+          <a:chExt cx="0" cy="0"/>
+        </a:xfrm>
+      </p:grpSpPr>
+      <p:sp>
+        <p:nvSpPr>
+          <p:cNvPr id="2" name="Titlu 1">
+            <a:extLst>
+              <a:ext uri="{FF2B5EF4-FFF2-40B4-BE49-F238E27FC236}">
+                <a16:creationId xmlns:a16="http://schemas.microsoft.com/office/drawing/2014/main" id="{895EE26D-EA47-4C0F-859C-6211E9F98674}"/>
+              </a:ext>
+            </a:extLst>
+          </p:cNvPr>
+          <p:cNvSpPr>
+            <a:spLocks noGrp="1"/>
+          </p:cNvSpPr>
+          <p:nvPr>
+            <p:ph type="title"/>
+          </p:nvPr>
+        </p:nvSpPr>
+        <p:spPr/>
+        <p:txBody>
+          <a:bodyPr/>
+          <a:lstStyle/>
+          <a:p>
+            <a:pPr algn="ctr"/>
+            <a:r>
+              <a:rPr lang="en-US" b="1">
+                <a:latin typeface="Palatino Linotype" panose="02040502050505030304" pitchFamily="18" charset="0"/>
+              </a:rPr>
+              <a:t>Demo</a:t>
+            </a:r>
+          </a:p>
+        </p:txBody>
+      </p:sp>
+      <p:pic>
+        <p:nvPicPr>
+          <p:cNvPr id="7" name="Content Placeholder 6">
+            <a:extLst>
+              <a:ext uri="{FF2B5EF4-FFF2-40B4-BE49-F238E27FC236}">
+                <a16:creationId xmlns:a16="http://schemas.microsoft.com/office/drawing/2014/main" id="{E478D1FB-0A4C-45BA-BDCB-350F71ABB9E0}"/>
+              </a:ext>
+            </a:extLst>
+          </p:cNvPr>
+          <p:cNvPicPr>
+            <a:picLocks noGrp="1" noChangeAspect="1"/>
+          </p:cNvPicPr>
+          <p:nvPr>
+            <p:ph sz="half" idx="2"/>
+          </p:nvPr>
+        </p:nvPicPr>
+        <p:blipFill>
+          <a:blip r:embed="rId3"/>
+          <a:stretch>
+            <a:fillRect/>
+          </a:stretch>
+        </p:blipFill>
+        <p:spPr>
+          <a:xfrm>
+            <a:off x="1295403" y="3697958"/>
+            <a:ext cx="2690671" cy="2235693"/>
+          </a:xfrm>
+          <a:prstGeom prst="rect">
+            <a:avLst/>
+          </a:prstGeom>
+        </p:spPr>
+      </p:pic>
+      <p:pic>
+        <p:nvPicPr>
+          <p:cNvPr id="8" name="Content Placeholder 7">
+            <a:extLst>
+              <a:ext uri="{FF2B5EF4-FFF2-40B4-BE49-F238E27FC236}">
+                <a16:creationId xmlns:a16="http://schemas.microsoft.com/office/drawing/2014/main" id="{45C7C4F9-28D0-4AD8-89D8-3992A1E737E5}"/>
+              </a:ext>
+            </a:extLst>
+          </p:cNvPr>
+          <p:cNvPicPr>
+            <a:picLocks noGrp="1" noChangeAspect="1"/>
+          </p:cNvPicPr>
+          <p:nvPr>
+            <p:ph sz="quarter" idx="4"/>
+          </p:nvPr>
+        </p:nvPicPr>
+        <p:blipFill>
+          <a:blip r:embed="rId4"/>
+          <a:stretch>
+            <a:fillRect/>
+          </a:stretch>
+        </p:blipFill>
+        <p:spPr>
+          <a:xfrm>
+            <a:off x="8205928" y="3784459"/>
+            <a:ext cx="2747045" cy="2272453"/>
+          </a:xfrm>
+          <a:prstGeom prst="rect">
+            <a:avLst/>
+          </a:prstGeom>
+        </p:spPr>
+      </p:pic>
+      <p:pic>
+        <p:nvPicPr>
+          <p:cNvPr id="9" name="Picture 8">
+            <a:extLst>
+              <a:ext uri="{FF2B5EF4-FFF2-40B4-BE49-F238E27FC236}">
+                <a16:creationId xmlns:a16="http://schemas.microsoft.com/office/drawing/2014/main" id="{02CEDAB6-3CEF-432D-8B83-C18D0A1F687C}"/>
+              </a:ext>
+            </a:extLst>
+          </p:cNvPr>
+          <p:cNvPicPr>
+            <a:picLocks noChangeAspect="1"/>
+          </p:cNvPicPr>
+          <p:nvPr/>
+        </p:nvPicPr>
+        <p:blipFill>
+          <a:blip r:embed="rId5"/>
+          <a:stretch>
+            <a:fillRect/>
+          </a:stretch>
+        </p:blipFill>
+        <p:spPr>
+          <a:xfrm>
+            <a:off x="4722477" y="2711203"/>
+            <a:ext cx="2747045" cy="1973509"/>
+          </a:xfrm>
+          <a:prstGeom prst="rect">
+            <a:avLst/>
+          </a:prstGeom>
+          <a:ln>
+            <a:solidFill>
+              <a:schemeClr val="tx1"/>
+            </a:solidFill>
+          </a:ln>
+        </p:spPr>
+      </p:pic>
+    </p:spTree>
+    <p:extLst>
+      <p:ext uri="{BB962C8B-B14F-4D97-AF65-F5344CB8AC3E}">
+        <p14:creationId xmlns:p14="http://schemas.microsoft.com/office/powerpoint/2010/main" val="2947156239"/>
+      </p:ext>
+    </p:extLst>
+  </p:cSld>
+  <p:clrMapOvr>
+    <a:masterClrMapping/>
+  </p:clrMapOvr>
+  <mc:AlternateContent xmlns:mc="http://schemas.openxmlformats.org/markup-compatibility/2006">
+    <mc:Choice xmlns:p14="http://schemas.microsoft.com/office/powerpoint/2010/main" Requires="p14">
+      <p:transition spd="slow" p14:dur="3400">
+        <p14:reveal/>
+      </p:transition>
+    </mc:Choice>
+    <mc:Fallback>
+      <p:transition spd="slow">
+        <p:fade/>
+      </p:transition>
+    </mc:Fallback>
+  </mc:AlternateContent>
+</p:sld>
+</file>
+
+<file path=ppt/slides/slide11.xml><?xml version="1.0" encoding="utf-8"?>
+<p:sld xmlns:a="http://schemas.openxmlformats.org/drawingml/2006/main" xmlns:r="http://schemas.openxmlformats.org/officeDocument/2006/relationships" xmlns:p="http://schemas.openxmlformats.org/presentationml/2006/main">
+  <p:cSld>
+    <p:spTree>
+      <p:nvGrpSpPr>
+        <p:cNvPr id="1" name=""/>
+        <p:cNvGrpSpPr/>
+        <p:nvPr/>
+      </p:nvGrpSpPr>
+      <p:grpSpPr>
+        <a:xfrm>
+          <a:off x="0" y="0"/>
+          <a:ext cx="0" cy="0"/>
+          <a:chOff x="0" y="0"/>
+          <a:chExt cx="0" cy="0"/>
+        </a:xfrm>
+      </p:grpSpPr>
+      <p:sp>
+        <p:nvSpPr>
+          <p:cNvPr id="2" name="Titlu 1">
+            <a:extLst>
+              <a:ext uri="{FF2B5EF4-FFF2-40B4-BE49-F238E27FC236}">
+                <a16:creationId xmlns:a16="http://schemas.microsoft.com/office/drawing/2014/main" id="{B787117F-C480-4CA6-B7C7-0CE94FDDAB15}"/>
+              </a:ext>
+            </a:extLst>
+          </p:cNvPr>
+          <p:cNvSpPr>
+            <a:spLocks noGrp="1"/>
+          </p:cNvSpPr>
+          <p:nvPr>
+            <p:ph type="title"/>
+          </p:nvPr>
+        </p:nvSpPr>
+        <p:spPr/>
+        <p:txBody>
+          <a:bodyPr/>
+          <a:lstStyle/>
+          <a:p>
+            <a:pPr algn="ctr"/>
+            <a:r>
+              <a:rPr lang="en-US" b="1" err="1">
+                <a:latin typeface="Palatino Linotype" panose="02040502050505030304" pitchFamily="18" charset="0"/>
+              </a:rPr>
+              <a:t>Concluzii</a:t>
+            </a:r>
+            <a:endParaRPr lang="en-US" b="1">
+              <a:latin typeface="Palatino Linotype" panose="02040502050505030304" pitchFamily="18" charset="0"/>
+            </a:endParaRPr>
+          </a:p>
+        </p:txBody>
+      </p:sp>
+      <p:sp>
+        <p:nvSpPr>
+          <p:cNvPr id="3" name="Substituent conținut 2">
+            <a:extLst>
+              <a:ext uri="{FF2B5EF4-FFF2-40B4-BE49-F238E27FC236}">
+                <a16:creationId xmlns:a16="http://schemas.microsoft.com/office/drawing/2014/main" id="{BDF5B156-9D7C-49EC-8FC2-13520FC941B2}"/>
+              </a:ext>
+            </a:extLst>
+          </p:cNvPr>
+          <p:cNvSpPr>
+            <a:spLocks noGrp="1"/>
+          </p:cNvSpPr>
+          <p:nvPr>
+            <p:ph idx="1"/>
+          </p:nvPr>
+        </p:nvSpPr>
+        <p:spPr/>
+        <p:txBody>
+          <a:bodyPr/>
+          <a:lstStyle/>
+          <a:p>
+            <a:pPr>
+              <a:buSzPct val="200000"/>
+              <a:buFont typeface="Gabriola" panose="04040605051002020D02" pitchFamily="82" charset="0"/>
+              <a:buChar char="›"/>
+            </a:pPr>
+            <a:r>
+              <a:rPr lang="en-US" sz="2800" b="1">
+                <a:latin typeface="Gabriola" panose="04040605051002020D02" pitchFamily="82" charset="0"/>
+              </a:rPr>
+              <a:t>Scopul aplica</a:t>
+            </a:r>
+            <a:r>
+              <a:rPr lang="ro-RO" sz="2800" b="1">
+                <a:latin typeface="Gabriola" panose="04040605051002020D02" pitchFamily="82" charset="0"/>
+              </a:rPr>
+              <a:t>ției </a:t>
+            </a:r>
+            <a:r>
+              <a:rPr lang="ro-RO" sz="2800">
+                <a:latin typeface="Gabriola" panose="04040605051002020D02" pitchFamily="82" charset="0"/>
+              </a:rPr>
+              <a:t>– </a:t>
+            </a:r>
+            <a:r>
+              <a:rPr lang="en-US" sz="2800">
+                <a:latin typeface="Gabriola" panose="04040605051002020D02" pitchFamily="82" charset="0"/>
+              </a:rPr>
+              <a:t>un mediu pl</a:t>
+            </a:r>
+            <a:r>
+              <a:rPr lang="ro-RO" sz="2800">
+                <a:latin typeface="Gabriola" panose="04040605051002020D02" pitchFamily="82" charset="0"/>
+              </a:rPr>
+              <a:t>ăcut ce oferă cititorilor oportunități pe diverse planuri</a:t>
+            </a:r>
+          </a:p>
+          <a:p>
+            <a:pPr>
+              <a:buSzPct val="200000"/>
+              <a:buFont typeface="Gabriola" panose="04040605051002020D02" pitchFamily="82" charset="0"/>
+              <a:buChar char="›"/>
+            </a:pPr>
+            <a:r>
+              <a:rPr lang="en-US" sz="2800" b="1">
+                <a:latin typeface="Gabriola" panose="04040605051002020D02" pitchFamily="82" charset="0"/>
+              </a:rPr>
+              <a:t>Evolu</a:t>
+            </a:r>
+            <a:r>
+              <a:rPr lang="ro-RO" sz="2800" b="1">
+                <a:latin typeface="Gabriola" panose="04040605051002020D02" pitchFamily="82" charset="0"/>
+              </a:rPr>
+              <a:t>ția ideilor </a:t>
+            </a:r>
+            <a:r>
+              <a:rPr lang="ro-RO" sz="2800">
+                <a:latin typeface="Gabriola" panose="04040605051002020D02" pitchFamily="82" charset="0"/>
+              </a:rPr>
+              <a:t>– dezvoltarea sau apariția unor funcționalități pe parcursul realizării aplicației</a:t>
+            </a:r>
+          </a:p>
+          <a:p>
+            <a:pPr>
+              <a:buSzPct val="200000"/>
+              <a:buFont typeface="Gabriola" panose="04040605051002020D02" pitchFamily="82" charset="0"/>
+              <a:buChar char="›"/>
+            </a:pPr>
+            <a:r>
+              <a:rPr lang="ro-RO" sz="2800" b="1">
+                <a:latin typeface="Gabriola" panose="04040605051002020D02" pitchFamily="82" charset="0"/>
+              </a:rPr>
+              <a:t>Experiența dobândită </a:t>
+            </a:r>
+            <a:r>
+              <a:rPr lang="ro-RO" sz="2800">
+                <a:latin typeface="Gabriola" panose="04040605051002020D02" pitchFamily="82" charset="0"/>
+              </a:rPr>
+              <a:t>– pe plan tehnic, prin înțelegerea unor concepte sau tehnologii</a:t>
+            </a:r>
+          </a:p>
+          <a:p>
+            <a:endParaRPr lang="en-US"/>
+          </a:p>
+        </p:txBody>
+      </p:sp>
+    </p:spTree>
+    <p:extLst>
+      <p:ext uri="{BB962C8B-B14F-4D97-AF65-F5344CB8AC3E}">
+        <p14:creationId xmlns:p14="http://schemas.microsoft.com/office/powerpoint/2010/main" val="3514780396"/>
+      </p:ext>
+    </p:extLst>
+  </p:cSld>
+  <p:clrMapOvr>
+    <a:masterClrMapping/>
+  </p:clrMapOvr>
+  <mc:AlternateContent xmlns:mc="http://schemas.openxmlformats.org/markup-compatibility/2006">
+    <mc:Choice xmlns:p15="http://schemas.microsoft.com/office/powerpoint/2012/main" Requires="p15">
+      <p:transition xmlns:p14="http://schemas.microsoft.com/office/powerpoint/2010/main" spd="slow" p14:dur="1250">
+        <p15:prstTrans prst="peelOff"/>
+      </p:transition>
+    </mc:Choice>
+    <mc:Fallback>
+      <p:transition spd="slow">
+        <p:fade/>
+      </p:transition>
+    </mc:Fallback>
+  </mc:AlternateContent>
+</p:sld>
+</file>
+
+<file path=ppt/slides/slide12.xml><?xml version="1.0" encoding="utf-8"?>
+<p:sld xmlns:a="http://schemas.openxmlformats.org/drawingml/2006/main" xmlns:r="http://schemas.openxmlformats.org/officeDocument/2006/relationships" xmlns:p="http://schemas.openxmlformats.org/presentationml/2006/main">
+  <p:cSld>
+    <p:spTree>
+      <p:nvGrpSpPr>
+        <p:cNvPr id="1" name=""/>
+        <p:cNvGrpSpPr/>
+        <p:nvPr/>
+      </p:nvGrpSpPr>
+      <p:grpSpPr>
+        <a:xfrm>
+          <a:off x="0" y="0"/>
+          <a:ext cx="0" cy="0"/>
+          <a:chOff x="0" y="0"/>
+          <a:chExt cx="0" cy="0"/>
+        </a:xfrm>
+      </p:grpSpPr>
+      <p:sp>
+        <p:nvSpPr>
+          <p:cNvPr id="4" name="Titlu 3">
+            <a:extLst>
+              <a:ext uri="{FF2B5EF4-FFF2-40B4-BE49-F238E27FC236}">
+                <a16:creationId xmlns:a16="http://schemas.microsoft.com/office/drawing/2014/main" id="{BAAF27E7-85F6-4CF1-9E36-17BE1F8FD934}"/>
+              </a:ext>
+            </a:extLst>
+          </p:cNvPr>
+          <p:cNvSpPr>
+            <a:spLocks noGrp="1"/>
+          </p:cNvSpPr>
+          <p:nvPr>
+            <p:ph type="title"/>
+          </p:nvPr>
+        </p:nvSpPr>
+        <p:spPr>
+          <a:xfrm>
+            <a:off x="1291166" y="2343847"/>
+            <a:ext cx="9609668" cy="1468800"/>
+          </a:xfrm>
+        </p:spPr>
+        <p:txBody>
+          <a:bodyPr>
+            <a:normAutofit/>
+          </a:bodyPr>
+          <a:lstStyle/>
+          <a:p>
+            <a:pPr algn="ctr"/>
+            <a:r>
+              <a:rPr lang="ro-RO" sz="4400" b="1">
+                <a:latin typeface="Palatino Linotype" panose="02040502050505030304" pitchFamily="18" charset="0"/>
+              </a:rPr>
+              <a:t>Vă mulțumesc!</a:t>
+            </a:r>
+            <a:endParaRPr lang="en-US" sz="4400" b="1">
+              <a:latin typeface="Palatino Linotype" panose="02040502050505030304" pitchFamily="18" charset="0"/>
+            </a:endParaRPr>
+          </a:p>
+        </p:txBody>
+      </p:sp>
+    </p:spTree>
+    <p:extLst>
+      <p:ext uri="{BB962C8B-B14F-4D97-AF65-F5344CB8AC3E}">
+        <p14:creationId xmlns:p14="http://schemas.microsoft.com/office/powerpoint/2010/main" val="384886750"/>
+      </p:ext>
+    </p:extLst>
+  </p:cSld>
+  <p:clrMapOvr>
+    <a:masterClrMapping/>
+  </p:clrMapOvr>
+  <mc:AlternateContent xmlns:mc="http://schemas.openxmlformats.org/markup-compatibility/2006">
+    <mc:Choice xmlns:p14="http://schemas.microsoft.com/office/powerpoint/2010/main" Requires="p14">
+      <p:transition spd="slow" p14:dur="3400">
+        <p14:reveal/>
+      </p:transition>
+    </mc:Choice>
+    <mc:Fallback>
+      <p:transition spd="slow">
+        <p:fade/>
+      </p:transition>
+    </mc:Fallback>
+  </mc:AlternateContent>
 </p:sld>
 </file>
 
@@ -6218,6 +7965,18 @@
   <p:clrMapOvr>
     <a:masterClrMapping/>
   </p:clrMapOvr>
+  <mc:AlternateContent xmlns:mc="http://schemas.openxmlformats.org/markup-compatibility/2006">
+    <mc:Choice xmlns:p159="http://schemas.microsoft.com/office/powerpoint/2015/09/main" Requires="p159">
+      <p:transition xmlns:p14="http://schemas.microsoft.com/office/powerpoint/2010/main" spd="slow" p14:dur="2000">
+        <p159:morph option="byObject"/>
+      </p:transition>
+    </mc:Choice>
+    <mc:Fallback>
+      <p:transition spd="slow">
+        <p:fade/>
+      </p:transition>
+    </mc:Fallback>
+  </mc:AlternateContent>
 </p:sld>
 </file>
 
@@ -6293,11 +8052,32 @@
           <a:bodyPr/>
           <a:lstStyle/>
           <a:p>
-            <a:r>
-              <a:rPr lang="ro-RO"/>
-              <a:t>Aplicație realizată pentru </a:t>
-            </a:r>
-            <a:endParaRPr lang="en-US"/>
+            <a:pPr>
+              <a:buSzPct val="200000"/>
+              <a:buFont typeface="Gabriola" panose="04040605051002020D02" pitchFamily="82" charset="0"/>
+              <a:buChar char="›"/>
+            </a:pPr>
+            <a:r>
+              <a:rPr lang="ro-RO" sz="2800">
+                <a:latin typeface="Gabriola" panose="04040605051002020D02" pitchFamily="82" charset="0"/>
+              </a:rPr>
+              <a:t>A</a:t>
+            </a:r>
+            <a:r>
+              <a:rPr lang="en-US" sz="2800">
+                <a:latin typeface="Gabriola" panose="04040605051002020D02" pitchFamily="82" charset="0"/>
+              </a:rPr>
+              <a:t>plica</a:t>
+            </a:r>
+            <a:r>
+              <a:rPr lang="ro-RO" sz="2800">
+                <a:latin typeface="Gabriola" panose="04040605051002020D02" pitchFamily="82" charset="0"/>
+              </a:rPr>
+              <a:t>ție dedicată gestionării, citirii și exprimării opiniei în legătură cu cărțile citite</a:t>
+            </a:r>
+          </a:p>
+          <a:p>
+            <a:endParaRPr lang="ro-RO" i="1"/>
           </a:p>
         </p:txBody>
       </p:sp>
@@ -6311,6 +8091,18 @@
   <p:clrMapOvr>
     <a:masterClrMapping/>
   </p:clrMapOvr>
+  <mc:AlternateContent xmlns:mc="http://schemas.openxmlformats.org/markup-compatibility/2006">
+    <mc:Choice xmlns:p15="http://schemas.microsoft.com/office/powerpoint/2012/main" Requires="p15">
+      <p:transition xmlns:p14="http://schemas.microsoft.com/office/powerpoint/2010/main" spd="slow" p14:dur="1250">
+        <p15:prstTrans prst="pageCurlDouble"/>
+      </p:transition>
+    </mc:Choice>
+    <mc:Fallback>
+      <p:transition spd="slow">
+        <p:fade/>
+      </p:transition>
+    </mc:Fallback>
+  </mc:AlternateContent>
 </p:sld>
 </file>
 
@@ -6333,10 +8125,10 @@
       </p:grpSpPr>
       <p:sp>
         <p:nvSpPr>
-          <p:cNvPr id="2" name="Titlu 1">
+          <p:cNvPr id="2" name="Title 1">
             <a:extLst>
               <a:ext uri="{FF2B5EF4-FFF2-40B4-BE49-F238E27FC236}">
-                <a16:creationId xmlns:a16="http://schemas.microsoft.com/office/drawing/2014/main" id="{5944F6A4-E61E-4D26-8946-1F1D3881C05C}"/>
+                <a16:creationId xmlns:a16="http://schemas.microsoft.com/office/drawing/2014/main" id="{773F2DFE-2CCF-4423-BDC0-3280AA238CEA}"/>
               </a:ext>
             </a:extLst>
           </p:cNvPr>
@@ -6352,25 +8144,22 @@
           <a:bodyPr/>
           <a:lstStyle/>
           <a:p>
-            <a:pPr algn="ctr"/>
             <a:r>
               <a:rPr lang="ro-RO" b="1">
                 <a:latin typeface="Palatino Linotype" panose="02040502050505030304" pitchFamily="18" charset="0"/>
               </a:rPr>
-              <a:t>Contribuții</a:t>
-            </a:r>
-            <a:endParaRPr lang="en-US" b="1">
-              <a:latin typeface="Palatino Linotype" panose="02040502050505030304" pitchFamily="18" charset="0"/>
-            </a:endParaRPr>
-          </a:p>
-        </p:txBody>
-      </p:sp>
-      <p:sp>
-        <p:nvSpPr>
-          <p:cNvPr id="3" name="Substituent conținut 2">
+              <a:t>Tema și motivația lucrării</a:t>
+            </a:r>
+            <a:endParaRPr lang="en-US"/>
+          </a:p>
+        </p:txBody>
+      </p:sp>
+      <p:sp>
+        <p:nvSpPr>
+          <p:cNvPr id="3" name="Content Placeholder 2">
             <a:extLst>
               <a:ext uri="{FF2B5EF4-FFF2-40B4-BE49-F238E27FC236}">
-                <a16:creationId xmlns:a16="http://schemas.microsoft.com/office/drawing/2014/main" id="{B564887E-F43F-4446-BC59-166C634BBFE3}"/>
+                <a16:creationId xmlns:a16="http://schemas.microsoft.com/office/drawing/2014/main" id="{E9305ABE-E93C-445F-9D24-C67514662D19}"/>
               </a:ext>
             </a:extLst>
           </p:cNvPr>
@@ -6383,23 +8172,66 @@
         </p:nvSpPr>
         <p:spPr/>
         <p:txBody>
-          <a:bodyPr/>
-          <a:lstStyle/>
-          <a:p>
-            <a:endParaRPr lang="en-US"/>
+          <a:bodyPr>
+            <a:normAutofit/>
+          </a:bodyPr>
+          <a:lstStyle/>
+          <a:p>
+            <a:pPr>
+              <a:buSzPct val="200000"/>
+              <a:buFont typeface="Gabriola" panose="04040605051002020D02" pitchFamily="82" charset="0"/>
+              <a:buChar char="›"/>
+            </a:pPr>
+            <a:r>
+              <a:rPr lang="ro-RO" sz="2800">
+                <a:latin typeface="Gabriola" panose="04040605051002020D02" pitchFamily="82" charset="0"/>
+              </a:rPr>
+              <a:t>A</a:t>
+            </a:r>
+            <a:r>
+              <a:rPr lang="en-US" sz="2800">
+                <a:latin typeface="Gabriola" panose="04040605051002020D02" pitchFamily="82" charset="0"/>
+              </a:rPr>
+              <a:t>plica</a:t>
+            </a:r>
+            <a:r>
+              <a:rPr lang="ro-RO" sz="2800">
+                <a:latin typeface="Gabriola" panose="04040605051002020D02" pitchFamily="82" charset="0"/>
+              </a:rPr>
+              <a:t>ție dedicată gestionării, citirii și exprimării opiniei în legătură cu cărțile citite</a:t>
+            </a:r>
+          </a:p>
+          <a:p>
+            <a:pPr>
+              <a:buSzPct val="200000"/>
+              <a:buFont typeface="Gabriola" panose="04040605051002020D02" pitchFamily="82" charset="0"/>
+              <a:buChar char="›"/>
+            </a:pPr>
+            <a:r>
+              <a:rPr lang="ro-RO" sz="2800">
+                <a:latin typeface="Gabriola" panose="04040605051002020D02" pitchFamily="82" charset="0"/>
+              </a:rPr>
+              <a:t>Sistem de recomandări – în mod direct, prin comunitate</a:t>
+            </a:r>
+            <a:endParaRPr lang="en-US" sz="2800">
+              <a:latin typeface="Gabriola" panose="04040605051002020D02" pitchFamily="82" charset="0"/>
+            </a:endParaRPr>
           </a:p>
         </p:txBody>
       </p:sp>
     </p:spTree>
     <p:extLst>
       <p:ext uri="{BB962C8B-B14F-4D97-AF65-F5344CB8AC3E}">
-        <p14:creationId xmlns:p14="http://schemas.microsoft.com/office/powerpoint/2010/main" val="321340602"/>
+        <p14:creationId xmlns:p14="http://schemas.microsoft.com/office/powerpoint/2010/main" val="4038772312"/>
       </p:ext>
     </p:extLst>
   </p:cSld>
   <p:clrMapOvr>
     <a:masterClrMapping/>
   </p:clrMapOvr>
+  <p:transition spd="slow">
+    <p:wipe/>
+  </p:transition>
 </p:sld>
 </file>
 
@@ -6422,10 +8254,10 @@
       </p:grpSpPr>
       <p:sp>
         <p:nvSpPr>
-          <p:cNvPr id="2" name="Titlu 1">
+          <p:cNvPr id="2" name="Title 1">
             <a:extLst>
               <a:ext uri="{FF2B5EF4-FFF2-40B4-BE49-F238E27FC236}">
-                <a16:creationId xmlns:a16="http://schemas.microsoft.com/office/drawing/2014/main" id="{1E430F7C-367C-4232-9B3F-237E35CF50F0}"/>
+                <a16:creationId xmlns:a16="http://schemas.microsoft.com/office/drawing/2014/main" id="{635776C4-CE4D-4276-A9BC-2B235FA38FDD}"/>
               </a:ext>
             </a:extLst>
           </p:cNvPr>
@@ -6441,31 +8273,22 @@
           <a:bodyPr/>
           <a:lstStyle/>
           <a:p>
-            <a:pPr algn="ctr"/>
             <a:r>
               <a:rPr lang="ro-RO" b="1">
                 <a:latin typeface="Palatino Linotype" panose="02040502050505030304" pitchFamily="18" charset="0"/>
               </a:rPr>
-              <a:t>Tehnologiile </a:t>
-            </a:r>
-            <a:r>
-              <a:rPr lang="en-US" b="1" err="1">
-                <a:latin typeface="Palatino Linotype" panose="02040502050505030304" pitchFamily="18" charset="0"/>
-              </a:rPr>
-              <a:t>utilizate</a:t>
-            </a:r>
-            <a:endParaRPr lang="en-US" b="1">
-              <a:latin typeface="Palatino Linotype" panose="02040502050505030304" pitchFamily="18" charset="0"/>
-            </a:endParaRPr>
-          </a:p>
-        </p:txBody>
-      </p:sp>
-      <p:sp>
-        <p:nvSpPr>
-          <p:cNvPr id="3" name="Substituent conținut 2">
+              <a:t>Tema și motivația lucrării</a:t>
+            </a:r>
+            <a:endParaRPr lang="en-US"/>
+          </a:p>
+        </p:txBody>
+      </p:sp>
+      <p:sp>
+        <p:nvSpPr>
+          <p:cNvPr id="3" name="Content Placeholder 2">
             <a:extLst>
               <a:ext uri="{FF2B5EF4-FFF2-40B4-BE49-F238E27FC236}">
-                <a16:creationId xmlns:a16="http://schemas.microsoft.com/office/drawing/2014/main" id="{75A99387-AE5F-45F5-8C9A-F0DB4C914995}"/>
+                <a16:creationId xmlns:a16="http://schemas.microsoft.com/office/drawing/2014/main" id="{0A81F117-ED56-44B7-9102-B2122522FBC3}"/>
               </a:ext>
             </a:extLst>
           </p:cNvPr>
@@ -6481,20 +8304,74 @@
           <a:bodyPr/>
           <a:lstStyle/>
           <a:p>
-            <a:endParaRPr lang="en-US"/>
+            <a:pPr>
+              <a:buSzPct val="200000"/>
+              <a:buFont typeface="Gabriola" panose="04040605051002020D02" pitchFamily="82" charset="0"/>
+              <a:buChar char="›"/>
+            </a:pPr>
+            <a:r>
+              <a:rPr lang="ro-RO" sz="2800">
+                <a:latin typeface="Gabriola" panose="04040605051002020D02" pitchFamily="82" charset="0"/>
+              </a:rPr>
+              <a:t>A</a:t>
+            </a:r>
+            <a:r>
+              <a:rPr lang="en-US" sz="2800">
+                <a:latin typeface="Gabriola" panose="04040605051002020D02" pitchFamily="82" charset="0"/>
+              </a:rPr>
+              <a:t>plica</a:t>
+            </a:r>
+            <a:r>
+              <a:rPr lang="ro-RO" sz="2800">
+                <a:latin typeface="Gabriola" panose="04040605051002020D02" pitchFamily="82" charset="0"/>
+              </a:rPr>
+              <a:t>ție dedicată gestionării, citirii și exprimării opiniei în legătură cu cărțile citite</a:t>
+            </a:r>
+          </a:p>
+          <a:p>
+            <a:pPr>
+              <a:buSzPct val="200000"/>
+              <a:buFont typeface="Gabriola" panose="04040605051002020D02" pitchFamily="82" charset="0"/>
+              <a:buChar char="›"/>
+            </a:pPr>
+            <a:r>
+              <a:rPr lang="ro-RO" sz="2800">
+                <a:latin typeface="Gabriola" panose="04040605051002020D02" pitchFamily="82" charset="0"/>
+              </a:rPr>
+              <a:t>Sistem de recomandări – în mod direct, prin comunitate</a:t>
+            </a:r>
+          </a:p>
+          <a:p>
+            <a:pPr>
+              <a:buSzPct val="200000"/>
+              <a:buFont typeface="Gabriola" panose="04040605051002020D02" pitchFamily="82" charset="0"/>
+              <a:buChar char="›"/>
+            </a:pPr>
+            <a:r>
+              <a:rPr lang="ro-RO" sz="2800">
+                <a:latin typeface="Gabriola" panose="04040605051002020D02" pitchFamily="82" charset="0"/>
+              </a:rPr>
+              <a:t>Sistem de recomandări – în mod indirect, prin aplicație</a:t>
+            </a:r>
+            <a:endParaRPr lang="en-US" sz="2800">
+              <a:latin typeface="Gabriola" panose="04040605051002020D02" pitchFamily="82" charset="0"/>
+            </a:endParaRPr>
           </a:p>
         </p:txBody>
       </p:sp>
     </p:spTree>
     <p:extLst>
       <p:ext uri="{BB962C8B-B14F-4D97-AF65-F5344CB8AC3E}">
-        <p14:creationId xmlns:p14="http://schemas.microsoft.com/office/powerpoint/2010/main" val="2594655161"/>
+        <p14:creationId xmlns:p14="http://schemas.microsoft.com/office/powerpoint/2010/main" val="2726187520"/>
       </p:ext>
     </p:extLst>
   </p:cSld>
   <p:clrMapOvr>
     <a:masterClrMapping/>
   </p:clrMapOvr>
+  <p:transition spd="slow">
+    <p:wipe/>
+  </p:transition>
 </p:sld>
 </file>
 
@@ -6517,10 +8394,10 @@
       </p:grpSpPr>
       <p:sp>
         <p:nvSpPr>
-          <p:cNvPr id="2" name="Titlu 1">
+          <p:cNvPr id="2" name="Title 1">
             <a:extLst>
               <a:ext uri="{FF2B5EF4-FFF2-40B4-BE49-F238E27FC236}">
-                <a16:creationId xmlns:a16="http://schemas.microsoft.com/office/drawing/2014/main" id="{3300FC1D-3B33-496F-8D65-16A8D18CF5BE}"/>
+                <a16:creationId xmlns:a16="http://schemas.microsoft.com/office/drawing/2014/main" id="{2A6B6B52-EA57-47E5-AE46-FD1DF6E10B13}"/>
               </a:ext>
             </a:extLst>
           </p:cNvPr>
@@ -6536,37 +8413,22 @@
           <a:bodyPr/>
           <a:lstStyle/>
           <a:p>
-            <a:pPr algn="ctr"/>
-            <a:r>
-              <a:rPr lang="en-US" b="1" err="1">
+            <a:r>
+              <a:rPr lang="ro-RO" b="1">
                 <a:latin typeface="Palatino Linotype" panose="02040502050505030304" pitchFamily="18" charset="0"/>
               </a:rPr>
-              <a:t>Concepte</a:t>
-            </a:r>
-            <a:r>
-              <a:rPr lang="en-US" b="1">
-                <a:latin typeface="Palatino Linotype" panose="02040502050505030304" pitchFamily="18" charset="0"/>
-              </a:rPr>
-              <a:t> </a:t>
-            </a:r>
-            <a:r>
-              <a:rPr lang="en-US" b="1" err="1">
-                <a:latin typeface="Palatino Linotype" panose="02040502050505030304" pitchFamily="18" charset="0"/>
-              </a:rPr>
-              <a:t>abordate</a:t>
-            </a:r>
-            <a:endParaRPr lang="en-US" b="1">
-              <a:latin typeface="Palatino Linotype" panose="02040502050505030304" pitchFamily="18" charset="0"/>
-            </a:endParaRPr>
-          </a:p>
-        </p:txBody>
-      </p:sp>
-      <p:sp>
-        <p:nvSpPr>
-          <p:cNvPr id="3" name="Substituent conținut 2">
+              <a:t>Tema și motivația lucrării</a:t>
+            </a:r>
+            <a:endParaRPr lang="en-US"/>
+          </a:p>
+        </p:txBody>
+      </p:sp>
+      <p:sp>
+        <p:nvSpPr>
+          <p:cNvPr id="3" name="Content Placeholder 2">
             <a:extLst>
               <a:ext uri="{FF2B5EF4-FFF2-40B4-BE49-F238E27FC236}">
-                <a16:creationId xmlns:a16="http://schemas.microsoft.com/office/drawing/2014/main" id="{C0555C8A-FD4F-4B95-AB61-692E0F6DEFA3}"/>
+                <a16:creationId xmlns:a16="http://schemas.microsoft.com/office/drawing/2014/main" id="{5FFC4973-41DF-42AC-92EB-571CFAC968EF}"/>
               </a:ext>
             </a:extLst>
           </p:cNvPr>
@@ -6582,20 +8444,93 @@
           <a:bodyPr/>
           <a:lstStyle/>
           <a:p>
-            <a:endParaRPr lang="en-US"/>
+            <a:pPr>
+              <a:buSzPct val="200000"/>
+              <a:buFont typeface="Gabriola" panose="04040605051002020D02" pitchFamily="82" charset="0"/>
+              <a:buChar char="›"/>
+            </a:pPr>
+            <a:r>
+              <a:rPr lang="ro-RO" sz="2800">
+                <a:latin typeface="Gabriola" panose="04040605051002020D02" pitchFamily="82" charset="0"/>
+              </a:rPr>
+              <a:t>A</a:t>
+            </a:r>
+            <a:r>
+              <a:rPr lang="en-US" sz="2800">
+                <a:latin typeface="Gabriola" panose="04040605051002020D02" pitchFamily="82" charset="0"/>
+              </a:rPr>
+              <a:t>plica</a:t>
+            </a:r>
+            <a:r>
+              <a:rPr lang="ro-RO" sz="2800">
+                <a:latin typeface="Gabriola" panose="04040605051002020D02" pitchFamily="82" charset="0"/>
+              </a:rPr>
+              <a:t>ție dedicată gestionării, citirii și exprimării opiniei în legătură cu cărțile citite</a:t>
+            </a:r>
+          </a:p>
+          <a:p>
+            <a:pPr>
+              <a:buSzPct val="200000"/>
+              <a:buFont typeface="Gabriola" panose="04040605051002020D02" pitchFamily="82" charset="0"/>
+              <a:buChar char="›"/>
+            </a:pPr>
+            <a:r>
+              <a:rPr lang="ro-RO" sz="2800">
+                <a:latin typeface="Gabriola" panose="04040605051002020D02" pitchFamily="82" charset="0"/>
+              </a:rPr>
+              <a:t>Sistem de recomandări – în mod direct, prin comunitate</a:t>
+            </a:r>
+          </a:p>
+          <a:p>
+            <a:pPr>
+              <a:buSzPct val="200000"/>
+              <a:buFont typeface="Gabriola" panose="04040605051002020D02" pitchFamily="82" charset="0"/>
+              <a:buChar char="›"/>
+            </a:pPr>
+            <a:r>
+              <a:rPr lang="ro-RO" sz="2800">
+                <a:latin typeface="Gabriola" panose="04040605051002020D02" pitchFamily="82" charset="0"/>
+              </a:rPr>
+              <a:t>Sistem de recomandări – în mod indirect, prin aplicație</a:t>
+            </a:r>
+          </a:p>
+          <a:p>
+            <a:pPr>
+              <a:buSzPct val="200000"/>
+              <a:buFont typeface="Gabriola" panose="04040605051002020D02" pitchFamily="82" charset="0"/>
+              <a:buChar char="›"/>
+            </a:pPr>
+            <a:r>
+              <a:rPr lang="ro-RO" sz="2800" b="1">
+                <a:latin typeface="Gabriola" panose="04040605051002020D02" pitchFamily="82" charset="0"/>
+              </a:rPr>
+              <a:t>Motivație: </a:t>
+            </a:r>
+            <a:r>
+              <a:rPr lang="ro-RO" sz="2800">
+                <a:latin typeface="Gabriola" panose="04040605051002020D02" pitchFamily="82" charset="0"/>
+              </a:rPr>
+              <a:t>ușurarea procesului de citire și urmărire a progresului realizat, lipsa unui mecanism similar când vine vorba de gestionarea și citirea acestora</a:t>
+            </a:r>
+            <a:endParaRPr lang="en-US" sz="2800">
+              <a:latin typeface="Gabriola" panose="04040605051002020D02" pitchFamily="82" charset="0"/>
+            </a:endParaRPr>
           </a:p>
         </p:txBody>
       </p:sp>
     </p:spTree>
     <p:extLst>
       <p:ext uri="{BB962C8B-B14F-4D97-AF65-F5344CB8AC3E}">
-        <p14:creationId xmlns:p14="http://schemas.microsoft.com/office/powerpoint/2010/main" val="2355382316"/>
+        <p14:creationId xmlns:p14="http://schemas.microsoft.com/office/powerpoint/2010/main" val="92845536"/>
       </p:ext>
     </p:extLst>
   </p:cSld>
   <p:clrMapOvr>
     <a:masterClrMapping/>
   </p:clrMapOvr>
+  <p:transition spd="slow">
+    <p:wipe/>
+  </p:transition>
 </p:sld>
 </file>
 
@@ -6621,7 +8556,7 @@
           <p:cNvPr id="2" name="Titlu 1">
             <a:extLst>
               <a:ext uri="{FF2B5EF4-FFF2-40B4-BE49-F238E27FC236}">
-                <a16:creationId xmlns:a16="http://schemas.microsoft.com/office/drawing/2014/main" id="{895EE26D-EA47-4C0F-859C-6211E9F98674}"/>
+                <a16:creationId xmlns:a16="http://schemas.microsoft.com/office/drawing/2014/main" id="{5944F6A4-E61E-4D26-8946-1F1D3881C05C}"/>
               </a:ext>
             </a:extLst>
           </p:cNvPr>
@@ -6639,24 +8574,83 @@
           <a:p>
             <a:pPr algn="ctr"/>
             <a:r>
-              <a:rPr lang="en-US" b="1">
+              <a:rPr lang="ro-RO" b="1">
                 <a:latin typeface="Palatino Linotype" panose="02040502050505030304" pitchFamily="18" charset="0"/>
               </a:rPr>
-              <a:t>Demo</a:t>
-            </a:r>
+              <a:t>Contribuții</a:t>
+            </a:r>
+            <a:endParaRPr lang="en-US" b="1">
+              <a:latin typeface="Palatino Linotype" panose="02040502050505030304" pitchFamily="18" charset="0"/>
+            </a:endParaRPr>
+          </a:p>
+        </p:txBody>
+      </p:sp>
+      <p:sp>
+        <p:nvSpPr>
+          <p:cNvPr id="3" name="Substituent conținut 2">
+            <a:extLst>
+              <a:ext uri="{FF2B5EF4-FFF2-40B4-BE49-F238E27FC236}">
+                <a16:creationId xmlns:a16="http://schemas.microsoft.com/office/drawing/2014/main" id="{B564887E-F43F-4446-BC59-166C634BBFE3}"/>
+              </a:ext>
+            </a:extLst>
+          </p:cNvPr>
+          <p:cNvSpPr>
+            <a:spLocks noGrp="1"/>
+          </p:cNvSpPr>
+          <p:nvPr>
+            <p:ph idx="1"/>
+          </p:nvPr>
+        </p:nvSpPr>
+        <p:spPr/>
+        <p:txBody>
+          <a:bodyPr/>
+          <a:lstStyle/>
+          <a:p>
+            <a:pPr>
+              <a:buSzPct val="200000"/>
+              <a:buFont typeface="Gabriola" panose="04040605051002020D02" pitchFamily="82" charset="0"/>
+              <a:buChar char="›"/>
+            </a:pPr>
+            <a:r>
+              <a:rPr lang="ro-RO" sz="2800">
+                <a:latin typeface="Gabriola" panose="04040605051002020D02" pitchFamily="82" charset="0"/>
+              </a:rPr>
+              <a:t>Implementarea și abordarea originală când vine vorba de aplicație</a:t>
+            </a:r>
+          </a:p>
+          <a:p>
+            <a:pPr marL="0" indent="0">
+              <a:buNone/>
+            </a:pPr>
+            <a:endParaRPr lang="ro-RO"/>
+          </a:p>
+          <a:p>
+            <a:endParaRPr lang="en-US"/>
           </a:p>
         </p:txBody>
       </p:sp>
     </p:spTree>
     <p:extLst>
       <p:ext uri="{BB962C8B-B14F-4D97-AF65-F5344CB8AC3E}">
-        <p14:creationId xmlns:p14="http://schemas.microsoft.com/office/powerpoint/2010/main" val="2947156239"/>
+        <p14:creationId xmlns:p14="http://schemas.microsoft.com/office/powerpoint/2010/main" val="321340602"/>
       </p:ext>
     </p:extLst>
   </p:cSld>
   <p:clrMapOvr>
     <a:masterClrMapping/>
   </p:clrMapOvr>
+  <mc:AlternateContent xmlns:mc="http://schemas.openxmlformats.org/markup-compatibility/2006">
+    <mc:Choice xmlns:p15="http://schemas.microsoft.com/office/powerpoint/2012/main" Requires="p15">
+      <p:transition xmlns:p14="http://schemas.microsoft.com/office/powerpoint/2010/main" spd="slow" p14:dur="1250">
+        <p15:prstTrans prst="peelOff"/>
+      </p:transition>
+    </mc:Choice>
+    <mc:Fallback>
+      <p:transition spd="slow">
+        <p:fade/>
+      </p:transition>
+    </mc:Fallback>
+  </mc:AlternateContent>
 </p:sld>
 </file>
 
@@ -6679,10 +8673,10 @@
       </p:grpSpPr>
       <p:sp>
         <p:nvSpPr>
-          <p:cNvPr id="2" name="Titlu 1">
+          <p:cNvPr id="2" name="Title 1">
             <a:extLst>
               <a:ext uri="{FF2B5EF4-FFF2-40B4-BE49-F238E27FC236}">
-                <a16:creationId xmlns:a16="http://schemas.microsoft.com/office/drawing/2014/main" id="{B787117F-C480-4CA6-B7C7-0CE94FDDAB15}"/>
+                <a16:creationId xmlns:a16="http://schemas.microsoft.com/office/drawing/2014/main" id="{FA482020-455F-4439-BA00-FEACA1EFF68C}"/>
               </a:ext>
             </a:extLst>
           </p:cNvPr>
@@ -6698,25 +8692,22 @@
           <a:bodyPr/>
           <a:lstStyle/>
           <a:p>
-            <a:pPr algn="ctr"/>
-            <a:r>
-              <a:rPr lang="en-US" b="1" err="1">
+            <a:r>
+              <a:rPr lang="ro-RO" b="1">
                 <a:latin typeface="Palatino Linotype" panose="02040502050505030304" pitchFamily="18" charset="0"/>
               </a:rPr>
-              <a:t>Concluzii</a:t>
-            </a:r>
-            <a:endParaRPr lang="en-US" b="1">
-              <a:latin typeface="Palatino Linotype" panose="02040502050505030304" pitchFamily="18" charset="0"/>
-            </a:endParaRPr>
-          </a:p>
-        </p:txBody>
-      </p:sp>
-      <p:sp>
-        <p:nvSpPr>
-          <p:cNvPr id="3" name="Substituent conținut 2">
+              <a:t>Contribuții</a:t>
+            </a:r>
+            <a:endParaRPr lang="en-US"/>
+          </a:p>
+        </p:txBody>
+      </p:sp>
+      <p:sp>
+        <p:nvSpPr>
+          <p:cNvPr id="3" name="Content Placeholder 2">
             <a:extLst>
               <a:ext uri="{FF2B5EF4-FFF2-40B4-BE49-F238E27FC236}">
-                <a16:creationId xmlns:a16="http://schemas.microsoft.com/office/drawing/2014/main" id="{BDF5B156-9D7C-49EC-8FC2-13520FC941B2}"/>
+                <a16:creationId xmlns:a16="http://schemas.microsoft.com/office/drawing/2014/main" id="{E51BBFD2-821D-46E0-871E-3EA7E609DA03}"/>
               </a:ext>
             </a:extLst>
           </p:cNvPr>
@@ -6729,29 +8720,127 @@
         </p:nvSpPr>
         <p:spPr/>
         <p:txBody>
-          <a:bodyPr/>
-          <a:lstStyle/>
-          <a:p>
-            <a:r>
-              <a:rPr lang="ro-RO"/>
-              <a:t>Experiența dobândită</a:t>
-            </a:r>
-          </a:p>
-          <a:p>
-            <a:endParaRPr lang="en-US"/>
+          <a:bodyPr>
+            <a:normAutofit/>
+          </a:bodyPr>
+          <a:lstStyle/>
+          <a:p>
+            <a:pPr>
+              <a:buSzPct val="200000"/>
+              <a:buFont typeface="Gabriola" panose="04040605051002020D02" pitchFamily="82" charset="0"/>
+              <a:buChar char="›"/>
+            </a:pPr>
+            <a:r>
+              <a:rPr lang="ro-RO" sz="2800">
+                <a:latin typeface="Gabriola" panose="04040605051002020D02" pitchFamily="82" charset="0"/>
+              </a:rPr>
+              <a:t>Implementarea și abordarea originală când vine vorba de aplicație</a:t>
+            </a:r>
+          </a:p>
+          <a:p>
+            <a:pPr>
+              <a:buSzPct val="200000"/>
+              <a:buFont typeface="Gabriola" panose="04040605051002020D02" pitchFamily="82" charset="0"/>
+              <a:buChar char="›"/>
+            </a:pPr>
+            <a:r>
+              <a:rPr lang="ro-RO" sz="2800">
+                <a:latin typeface="Gabriola" panose="04040605051002020D02" pitchFamily="82" charset="0"/>
+              </a:rPr>
+              <a:t>Funcționalitățile oferite:</a:t>
+            </a:r>
+          </a:p>
+          <a:p>
+            <a:pPr lvl="1">
+              <a:buClr>
+                <a:schemeClr val="accent4"/>
+              </a:buClr>
+              <a:buSzPct val="200000"/>
+              <a:buFont typeface="Gabriola" panose="04040605051002020D02" pitchFamily="82" charset="0"/>
+              <a:buChar char="\"/>
+            </a:pPr>
+            <a:r>
+              <a:rPr lang="ro-RO" sz="2400">
+                <a:latin typeface="Gabriola" panose="04040605051002020D02" pitchFamily="82" charset="0"/>
+              </a:rPr>
+              <a:t>Gestionarea cărților</a:t>
+            </a:r>
+          </a:p>
+          <a:p>
+            <a:pPr lvl="1">
+              <a:buClr>
+                <a:schemeClr val="accent4"/>
+              </a:buClr>
+              <a:buSzPct val="200000"/>
+              <a:buFont typeface="Gabriola" panose="04040605051002020D02" pitchFamily="82" charset="0"/>
+              <a:buChar char="\"/>
+            </a:pPr>
+            <a:r>
+              <a:rPr lang="ro-RO" sz="2400">
+                <a:latin typeface="Gabriola" panose="04040605051002020D02" pitchFamily="82" charset="0"/>
+              </a:rPr>
+              <a:t>Citirea acestora direct din aplicație</a:t>
+            </a:r>
+          </a:p>
+          <a:p>
+            <a:pPr lvl="1">
+              <a:buClr>
+                <a:schemeClr val="accent4"/>
+              </a:buClr>
+              <a:buSzPct val="200000"/>
+              <a:buFont typeface="Gabriola" panose="04040605051002020D02" pitchFamily="82" charset="0"/>
+              <a:buChar char="\"/>
+            </a:pPr>
+            <a:r>
+              <a:rPr lang="ro-RO" sz="2400">
+                <a:latin typeface="Gabriola" panose="04040605051002020D02" pitchFamily="82" charset="0"/>
+              </a:rPr>
+              <a:t>Sistemul de recomandări</a:t>
+            </a:r>
+          </a:p>
+          <a:p>
+            <a:pPr lvl="1">
+              <a:buClr>
+                <a:schemeClr val="accent4"/>
+              </a:buClr>
+              <a:buSzPct val="200000"/>
+              <a:buFont typeface="Gabriola" panose="04040605051002020D02" pitchFamily="82" charset="0"/>
+              <a:buChar char="\"/>
+            </a:pPr>
+            <a:r>
+              <a:rPr lang="ro-RO" sz="2400">
+                <a:latin typeface="Gabriola" panose="04040605051002020D02" pitchFamily="82" charset="0"/>
+              </a:rPr>
+              <a:t>Comunitatea</a:t>
+            </a:r>
+            <a:endParaRPr lang="en-US" sz="2400">
+              <a:latin typeface="Gabriola" panose="04040605051002020D02" pitchFamily="82" charset="0"/>
+            </a:endParaRPr>
           </a:p>
         </p:txBody>
       </p:sp>
     </p:spTree>
     <p:extLst>
       <p:ext uri="{BB962C8B-B14F-4D97-AF65-F5344CB8AC3E}">
-        <p14:creationId xmlns:p14="http://schemas.microsoft.com/office/powerpoint/2010/main" val="3514780396"/>
+        <p14:creationId xmlns:p14="http://schemas.microsoft.com/office/powerpoint/2010/main" val="1962756593"/>
       </p:ext>
     </p:extLst>
   </p:cSld>
   <p:clrMapOvr>
     <a:masterClrMapping/>
   </p:clrMapOvr>
+  <mc:AlternateContent xmlns:mc="http://schemas.openxmlformats.org/markup-compatibility/2006">
+    <mc:Choice xmlns:p14="http://schemas.microsoft.com/office/powerpoint/2010/main" Requires="p14">
+      <p:transition spd="slow" p14:dur="1500">
+        <p:split orient="vert"/>
+      </p:transition>
+    </mc:Choice>
+    <mc:Fallback>
+      <p:transition spd="slow">
+        <p:split orient="vert"/>
+      </p:transition>
+    </mc:Fallback>
+  </mc:AlternateContent>
 </p:sld>
 </file>
 
@@ -6774,10 +8863,10 @@
       </p:grpSpPr>
       <p:sp>
         <p:nvSpPr>
-          <p:cNvPr id="4" name="Titlu 3">
+          <p:cNvPr id="2" name="Titlu 1">
             <a:extLst>
               <a:ext uri="{FF2B5EF4-FFF2-40B4-BE49-F238E27FC236}">
-                <a16:creationId xmlns:a16="http://schemas.microsoft.com/office/drawing/2014/main" id="{BAAF27E7-85F6-4CF1-9E36-17BE1F8FD934}"/>
+                <a16:creationId xmlns:a16="http://schemas.microsoft.com/office/drawing/2014/main" id="{1E430F7C-367C-4232-9B3F-237E35CF50F0}"/>
               </a:ext>
             </a:extLst>
           </p:cNvPr>
@@ -6793,11 +8882,18 @@
           <a:bodyPr/>
           <a:lstStyle/>
           <a:p>
+            <a:pPr algn="ctr"/>
             <a:r>
               <a:rPr lang="ro-RO" b="1">
                 <a:latin typeface="Palatino Linotype" panose="02040502050505030304" pitchFamily="18" charset="0"/>
               </a:rPr>
-              <a:t>Vă mulțumesc!</a:t>
+              <a:t>Tehnologiile </a:t>
+            </a:r>
+            <a:r>
+              <a:rPr lang="en-US" b="1" err="1">
+                <a:latin typeface="Palatino Linotype" panose="02040502050505030304" pitchFamily="18" charset="0"/>
+              </a:rPr>
+              <a:t>utilizate</a:t>
             </a:r>
             <a:endParaRPr lang="en-US" b="1">
               <a:latin typeface="Palatino Linotype" panose="02040502050505030304" pitchFamily="18" charset="0"/>
@@ -6805,16 +8901,120 @@
           </a:p>
         </p:txBody>
       </p:sp>
+      <p:sp>
+        <p:nvSpPr>
+          <p:cNvPr id="3" name="Substituent conținut 2">
+            <a:extLst>
+              <a:ext uri="{FF2B5EF4-FFF2-40B4-BE49-F238E27FC236}">
+                <a16:creationId xmlns:a16="http://schemas.microsoft.com/office/drawing/2014/main" id="{75A99387-AE5F-45F5-8C9A-F0DB4C914995}"/>
+              </a:ext>
+            </a:extLst>
+          </p:cNvPr>
+          <p:cNvSpPr>
+            <a:spLocks noGrp="1"/>
+          </p:cNvSpPr>
+          <p:nvPr>
+            <p:ph idx="1"/>
+          </p:nvPr>
+        </p:nvSpPr>
+        <p:spPr/>
+        <p:txBody>
+          <a:bodyPr>
+            <a:normAutofit/>
+          </a:bodyPr>
+          <a:lstStyle/>
+          <a:p>
+            <a:pPr>
+              <a:buSzPct val="200000"/>
+              <a:buFont typeface="Gabriola" panose="04040605051002020D02" pitchFamily="82" charset="0"/>
+              <a:buChar char="›"/>
+            </a:pPr>
+            <a:r>
+              <a:rPr lang="en-US" sz="2800">
+                <a:latin typeface="Gabriola" panose="04040605051002020D02" pitchFamily="82" charset="0"/>
+              </a:rPr>
+              <a:t>ASP.NET Core</a:t>
+            </a:r>
+          </a:p>
+          <a:p>
+            <a:pPr>
+              <a:buSzPct val="200000"/>
+              <a:buFont typeface="Gabriola" panose="04040605051002020D02" pitchFamily="82" charset="0"/>
+              <a:buChar char="›"/>
+            </a:pPr>
+            <a:r>
+              <a:rPr lang="en-US" sz="2800">
+                <a:latin typeface="Gabriola" panose="04040605051002020D02" pitchFamily="82" charset="0"/>
+              </a:rPr>
+              <a:t>SQL Server Express</a:t>
+            </a:r>
+          </a:p>
+          <a:p>
+            <a:pPr>
+              <a:buSzPct val="200000"/>
+              <a:buFont typeface="Gabriola" panose="04040605051002020D02" pitchFamily="82" charset="0"/>
+              <a:buChar char="›"/>
+            </a:pPr>
+            <a:r>
+              <a:rPr lang="en-US" sz="2800">
+                <a:latin typeface="Gabriola" panose="04040605051002020D02" pitchFamily="82" charset="0"/>
+              </a:rPr>
+              <a:t>HTML, CSS &amp; JavaScript</a:t>
+            </a:r>
+            <a:endParaRPr lang="ro-RO" sz="2800">
+              <a:latin typeface="Gabriola" panose="04040605051002020D02" pitchFamily="82" charset="0"/>
+            </a:endParaRPr>
+          </a:p>
+          <a:p>
+            <a:pPr>
+              <a:buSzPct val="200000"/>
+              <a:buFont typeface="Gabriola" panose="04040605051002020D02" pitchFamily="82" charset="0"/>
+              <a:buChar char="›"/>
+            </a:pPr>
+            <a:r>
+              <a:rPr lang="en-US" sz="2800">
+                <a:latin typeface="Gabriola" panose="04040605051002020D02" pitchFamily="82" charset="0"/>
+              </a:rPr>
+              <a:t>Bootstrap 4</a:t>
+            </a:r>
+          </a:p>
+          <a:p>
+            <a:pPr>
+              <a:buSzPct val="200000"/>
+              <a:buFont typeface="Gabriola" panose="04040605051002020D02" pitchFamily="82" charset="0"/>
+              <a:buChar char="›"/>
+            </a:pPr>
+            <a:r>
+              <a:rPr lang="en-US" sz="2800">
+                <a:latin typeface="Gabriola" panose="04040605051002020D02" pitchFamily="82" charset="0"/>
+              </a:rPr>
+              <a:t>Version control: Github (GUI: SourceTree)</a:t>
+            </a:r>
+          </a:p>
+        </p:txBody>
+      </p:sp>
     </p:spTree>
     <p:extLst>
       <p:ext uri="{BB962C8B-B14F-4D97-AF65-F5344CB8AC3E}">
-        <p14:creationId xmlns:p14="http://schemas.microsoft.com/office/powerpoint/2010/main" val="384886750"/>
+        <p14:creationId xmlns:p14="http://schemas.microsoft.com/office/powerpoint/2010/main" val="2594655161"/>
       </p:ext>
     </p:extLst>
   </p:cSld>
   <p:clrMapOvr>
     <a:masterClrMapping/>
   </p:clrMapOvr>
+  <mc:AlternateContent xmlns:mc="http://schemas.openxmlformats.org/markup-compatibility/2006">
+    <mc:Choice xmlns:p15="http://schemas.microsoft.com/office/powerpoint/2012/main" Requires="p15">
+      <p:transition xmlns:p14="http://schemas.microsoft.com/office/powerpoint/2010/main" spd="slow" p14:dur="1250">
+        <p15:prstTrans prst="peelOff"/>
+      </p:transition>
+    </mc:Choice>
+    <mc:Fallback>
+      <p:transition spd="slow">
+        <p:fade/>
+      </p:transition>
+    </mc:Fallback>
+  </mc:AlternateContent>
 </p:sld>
 </file>
 
@@ -7049,4 +9249,299 @@
     </a:ext>
   </a:extLst>
 </a:theme>
+</file>
+
+<file path=ppt/theme/theme2.xml><?xml version="1.0" encoding="utf-8"?>
+<a:theme xmlns:a="http://schemas.openxmlformats.org/drawingml/2006/main" name="Office Theme">
+  <a:themeElements>
+    <a:clrScheme name="Office">
+      <a:dk1>
+        <a:sysClr val="windowText" lastClr="000000"/>
+      </a:dk1>
+      <a:lt1>
+        <a:sysClr val="window" lastClr="FFFFFF"/>
+      </a:lt1>
+      <a:dk2>
+        <a:srgbClr val="44546A"/>
+      </a:dk2>
+      <a:lt2>
+        <a:srgbClr val="E7E6E6"/>
+      </a:lt2>
+      <a:accent1>
+        <a:srgbClr val="4472C4"/>
+      </a:accent1>
+      <a:accent2>
+        <a:srgbClr val="ED7D31"/>
+      </a:accent2>
+      <a:accent3>
+        <a:srgbClr val="A5A5A5"/>
+      </a:accent3>
+      <a:accent4>
+        <a:srgbClr val="FFC000"/>
+      </a:accent4>
+      <a:accent5>
+        <a:srgbClr val="5B9BD5"/>
+      </a:accent5>
+      <a:accent6>
+        <a:srgbClr val="70AD47"/>
+      </a:accent6>
+      <a:hlink>
+        <a:srgbClr val="0563C1"/>
+      </a:hlink>
+      <a:folHlink>
+        <a:srgbClr val="954F72"/>
+      </a:folHlink>
+    </a:clrScheme>
+    <a:fontScheme name="Office">
+      <a:majorFont>
+        <a:latin typeface="Calibri Light" panose="020F0302020204030204"/>
+        <a:ea typeface=""/>
+        <a:cs typeface=""/>
+        <a:font script="Jpan" typeface="游ゴシック Light"/>
+        <a:font script="Hang" typeface="맑은 고딕"/>
+        <a:font script="Hans" typeface="等线 Light"/>
+        <a:font script="Hant" typeface="新細明體"/>
+        <a:font script="Arab" typeface="Times New Roman"/>
+        <a:font script="Hebr" typeface="Times New Roman"/>
+        <a:font script="Thai" typeface="Angsana New"/>
+        <a:font script="Ethi" typeface="Nyala"/>
+        <a:font script="Beng" typeface="Vrinda"/>
+        <a:font script="Gujr" typeface="Shruti"/>
+        <a:font script="Khmr" typeface="MoolBoran"/>
+        <a:font script="Knda" typeface="Tunga"/>
+        <a:font script="Guru" typeface="Raavi"/>
+        <a:font script="Cans" typeface="Euphemia"/>
+        <a:font script="Cher" typeface="Plantagenet Cherokee"/>
+        <a:font script="Yiii" typeface="Microsoft Yi Baiti"/>
+        <a:font script="Tibt" typeface="Microsoft Himalaya"/>
+        <a:font script="Thaa" typeface="MV Boli"/>
+        <a:font script="Deva" typeface="Mangal"/>
+        <a:font script="Telu" typeface="Gautami"/>
+        <a:font script="Taml" typeface="Latha"/>
+        <a:font script="Syrc" typeface="Estrangelo Edessa"/>
+        <a:font script="Orya" typeface="Kalinga"/>
+        <a:font script="Mlym" typeface="Kartika"/>
+        <a:font script="Laoo" typeface="DokChampa"/>
+        <a:font script="Sinh" typeface="Iskoola Pota"/>
+        <a:font script="Mong" typeface="Mongolian Baiti"/>
+        <a:font script="Viet" typeface="Times New Roman"/>
+        <a:font script="Uigh" typeface="Microsoft Uighur"/>
+        <a:font script="Geor" typeface="Sylfaen"/>
+        <a:font script="Armn" typeface="Arial"/>
+        <a:font script="Bugi" typeface="Leelawadee UI"/>
+        <a:font script="Bopo" typeface="Microsoft JhengHei"/>
+        <a:font script="Java" typeface="Javanese Text"/>
+        <a:font script="Lisu" typeface="Segoe UI"/>
+        <a:font script="Mymr" typeface="Myanmar Text"/>
+        <a:font script="Nkoo" typeface="Ebrima"/>
+        <a:font script="Olck" typeface="Nirmala UI"/>
+        <a:font script="Osma" typeface="Ebrima"/>
+        <a:font script="Phag" typeface="Phagspa"/>
+        <a:font script="Syrn" typeface="Estrangelo Edessa"/>
+        <a:font script="Syrj" typeface="Estrangelo Edessa"/>
+        <a:font script="Syre" typeface="Estrangelo Edessa"/>
+        <a:font script="Sora" typeface="Nirmala UI"/>
+        <a:font script="Tale" typeface="Microsoft Tai Le"/>
+        <a:font script="Talu" typeface="Microsoft New Tai Lue"/>
+        <a:font script="Tfng" typeface="Ebrima"/>
+      </a:majorFont>
+      <a:minorFont>
+        <a:latin typeface="Calibri" panose="020F0502020204030204"/>
+        <a:ea typeface=""/>
+        <a:cs typeface=""/>
+        <a:font script="Jpan" typeface="游ゴシック"/>
+        <a:font script="Hang" typeface="맑은 고딕"/>
+        <a:font script="Hans" typeface="等线"/>
+        <a:font script="Hant" typeface="新細明體"/>
+        <a:font script="Arab" typeface="Arial"/>
+        <a:font script="Hebr" typeface="Arial"/>
+        <a:font script="Thai" typeface="Cordia New"/>
+        <a:font script="Ethi" typeface="Nyala"/>
+        <a:font script="Beng" typeface="Vrinda"/>
+        <a:font script="Gujr" typeface="Shruti"/>
+        <a:font script="Khmr" typeface="DaunPenh"/>
+        <a:font script="Knda" typeface="Tunga"/>
+        <a:font script="Guru" typeface="Raavi"/>
+        <a:font script="Cans" typeface="Euphemia"/>
+        <a:font script="Cher" typeface="Plantagenet Cherokee"/>
+        <a:font script="Yiii" typeface="Microsoft Yi Baiti"/>
+        <a:font script="Tibt" typeface="Microsoft Himalaya"/>
+        <a:font script="Thaa" typeface="MV Boli"/>
+        <a:font script="Deva" typeface="Mangal"/>
+        <a:font script="Telu" typeface="Gautami"/>
+        <a:font script="Taml" typeface="Latha"/>
+        <a:font script="Syrc" typeface="Estrangelo Edessa"/>
+        <a:font script="Orya" typeface="Kalinga"/>
+        <a:font script="Mlym" typeface="Kartika"/>
+        <a:font script="Laoo" typeface="DokChampa"/>
+        <a:font script="Sinh" typeface="Iskoola Pota"/>
+        <a:font script="Mong" typeface="Mongolian Baiti"/>
+        <a:font script="Viet" typeface="Arial"/>
+        <a:font script="Uigh" typeface="Microsoft Uighur"/>
+        <a:font script="Geor" typeface="Sylfaen"/>
+        <a:font script="Armn" typeface="Arial"/>
+        <a:font script="Bugi" typeface="Leelawadee UI"/>
+        <a:font script="Bopo" typeface="Microsoft JhengHei"/>
+        <a:font script="Java" typeface="Javanese Text"/>
+        <a:font script="Lisu" typeface="Segoe UI"/>
+        <a:font script="Mymr" typeface="Myanmar Text"/>
+        <a:font script="Nkoo" typeface="Ebrima"/>
+        <a:font script="Olck" typeface="Nirmala UI"/>
+        <a:font script="Osma" typeface="Ebrima"/>
+        <a:font script="Phag" typeface="Phagspa"/>
+        <a:font script="Syrn" typeface="Estrangelo Edessa"/>
+        <a:font script="Syrj" typeface="Estrangelo Edessa"/>
+        <a:font script="Syre" typeface="Estrangelo Edessa"/>
+        <a:font script="Sora" typeface="Nirmala UI"/>
+        <a:font script="Tale" typeface="Microsoft Tai Le"/>
+        <a:font script="Talu" typeface="Microsoft New Tai Lue"/>
+        <a:font script="Tfng" typeface="Ebrima"/>
+      </a:minorFont>
+    </a:fontScheme>
+    <a:fmtScheme name="Office">
+      <a:fillStyleLst>
+        <a:solidFill>
+          <a:schemeClr val="phClr"/>
+        </a:solidFill>
+        <a:gradFill rotWithShape="1">
+          <a:gsLst>
+            <a:gs pos="0">
+              <a:schemeClr val="phClr">
+                <a:lumMod val="110000"/>
+                <a:satMod val="105000"/>
+                <a:tint val="67000"/>
+              </a:schemeClr>
+            </a:gs>
+            <a:gs pos="50000">
+              <a:schemeClr val="phClr">
+                <a:lumMod val="105000"/>
+                <a:satMod val="103000"/>
+                <a:tint val="73000"/>
+              </a:schemeClr>
+            </a:gs>
+            <a:gs pos="100000">
+              <a:schemeClr val="phClr">
+                <a:lumMod val="105000"/>
+                <a:satMod val="109000"/>
+                <a:tint val="81000"/>
+              </a:schemeClr>
+            </a:gs>
+          </a:gsLst>
+          <a:lin ang="5400000" scaled="0"/>
+        </a:gradFill>
+        <a:gradFill rotWithShape="1">
+          <a:gsLst>
+            <a:gs pos="0">
+              <a:schemeClr val="phClr">
+                <a:satMod val="103000"/>
+                <a:lumMod val="102000"/>
+                <a:tint val="94000"/>
+              </a:schemeClr>
+            </a:gs>
+            <a:gs pos="50000">
+              <a:schemeClr val="phClr">
+                <a:satMod val="110000"/>
+                <a:lumMod val="100000"/>
+                <a:shade val="100000"/>
+              </a:schemeClr>
+            </a:gs>
+            <a:gs pos="100000">
+              <a:schemeClr val="phClr">
+                <a:lumMod val="99000"/>
+                <a:satMod val="120000"/>
+                <a:shade val="78000"/>
+              </a:schemeClr>
+            </a:gs>
+          </a:gsLst>
+          <a:lin ang="5400000" scaled="0"/>
+        </a:gradFill>
+      </a:fillStyleLst>
+      <a:lnStyleLst>
+        <a:ln w="6350" cap="flat" cmpd="sng" algn="ctr">
+          <a:solidFill>
+            <a:schemeClr val="phClr"/>
+          </a:solidFill>
+          <a:prstDash val="solid"/>
+          <a:miter lim="800000"/>
+        </a:ln>
+        <a:ln w="12700" cap="flat" cmpd="sng" algn="ctr">
+          <a:solidFill>
+            <a:schemeClr val="phClr"/>
+          </a:solidFill>
+          <a:prstDash val="solid"/>
+          <a:miter lim="800000"/>
+        </a:ln>
+        <a:ln w="19050" cap="flat" cmpd="sng" algn="ctr">
+          <a:solidFill>
+            <a:schemeClr val="phClr"/>
+          </a:solidFill>
+          <a:prstDash val="solid"/>
+          <a:miter lim="800000"/>
+        </a:ln>
+      </a:lnStyleLst>
+      <a:effectStyleLst>
+        <a:effectStyle>
+          <a:effectLst/>
+        </a:effectStyle>
+        <a:effectStyle>
+          <a:effectLst/>
+        </a:effectStyle>
+        <a:effectStyle>
+          <a:effectLst>
+            <a:outerShdw blurRad="57150" dist="19050" dir="5400000" algn="ctr" rotWithShape="0">
+              <a:srgbClr val="000000">
+                <a:alpha val="63000"/>
+              </a:srgbClr>
+            </a:outerShdw>
+          </a:effectLst>
+        </a:effectStyle>
+      </a:effectStyleLst>
+      <a:bgFillStyleLst>
+        <a:solidFill>
+          <a:schemeClr val="phClr"/>
+        </a:solidFill>
+        <a:solidFill>
+          <a:schemeClr val="phClr">
+            <a:tint val="95000"/>
+            <a:satMod val="170000"/>
+          </a:schemeClr>
+        </a:solidFill>
+        <a:gradFill rotWithShape="1">
+          <a:gsLst>
+            <a:gs pos="0">
+              <a:schemeClr val="phClr">
+                <a:tint val="93000"/>
+                <a:satMod val="150000"/>
+                <a:shade val="98000"/>
+                <a:lumMod val="102000"/>
+              </a:schemeClr>
+            </a:gs>
+            <a:gs pos="50000">
+              <a:schemeClr val="phClr">
+                <a:tint val="98000"/>
+                <a:satMod val="130000"/>
+                <a:shade val="90000"/>
+                <a:lumMod val="103000"/>
+              </a:schemeClr>
+            </a:gs>
+            <a:gs pos="100000">
+              <a:schemeClr val="phClr">
+                <a:shade val="63000"/>
+                <a:satMod val="120000"/>
+              </a:schemeClr>
+            </a:gs>
+          </a:gsLst>
+          <a:lin ang="5400000" scaled="0"/>
+        </a:gradFill>
+      </a:bgFillStyleLst>
+    </a:fmtScheme>
+  </a:themeElements>
+  <a:objectDefaults/>
+  <a:extraClrSchemeLst/>
+  <a:extLst>
+    <a:ext uri="{05A4C25C-085E-4340-85A3-A5531E510DB2}">
+      <thm15:themeFamily xmlns:thm15="http://schemas.microsoft.com/office/thememl/2012/main" name="Office Theme" id="{62F939B6-93AF-4DB8-9C6B-D6C7DFDC589F}" vid="{4A3C46E8-61CC-4603-A589-7422A47A8E4A}"/>
+    </a:ext>
+  </a:extLst>
+</a:theme>
 </file>
</xml_diff>

<commit_message>
Made some modifications regarding the application content
</commit_message>
<xml_diff>
--- a/Licenta2018CorfuAlexandru/ExploreBooks.pptx
+++ b/Licenta2018CorfuAlexandru/ExploreBooks.pptx
@@ -208,7 +208,7 @@
           <a:p>
             <a:fld id="{06E26005-0395-4D0E-9653-7BA27BF40DDA}" type="datetimeFigureOut">
               <a:rPr lang="en-US" smtClean="0"/>
-              <a:t>6/28/2018</a:t>
+              <a:t>6/29/2018</a:t>
             </a:fld>
             <a:endParaRPr lang="en-US"/>
           </a:p>
@@ -928,7 +928,7 @@
           <a:p>
             <a:r>
               <a:rPr lang="ro-RO"/>
-              <a:t>Abordarea originală a constat prin tema, alegerea tehnologiilor și felul cum au fost folosite acestea în cadrul aplicației</a:t>
+              <a:t>GoodReads: site pentru tracking a cărților</a:t>
             </a:r>
             <a:endParaRPr lang="en-US"/>
           </a:p>
@@ -1015,10 +1015,61 @@
           <a:lstStyle/>
           <a:p>
             <a:r>
+              <a:rPr lang="en-US"/>
+              <a:t>&gt;ASP.NET:</a:t>
+            </a:r>
+            <a:endParaRPr lang="ro-RO"/>
+          </a:p>
+          <a:p>
+            <a:r>
               <a:rPr lang="ro-RO"/>
-              <a:t>Comunitatea reprezintă tot ce ține de interacțiunile realizate între utilizatori</a:t>
-            </a:r>
-            <a:endParaRPr lang="en-US"/>
+              <a:t>	</a:t>
+            </a:r>
+            <a:r>
+              <a:rPr lang="en-US"/>
+              <a:t>&gt;ASP.NET Core 2.0 MVC</a:t>
+            </a:r>
+            <a:endParaRPr lang="ro-RO"/>
+          </a:p>
+          <a:p>
+            <a:r>
+              <a:rPr lang="ro-RO"/>
+              <a:t>	</a:t>
+            </a:r>
+            <a:r>
+              <a:rPr lang="en-US"/>
+              <a:t>&gt;.NET framework</a:t>
+            </a:r>
+          </a:p>
+          <a:p>
+            <a:r>
+              <a:rPr lang="en-US"/>
+              <a:t>	&gt;Entity Framework</a:t>
+            </a:r>
+          </a:p>
+          <a:p>
+            <a:r>
+              <a:rPr lang="en-US"/>
+              <a:t>	&gt;Identity</a:t>
+            </a:r>
+          </a:p>
+          <a:p>
+            <a:r>
+              <a:rPr lang="en-US"/>
+              <a:t>&gt;JavaScript:</a:t>
+            </a:r>
+          </a:p>
+          <a:p>
+            <a:r>
+              <a:rPr lang="en-US"/>
+              <a:t>	&gt;jQuery</a:t>
+            </a:r>
+          </a:p>
+          <a:p>
+            <a:r>
+              <a:rPr lang="en-US"/>
+              <a:t>	&gt;AJAX</a:t>
+            </a:r>
           </a:p>
         </p:txBody>
       </p:sp>
@@ -1039,7 +1090,7 @@
           <a:p>
             <a:fld id="{05500ECC-6B4B-41C2-8885-7ACAF0714D2D}" type="slidenum">
               <a:rPr lang="en-US" smtClean="0"/>
-              <a:t>8</a:t>
+              <a:t>9</a:t>
             </a:fld>
             <a:endParaRPr lang="en-US"/>
           </a:p>
@@ -1048,7 +1099,7 @@
     </p:spTree>
     <p:extLst>
       <p:ext uri="{BB962C8B-B14F-4D97-AF65-F5344CB8AC3E}">
-        <p14:creationId xmlns:p14="http://schemas.microsoft.com/office/powerpoint/2010/main" val="3881567416"/>
+        <p14:creationId xmlns:p14="http://schemas.microsoft.com/office/powerpoint/2010/main" val="966604121"/>
       </p:ext>
     </p:extLst>
   </p:cSld>
@@ -1104,145 +1155,6 @@
           <a:p>
             <a:r>
               <a:rPr lang="en-US"/>
-              <a:t>&gt;ASP.NET:</a:t>
-            </a:r>
-            <a:endParaRPr lang="ro-RO"/>
-          </a:p>
-          <a:p>
-            <a:r>
-              <a:rPr lang="ro-RO"/>
-              <a:t>	</a:t>
-            </a:r>
-            <a:r>
-              <a:rPr lang="en-US"/>
-              <a:t>&gt;ASP.NET Core 2.0 MVC</a:t>
-            </a:r>
-            <a:endParaRPr lang="ro-RO"/>
-          </a:p>
-          <a:p>
-            <a:r>
-              <a:rPr lang="ro-RO"/>
-              <a:t>	</a:t>
-            </a:r>
-            <a:r>
-              <a:rPr lang="en-US"/>
-              <a:t>&gt;.NET framework</a:t>
-            </a:r>
-          </a:p>
-          <a:p>
-            <a:r>
-              <a:rPr lang="en-US"/>
-              <a:t>	&gt;Entity Framework</a:t>
-            </a:r>
-          </a:p>
-          <a:p>
-            <a:r>
-              <a:rPr lang="en-US"/>
-              <a:t>	&gt;Identity</a:t>
-            </a:r>
-          </a:p>
-          <a:p>
-            <a:r>
-              <a:rPr lang="en-US"/>
-              <a:t>&gt;JavaScript:</a:t>
-            </a:r>
-          </a:p>
-          <a:p>
-            <a:r>
-              <a:rPr lang="en-US"/>
-              <a:t>	&gt;jQuery</a:t>
-            </a:r>
-          </a:p>
-          <a:p>
-            <a:r>
-              <a:rPr lang="en-US"/>
-              <a:t>	&gt;AJAX</a:t>
-            </a:r>
-          </a:p>
-        </p:txBody>
-      </p:sp>
-      <p:sp>
-        <p:nvSpPr>
-          <p:cNvPr id="4" name="Slide Number Placeholder 3"/>
-          <p:cNvSpPr>
-            <a:spLocks noGrp="1"/>
-          </p:cNvSpPr>
-          <p:nvPr>
-            <p:ph type="sldNum" sz="quarter" idx="10"/>
-          </p:nvPr>
-        </p:nvSpPr>
-        <p:spPr/>
-        <p:txBody>
-          <a:bodyPr/>
-          <a:lstStyle/>
-          <a:p>
-            <a:fld id="{05500ECC-6B4B-41C2-8885-7ACAF0714D2D}" type="slidenum">
-              <a:rPr lang="en-US" smtClean="0"/>
-              <a:t>9</a:t>
-            </a:fld>
-            <a:endParaRPr lang="en-US"/>
-          </a:p>
-        </p:txBody>
-      </p:sp>
-    </p:spTree>
-    <p:extLst>
-      <p:ext uri="{BB962C8B-B14F-4D97-AF65-F5344CB8AC3E}">
-        <p14:creationId xmlns:p14="http://schemas.microsoft.com/office/powerpoint/2010/main" val="966604121"/>
-      </p:ext>
-    </p:extLst>
-  </p:cSld>
-  <p:clrMapOvr>
-    <a:masterClrMapping/>
-  </p:clrMapOvr>
-</p:notes>
-</file>
-
-<file path=ppt/notesSlides/notesSlide8.xml><?xml version="1.0" encoding="utf-8"?>
-<p:notes xmlns:a="http://schemas.openxmlformats.org/drawingml/2006/main" xmlns:r="http://schemas.openxmlformats.org/officeDocument/2006/relationships" xmlns:p="http://schemas.openxmlformats.org/presentationml/2006/main">
-  <p:cSld>
-    <p:spTree>
-      <p:nvGrpSpPr>
-        <p:cNvPr id="1" name=""/>
-        <p:cNvGrpSpPr/>
-        <p:nvPr/>
-      </p:nvGrpSpPr>
-      <p:grpSpPr>
-        <a:xfrm>
-          <a:off x="0" y="0"/>
-          <a:ext cx="0" cy="0"/>
-          <a:chOff x="0" y="0"/>
-          <a:chExt cx="0" cy="0"/>
-        </a:xfrm>
-      </p:grpSpPr>
-      <p:sp>
-        <p:nvSpPr>
-          <p:cNvPr id="2" name="Slide Image Placeholder 1"/>
-          <p:cNvSpPr>
-            <a:spLocks noGrp="1" noRot="1" noChangeAspect="1"/>
-          </p:cNvSpPr>
-          <p:nvPr>
-            <p:ph type="sldImg"/>
-          </p:nvPr>
-        </p:nvSpPr>
-        <p:spPr/>
-      </p:sp>
-      <p:sp>
-        <p:nvSpPr>
-          <p:cNvPr id="3" name="Notes Placeholder 2"/>
-          <p:cNvSpPr>
-            <a:spLocks noGrp="1"/>
-          </p:cNvSpPr>
-          <p:nvPr>
-            <p:ph type="body" idx="1"/>
-          </p:nvPr>
-        </p:nvSpPr>
-        <p:spPr/>
-        <p:txBody>
-          <a:bodyPr/>
-          <a:lstStyle/>
-          <a:p>
-            <a:r>
-              <a:rPr lang="en-US"/>
               <a:t>&gt;Autentificarea unui utilizator</a:t>
             </a:r>
           </a:p>
@@ -1290,7 +1202,7 @@
 </p:notes>
 </file>
 
-<file path=ppt/notesSlides/notesSlide9.xml><?xml version="1.0" encoding="utf-8"?>
+<file path=ppt/notesSlides/notesSlide8.xml><?xml version="1.0" encoding="utf-8"?>
 <p:notes xmlns:a="http://schemas.openxmlformats.org/drawingml/2006/main" xmlns:r="http://schemas.openxmlformats.org/officeDocument/2006/relationships" xmlns:p="http://schemas.openxmlformats.org/presentationml/2006/main">
   <p:cSld>
     <p:spTree>
@@ -1744,7 +1656,7 @@
           <a:p>
             <a:fld id="{0135EB83-58DA-4F12-BC5C-B8CA458719B9}" type="datetimeFigureOut">
               <a:rPr lang="en-US" smtClean="0"/>
-              <a:t>6/28/2018</a:t>
+              <a:t>6/29/2018</a:t>
             </a:fld>
             <a:endParaRPr lang="en-US"/>
           </a:p>
@@ -2068,7 +1980,7 @@
           <a:p>
             <a:fld id="{0135EB83-58DA-4F12-BC5C-B8CA458719B9}" type="datetimeFigureOut">
               <a:rPr lang="en-US" smtClean="0"/>
-              <a:t>6/28/2018</a:t>
+              <a:t>6/29/2018</a:t>
             </a:fld>
             <a:endParaRPr lang="en-US"/>
           </a:p>
@@ -2316,7 +2228,7 @@
           <a:p>
             <a:fld id="{0135EB83-58DA-4F12-BC5C-B8CA458719B9}" type="datetimeFigureOut">
               <a:rPr lang="en-US" smtClean="0"/>
-              <a:t>6/28/2018</a:t>
+              <a:t>6/29/2018</a:t>
             </a:fld>
             <a:endParaRPr lang="en-US"/>
           </a:p>
@@ -2655,7 +2567,7 @@
           <a:p>
             <a:fld id="{0135EB83-58DA-4F12-BC5C-B8CA458719B9}" type="datetimeFigureOut">
               <a:rPr lang="en-US" smtClean="0"/>
-              <a:t>6/28/2018</a:t>
+              <a:t>6/29/2018</a:t>
             </a:fld>
             <a:endParaRPr lang="en-US"/>
           </a:p>
@@ -3002,7 +2914,7 @@
           <a:p>
             <a:fld id="{0135EB83-58DA-4F12-BC5C-B8CA458719B9}" type="datetimeFigureOut">
               <a:rPr lang="en-US" smtClean="0"/>
-              <a:t>6/28/2018</a:t>
+              <a:t>6/29/2018</a:t>
             </a:fld>
             <a:endParaRPr lang="en-US"/>
           </a:p>
@@ -3376,7 +3288,7 @@
           <a:p>
             <a:fld id="{0135EB83-58DA-4F12-BC5C-B8CA458719B9}" type="datetimeFigureOut">
               <a:rPr lang="en-US" smtClean="0"/>
-              <a:t>6/28/2018</a:t>
+              <a:t>6/29/2018</a:t>
             </a:fld>
             <a:endParaRPr lang="en-US"/>
           </a:p>
@@ -3846,7 +3758,7 @@
           <a:p>
             <a:fld id="{0135EB83-58DA-4F12-BC5C-B8CA458719B9}" type="datetimeFigureOut">
               <a:rPr lang="en-US" smtClean="0"/>
-              <a:t>6/28/2018</a:t>
+              <a:t>6/29/2018</a:t>
             </a:fld>
             <a:endParaRPr lang="en-US"/>
           </a:p>
@@ -4051,7 +3963,7 @@
           <a:p>
             <a:fld id="{0135EB83-58DA-4F12-BC5C-B8CA458719B9}" type="datetimeFigureOut">
               <a:rPr lang="en-US" smtClean="0"/>
-              <a:t>6/28/2018</a:t>
+              <a:t>6/29/2018</a:t>
             </a:fld>
             <a:endParaRPr lang="en-US"/>
           </a:p>
@@ -4262,7 +4174,7 @@
           <a:p>
             <a:fld id="{0135EB83-58DA-4F12-BC5C-B8CA458719B9}" type="datetimeFigureOut">
               <a:rPr lang="en-US" smtClean="0"/>
-              <a:t>6/28/2018</a:t>
+              <a:t>6/29/2018</a:t>
             </a:fld>
             <a:endParaRPr lang="en-US"/>
           </a:p>
@@ -4494,7 +4406,7 @@
           <a:p>
             <a:fld id="{0135EB83-58DA-4F12-BC5C-B8CA458719B9}" type="datetimeFigureOut">
               <a:rPr lang="en-US" smtClean="0"/>
-              <a:t>6/28/2018</a:t>
+              <a:t>6/29/2018</a:t>
             </a:fld>
             <a:endParaRPr lang="en-US"/>
           </a:p>
@@ -4742,7 +4654,7 @@
           <a:p>
             <a:fld id="{0135EB83-58DA-4F12-BC5C-B8CA458719B9}" type="datetimeFigureOut">
               <a:rPr lang="en-US" smtClean="0"/>
-              <a:t>6/28/2018</a:t>
+              <a:t>6/29/2018</a:t>
             </a:fld>
             <a:endParaRPr lang="en-US"/>
           </a:p>
@@ -5009,7 +4921,7 @@
           <a:p>
             <a:fld id="{0135EB83-58DA-4F12-BC5C-B8CA458719B9}" type="datetimeFigureOut">
               <a:rPr lang="en-US" smtClean="0"/>
-              <a:t>6/28/2018</a:t>
+              <a:t>6/29/2018</a:t>
             </a:fld>
             <a:endParaRPr lang="en-US"/>
           </a:p>
@@ -5427,7 +5339,7 @@
           <a:p>
             <a:fld id="{0135EB83-58DA-4F12-BC5C-B8CA458719B9}" type="datetimeFigureOut">
               <a:rPr lang="en-US" smtClean="0"/>
-              <a:t>6/28/2018</a:t>
+              <a:t>6/29/2018</a:t>
             </a:fld>
             <a:endParaRPr lang="en-US"/>
           </a:p>
@@ -5576,7 +5488,7 @@
           <a:p>
             <a:fld id="{0135EB83-58DA-4F12-BC5C-B8CA458719B9}" type="datetimeFigureOut">
               <a:rPr lang="en-US" smtClean="0"/>
-              <a:t>6/28/2018</a:t>
+              <a:t>6/29/2018</a:t>
             </a:fld>
             <a:endParaRPr lang="en-US"/>
           </a:p>
@@ -5702,7 +5614,7 @@
           <a:p>
             <a:fld id="{0135EB83-58DA-4F12-BC5C-B8CA458719B9}" type="datetimeFigureOut">
               <a:rPr lang="en-US" smtClean="0"/>
-              <a:t>6/28/2018</a:t>
+              <a:t>6/29/2018</a:t>
             </a:fld>
             <a:endParaRPr lang="en-US"/>
           </a:p>
@@ -5957,7 +5869,7 @@
           <a:p>
             <a:fld id="{0135EB83-58DA-4F12-BC5C-B8CA458719B9}" type="datetimeFigureOut">
               <a:rPr lang="en-US" smtClean="0"/>
-              <a:t>6/28/2018</a:t>
+              <a:t>6/29/2018</a:t>
             </a:fld>
             <a:endParaRPr lang="en-US"/>
           </a:p>
@@ -6277,7 +6189,7 @@
           <a:p>
             <a:fld id="{0135EB83-58DA-4F12-BC5C-B8CA458719B9}" type="datetimeFigureOut">
               <a:rPr lang="en-US" smtClean="0"/>
-              <a:t>6/28/2018</a:t>
+              <a:t>6/29/2018</a:t>
             </a:fld>
             <a:endParaRPr lang="en-US"/>
           </a:p>
@@ -6628,7 +6540,7 @@
           <a:p>
             <a:fld id="{0135EB83-58DA-4F12-BC5C-B8CA458719B9}" type="datetimeFigureOut">
               <a:rPr lang="en-US" smtClean="0"/>
-              <a:t>6/28/2018</a:t>
+              <a:t>6/29/2018</a:t>
             </a:fld>
             <a:endParaRPr lang="en-US"/>
           </a:p>
@@ -7299,13 +7211,13 @@
   <p:clrMapOvr>
     <a:masterClrMapping/>
   </p:clrMapOvr>
-  <mc:AlternateContent xmlns:mc="http://schemas.openxmlformats.org/markup-compatibility/2006">
-    <mc:Choice xmlns:p14="http://schemas.microsoft.com/office/powerpoint/2010/main" Requires="p14">
+  <mc:AlternateContent xmlns:mc="http://schemas.openxmlformats.org/markup-compatibility/2006" xmlns:p14="http://schemas.microsoft.com/office/powerpoint/2010/main">
+    <mc:Choice Requires="p14">
       <p:transition spd="slow" p14:dur="3400">
         <p14:reveal/>
       </p:transition>
     </mc:Choice>
-    <mc:Fallback>
+    <mc:Fallback xmlns="">
       <p:transition spd="slow">
         <p:fade/>
       </p:transition>
@@ -7471,13 +7383,13 @@
   <p:clrMapOvr>
     <a:masterClrMapping/>
   </p:clrMapOvr>
-  <mc:AlternateContent xmlns:mc="http://schemas.openxmlformats.org/markup-compatibility/2006">
-    <mc:Choice xmlns:p14="http://schemas.microsoft.com/office/powerpoint/2010/main" Requires="p14">
-      <p:transition spd="slow" p14:dur="3400">
-        <p14:reveal/>
+  <mc:AlternateContent xmlns:mc="http://schemas.openxmlformats.org/markup-compatibility/2006" xmlns:p15="http://schemas.microsoft.com/office/powerpoint/2012/main">
+    <mc:Choice Requires="p15">
+      <p:transition xmlns:p14="http://schemas.microsoft.com/office/powerpoint/2010/main" spd="slow" p14:dur="1250">
+        <p15:prstTrans prst="pageCurlDouble"/>
       </p:transition>
     </mc:Choice>
-    <mc:Fallback>
+    <mc:Fallback xmlns="">
       <p:transition spd="slow">
         <p:fade/>
       </p:transition>
@@ -7579,19 +7491,7 @@
               <a:rPr lang="ro-RO" sz="2800">
                 <a:latin typeface="Gabriola" panose="04040605051002020D02" pitchFamily="82" charset="0"/>
               </a:rPr>
-              <a:t>– </a:t>
-            </a:r>
-            <a:r>
-              <a:rPr lang="en-US" sz="2800">
-                <a:latin typeface="Gabriola" panose="04040605051002020D02" pitchFamily="82" charset="0"/>
-              </a:rPr>
-              <a:t>un mediu pl</a:t>
-            </a:r>
-            <a:r>
-              <a:rPr lang="ro-RO" sz="2800">
-                <a:latin typeface="Gabriola" panose="04040605051002020D02" pitchFamily="82" charset="0"/>
-              </a:rPr>
-              <a:t>ăcut ce oferă cititorilor oportunități pe diverse planuri</a:t>
+              <a:t>– inovatoare când vine vorba de funcționalități</a:t>
             </a:r>
           </a:p>
           <a:p>
@@ -7653,13 +7553,13 @@
   <p:clrMapOvr>
     <a:masterClrMapping/>
   </p:clrMapOvr>
-  <mc:AlternateContent xmlns:mc="http://schemas.openxmlformats.org/markup-compatibility/2006">
-    <mc:Choice xmlns:p15="http://schemas.microsoft.com/office/powerpoint/2012/main" Requires="p15">
+  <mc:AlternateContent xmlns:mc="http://schemas.openxmlformats.org/markup-compatibility/2006" xmlns:p15="http://schemas.microsoft.com/office/powerpoint/2012/main">
+    <mc:Choice Requires="p15">
       <p:transition xmlns:p14="http://schemas.microsoft.com/office/powerpoint/2010/main" spd="slow" p14:dur="1250">
-        <p15:prstTrans prst="peelOff"/>
+        <p15:prstTrans prst="pageCurlDouble"/>
       </p:transition>
     </mc:Choice>
-    <mc:Fallback>
+    <mc:Fallback xmlns="">
       <p:transition spd="slow">
         <p:fade/>
       </p:transition>
@@ -7736,13 +7636,13 @@
   <p:clrMapOvr>
     <a:masterClrMapping/>
   </p:clrMapOvr>
-  <mc:AlternateContent xmlns:mc="http://schemas.openxmlformats.org/markup-compatibility/2006">
-    <mc:Choice xmlns:p14="http://schemas.microsoft.com/office/powerpoint/2010/main" Requires="p14">
+  <mc:AlternateContent xmlns:mc="http://schemas.openxmlformats.org/markup-compatibility/2006" xmlns:p14="http://schemas.microsoft.com/office/powerpoint/2010/main">
+    <mc:Choice Requires="p14">
       <p:transition spd="slow" p14:dur="3400">
         <p14:reveal/>
       </p:transition>
     </mc:Choice>
-    <mc:Fallback>
+    <mc:Fallback xmlns="">
       <p:transition spd="slow">
         <p:fade/>
       </p:transition>
@@ -7794,7 +7694,7 @@
               <a:rPr lang="ro-RO" b="1">
                 <a:latin typeface="Palatino Linotype" panose="02040502050505030304" pitchFamily="18" charset="0"/>
               </a:rPr>
-              <a:t>Cuprins</a:t>
+              <a:t>Agendă</a:t>
             </a:r>
             <a:endParaRPr lang="en-US" b="1">
               <a:latin typeface="Palatino Linotype" panose="02040502050505030304" pitchFamily="18" charset="0"/>
@@ -7826,7 +7726,7 @@
         </p:spPr>
         <p:txBody>
           <a:bodyPr>
-            <a:normAutofit lnSpcReduction="10000"/>
+            <a:normAutofit/>
           </a:bodyPr>
           <a:lstStyle/>
           <a:p>
@@ -7854,7 +7754,7 @@
               <a:buChar char="›"/>
             </a:pPr>
             <a:r>
-              <a:rPr lang="ro-RO" sz="2800">
+              <a:rPr lang="en-US" sz="2800">
                 <a:solidFill>
                   <a:schemeClr val="accent6">
                     <a:lumMod val="50000"/>
@@ -7862,7 +7762,18 @@
                 </a:solidFill>
                 <a:latin typeface="Gabriola" panose="04040605051002020D02" pitchFamily="82" charset="0"/>
               </a:rPr>
-              <a:t>Contribuții</a:t>
+              <a:t>Aplica</a:t>
+            </a:r>
+            <a:r>
+              <a:rPr lang="ro-RO" sz="2800">
+                <a:solidFill>
+                  <a:schemeClr val="accent6">
+                    <a:lumMod val="50000"/>
+                  </a:schemeClr>
+                </a:solidFill>
+                <a:latin typeface="Gabriola" panose="04040605051002020D02" pitchFamily="82" charset="0"/>
+              </a:rPr>
+              <a:t>ții similare</a:t>
             </a:r>
           </a:p>
           <a:p>
@@ -7882,43 +7793,7 @@
               </a:rPr>
               <a:t>Tehnologiile utilizate</a:t>
             </a:r>
-          </a:p>
-          <a:p>
-            <a:pPr>
-              <a:buSzPct val="200000"/>
-              <a:buFont typeface="Gabriola" panose="04040605051002020D02" pitchFamily="82" charset="0"/>
-              <a:buChar char="›"/>
-            </a:pPr>
-            <a:r>
-              <a:rPr lang="ro-RO" sz="2800">
-                <a:solidFill>
-                  <a:schemeClr val="accent6">
-                    <a:lumMod val="50000"/>
-                  </a:schemeClr>
-                </a:solidFill>
-                <a:latin typeface="Gabriola" panose="04040605051002020D02" pitchFamily="82" charset="0"/>
-              </a:rPr>
-              <a:t>Concepte abordate</a:t>
-            </a:r>
-          </a:p>
-          <a:p>
-            <a:pPr>
-              <a:buSzPct val="200000"/>
-              <a:buFont typeface="Gabriola" panose="04040605051002020D02" pitchFamily="82" charset="0"/>
-              <a:buChar char="›"/>
-            </a:pPr>
-            <a:r>
-              <a:rPr lang="ro-RO" sz="2800" err="1">
-                <a:solidFill>
-                  <a:schemeClr val="accent6">
-                    <a:lumMod val="50000"/>
-                  </a:schemeClr>
-                </a:solidFill>
-                <a:latin typeface="Gabriola" panose="04040605051002020D02" pitchFamily="82" charset="0"/>
-              </a:rPr>
-              <a:t>Demo</a:t>
-            </a:r>
-            <a:endParaRPr lang="ro-RO" sz="2800">
+            <a:endParaRPr lang="en-US" sz="2800">
               <a:solidFill>
                 <a:schemeClr val="accent6">
                   <a:lumMod val="50000"/>
@@ -7926,6 +7801,24 @@
               </a:solidFill>
               <a:latin typeface="Gabriola" panose="04040605051002020D02" pitchFamily="82" charset="0"/>
             </a:endParaRPr>
+          </a:p>
+          <a:p>
+            <a:pPr>
+              <a:buSzPct val="200000"/>
+              <a:buFont typeface="Gabriola" panose="04040605051002020D02" pitchFamily="82" charset="0"/>
+              <a:buChar char="›"/>
+            </a:pPr>
+            <a:r>
+              <a:rPr lang="ro-RO" sz="2800">
+                <a:solidFill>
+                  <a:schemeClr val="accent6">
+                    <a:lumMod val="50000"/>
+                  </a:schemeClr>
+                </a:solidFill>
+                <a:latin typeface="Gabriola" panose="04040605051002020D02" pitchFamily="82" charset="0"/>
+              </a:rPr>
+              <a:t>Demo</a:t>
+            </a:r>
           </a:p>
           <a:p>
             <a:pPr>
@@ -7965,13 +7858,13 @@
   <p:clrMapOvr>
     <a:masterClrMapping/>
   </p:clrMapOvr>
-  <mc:AlternateContent xmlns:mc="http://schemas.openxmlformats.org/markup-compatibility/2006">
-    <mc:Choice xmlns:p159="http://schemas.microsoft.com/office/powerpoint/2015/09/main" Requires="p159">
+  <mc:AlternateContent xmlns:mc="http://schemas.openxmlformats.org/markup-compatibility/2006" xmlns:p159="http://schemas.microsoft.com/office/powerpoint/2015/09/main">
+    <mc:Choice Requires="p159">
       <p:transition xmlns:p14="http://schemas.microsoft.com/office/powerpoint/2010/main" spd="slow" p14:dur="2000">
         <p159:morph option="byObject"/>
       </p:transition>
     </mc:Choice>
-    <mc:Fallback>
+    <mc:Fallback xmlns="">
       <p:transition spd="slow">
         <p:fade/>
       </p:transition>
@@ -8091,13 +7984,13 @@
   <p:clrMapOvr>
     <a:masterClrMapping/>
   </p:clrMapOvr>
-  <mc:AlternateContent xmlns:mc="http://schemas.openxmlformats.org/markup-compatibility/2006">
-    <mc:Choice xmlns:p15="http://schemas.microsoft.com/office/powerpoint/2012/main" Requires="p15">
+  <mc:AlternateContent xmlns:mc="http://schemas.openxmlformats.org/markup-compatibility/2006" xmlns:p15="http://schemas.microsoft.com/office/powerpoint/2012/main">
+    <mc:Choice Requires="p15">
       <p:transition xmlns:p14="http://schemas.microsoft.com/office/powerpoint/2010/main" spd="slow" p14:dur="1250">
         <p15:prstTrans prst="pageCurlDouble"/>
       </p:transition>
     </mc:Choice>
-    <mc:Fallback>
+    <mc:Fallback xmlns="">
       <p:transition spd="slow">
         <p:fade/>
       </p:transition>
@@ -8577,7 +8470,7 @@
               <a:rPr lang="ro-RO" b="1">
                 <a:latin typeface="Palatino Linotype" panose="02040502050505030304" pitchFamily="18" charset="0"/>
               </a:rPr>
-              <a:t>Contribuții</a:t>
+              <a:t>Aplicații similare</a:t>
             </a:r>
             <a:endParaRPr lang="en-US" b="1">
               <a:latin typeface="Palatino Linotype" panose="02040502050505030304" pitchFamily="18" charset="0"/>
@@ -8585,50 +8478,62 @@
           </a:p>
         </p:txBody>
       </p:sp>
-      <p:sp>
-        <p:nvSpPr>
-          <p:cNvPr id="3" name="Substituent conținut 2">
+      <p:pic>
+        <p:nvPicPr>
+          <p:cNvPr id="1030" name="Picture 6" descr="No automatic alt text available.">
             <a:extLst>
               <a:ext uri="{FF2B5EF4-FFF2-40B4-BE49-F238E27FC236}">
-                <a16:creationId xmlns:a16="http://schemas.microsoft.com/office/drawing/2014/main" id="{B564887E-F43F-4446-BC59-166C634BBFE3}"/>
+                <a16:creationId xmlns:a16="http://schemas.microsoft.com/office/drawing/2014/main" id="{2363C2FC-983B-4055-AD80-088521AB8FF5}"/>
               </a:ext>
             </a:extLst>
           </p:cNvPr>
-          <p:cNvSpPr>
-            <a:spLocks noGrp="1"/>
-          </p:cNvSpPr>
-          <p:nvPr>
-            <p:ph idx="1"/>
-          </p:nvPr>
-        </p:nvSpPr>
-        <p:spPr/>
-        <p:txBody>
-          <a:bodyPr/>
-          <a:lstStyle/>
-          <a:p>
-            <a:pPr>
-              <a:buSzPct val="200000"/>
-              <a:buFont typeface="Gabriola" panose="04040605051002020D02" pitchFamily="82" charset="0"/>
-              <a:buChar char="›"/>
-            </a:pPr>
-            <a:r>
-              <a:rPr lang="ro-RO" sz="2800">
-                <a:latin typeface="Gabriola" panose="04040605051002020D02" pitchFamily="82" charset="0"/>
-              </a:rPr>
-              <a:t>Implementarea și abordarea originală când vine vorba de aplicație</a:t>
-            </a:r>
-          </a:p>
-          <a:p>
-            <a:pPr marL="0" indent="0">
-              <a:buNone/>
-            </a:pPr>
-            <a:endParaRPr lang="ro-RO"/>
-          </a:p>
-          <a:p>
-            <a:endParaRPr lang="en-US"/>
-          </a:p>
-        </p:txBody>
-      </p:sp>
+          <p:cNvPicPr>
+            <a:picLocks noChangeAspect="1" noChangeArrowheads="1"/>
+          </p:cNvPicPr>
+          <p:nvPr/>
+        </p:nvPicPr>
+        <p:blipFill>
+          <a:blip r:embed="rId3">
+            <a:extLst>
+              <a:ext uri="{28A0092B-C50C-407E-A947-70E740481C1C}">
+                <a14:useLocalDpi xmlns:a14="http://schemas.microsoft.com/office/drawing/2010/main" val="0"/>
+              </a:ext>
+            </a:extLst>
+          </a:blip>
+          <a:srcRect/>
+          <a:stretch>
+            <a:fillRect/>
+          </a:stretch>
+        </p:blipFill>
+        <p:spPr bwMode="auto">
+          <a:xfrm>
+            <a:off x="1469335" y="3429000"/>
+            <a:ext cx="4300343" cy="1591784"/>
+          </a:xfrm>
+          <a:prstGeom prst="rect">
+            <a:avLst/>
+          </a:prstGeom>
+          <a:ln>
+            <a:noFill/>
+          </a:ln>
+          <a:effectLst>
+            <a:outerShdw blurRad="190500" algn="tl" rotWithShape="0">
+              <a:srgbClr val="000000">
+                <a:alpha val="70000"/>
+              </a:srgbClr>
+            </a:outerShdw>
+          </a:effectLst>
+          <a:extLst>
+            <a:ext uri="{909E8E84-426E-40DD-AFC4-6F175D3DCCD1}">
+              <a14:hiddenFill xmlns:a14="http://schemas.microsoft.com/office/drawing/2010/main">
+                <a:solidFill>
+                  <a:srgbClr val="FFFFFF"/>
+                </a:solidFill>
+              </a14:hiddenFill>
+            </a:ext>
+          </a:extLst>
+        </p:spPr>
+      </p:pic>
     </p:spTree>
     <p:extLst>
       <p:ext uri="{BB962C8B-B14F-4D97-AF65-F5344CB8AC3E}">
@@ -8639,18 +8544,147 @@
   <p:clrMapOvr>
     <a:masterClrMapping/>
   </p:clrMapOvr>
-  <mc:AlternateContent xmlns:mc="http://schemas.openxmlformats.org/markup-compatibility/2006">
-    <mc:Choice xmlns:p15="http://schemas.microsoft.com/office/powerpoint/2012/main" Requires="p15">
+  <mc:AlternateContent xmlns:mc="http://schemas.openxmlformats.org/markup-compatibility/2006" xmlns:p15="http://schemas.microsoft.com/office/powerpoint/2012/main">
+    <mc:Choice Requires="p15">
       <p:transition xmlns:p14="http://schemas.microsoft.com/office/powerpoint/2010/main" spd="slow" p14:dur="1250">
-        <p15:prstTrans prst="peelOff"/>
+        <p15:prstTrans prst="pageCurlDouble"/>
       </p:transition>
     </mc:Choice>
-    <mc:Fallback>
+    <mc:Fallback xmlns="">
       <p:transition spd="slow">
         <p:fade/>
       </p:transition>
     </mc:Fallback>
   </mc:AlternateContent>
+  <p:timing>
+    <p:tnLst>
+      <p:par>
+        <p:cTn id="1" dur="indefinite" restart="never" nodeType="tmRoot">
+          <p:childTnLst>
+            <p:seq concurrent="1" nextAc="seek">
+              <p:cTn id="2" dur="indefinite" nodeType="mainSeq">
+                <p:childTnLst>
+                  <p:par>
+                    <p:cTn id="3" fill="hold">
+                      <p:stCondLst>
+                        <p:cond delay="indefinite"/>
+                      </p:stCondLst>
+                      <p:childTnLst>
+                        <p:par>
+                          <p:cTn id="4" fill="hold">
+                            <p:stCondLst>
+                              <p:cond delay="0"/>
+                            </p:stCondLst>
+                            <p:childTnLst>
+                              <p:par>
+                                <p:cTn id="5" presetID="53" presetClass="entr" presetSubtype="16" fill="hold" nodeType="clickEffect">
+                                  <p:stCondLst>
+                                    <p:cond delay="0"/>
+                                  </p:stCondLst>
+                                  <p:childTnLst>
+                                    <p:set>
+                                      <p:cBhvr>
+                                        <p:cTn id="6" dur="1" fill="hold">
+                                          <p:stCondLst>
+                                            <p:cond delay="0"/>
+                                          </p:stCondLst>
+                                        </p:cTn>
+                                        <p:tgtEl>
+                                          <p:spTgt spid="1030"/>
+                                        </p:tgtEl>
+                                        <p:attrNameLst>
+                                          <p:attrName>style.visibility</p:attrName>
+                                        </p:attrNameLst>
+                                      </p:cBhvr>
+                                      <p:to>
+                                        <p:strVal val="visible"/>
+                                      </p:to>
+                                    </p:set>
+                                    <p:anim calcmode="lin" valueType="num">
+                                      <p:cBhvr>
+                                        <p:cTn id="7" dur="500" fill="hold"/>
+                                        <p:tgtEl>
+                                          <p:spTgt spid="1030"/>
+                                        </p:tgtEl>
+                                        <p:attrNameLst>
+                                          <p:attrName>ppt_w</p:attrName>
+                                        </p:attrNameLst>
+                                      </p:cBhvr>
+                                      <p:tavLst>
+                                        <p:tav tm="0">
+                                          <p:val>
+                                            <p:fltVal val="0"/>
+                                          </p:val>
+                                        </p:tav>
+                                        <p:tav tm="100000">
+                                          <p:val>
+                                            <p:strVal val="#ppt_w"/>
+                                          </p:val>
+                                        </p:tav>
+                                      </p:tavLst>
+                                    </p:anim>
+                                    <p:anim calcmode="lin" valueType="num">
+                                      <p:cBhvr>
+                                        <p:cTn id="8" dur="500" fill="hold"/>
+                                        <p:tgtEl>
+                                          <p:spTgt spid="1030"/>
+                                        </p:tgtEl>
+                                        <p:attrNameLst>
+                                          <p:attrName>ppt_h</p:attrName>
+                                        </p:attrNameLst>
+                                      </p:cBhvr>
+                                      <p:tavLst>
+                                        <p:tav tm="0">
+                                          <p:val>
+                                            <p:fltVal val="0"/>
+                                          </p:val>
+                                        </p:tav>
+                                        <p:tav tm="100000">
+                                          <p:val>
+                                            <p:strVal val="#ppt_h"/>
+                                          </p:val>
+                                        </p:tav>
+                                      </p:tavLst>
+                                    </p:anim>
+                                    <p:animEffect transition="in" filter="fade">
+                                      <p:cBhvr>
+                                        <p:cTn id="9" dur="500"/>
+                                        <p:tgtEl>
+                                          <p:spTgt spid="1030"/>
+                                        </p:tgtEl>
+                                      </p:cBhvr>
+                                    </p:animEffect>
+                                  </p:childTnLst>
+                                </p:cTn>
+                              </p:par>
+                            </p:childTnLst>
+                          </p:cTn>
+                        </p:par>
+                      </p:childTnLst>
+                    </p:cTn>
+                  </p:par>
+                </p:childTnLst>
+              </p:cTn>
+              <p:prevCondLst>
+                <p:cond evt="onPrev" delay="0">
+                  <p:tgtEl>
+                    <p:sldTgt/>
+                  </p:tgtEl>
+                </p:cond>
+              </p:prevCondLst>
+              <p:nextCondLst>
+                <p:cond evt="onNext" delay="0">
+                  <p:tgtEl>
+                    <p:sldTgt/>
+                  </p:tgtEl>
+                </p:cond>
+              </p:nextCondLst>
+            </p:seq>
+          </p:childTnLst>
+        </p:cTn>
+      </p:par>
+    </p:tnLst>
+  </p:timing>
 </p:sld>
 </file>
 
@@ -8676,7 +8710,7 @@
           <p:cNvPr id="2" name="Title 1">
             <a:extLst>
               <a:ext uri="{FF2B5EF4-FFF2-40B4-BE49-F238E27FC236}">
-                <a16:creationId xmlns:a16="http://schemas.microsoft.com/office/drawing/2014/main" id="{FA482020-455F-4439-BA00-FEACA1EFF68C}"/>
+                <a16:creationId xmlns:a16="http://schemas.microsoft.com/office/drawing/2014/main" id="{CED8BD9D-4B13-415E-9467-088EC2210801}"/>
               </a:ext>
             </a:extLst>
           </p:cNvPr>
@@ -8696,151 +8730,205 @@
               <a:rPr lang="ro-RO" b="1">
                 <a:latin typeface="Palatino Linotype" panose="02040502050505030304" pitchFamily="18" charset="0"/>
               </a:rPr>
-              <a:t>Contribuții</a:t>
+              <a:t>Aplicații similare</a:t>
             </a:r>
             <a:endParaRPr lang="en-US"/>
           </a:p>
         </p:txBody>
       </p:sp>
-      <p:sp>
-        <p:nvSpPr>
-          <p:cNvPr id="3" name="Content Placeholder 2">
+      <p:pic>
+        <p:nvPicPr>
+          <p:cNvPr id="5" name="Content Placeholder 6">
             <a:extLst>
               <a:ext uri="{FF2B5EF4-FFF2-40B4-BE49-F238E27FC236}">
-                <a16:creationId xmlns:a16="http://schemas.microsoft.com/office/drawing/2014/main" id="{E51BBFD2-821D-46E0-871E-3EA7E609DA03}"/>
+                <a16:creationId xmlns:a16="http://schemas.microsoft.com/office/drawing/2014/main" id="{AC4AB528-C58B-4826-9E19-0F1A10C9F67D}"/>
               </a:ext>
             </a:extLst>
           </p:cNvPr>
-          <p:cNvSpPr>
-            <a:spLocks noGrp="1"/>
-          </p:cNvSpPr>
-          <p:nvPr>
-            <p:ph idx="1"/>
-          </p:nvPr>
-        </p:nvSpPr>
-        <p:spPr/>
-        <p:txBody>
-          <a:bodyPr>
-            <a:normAutofit/>
-          </a:bodyPr>
-          <a:lstStyle/>
-          <a:p>
-            <a:pPr>
-              <a:buSzPct val="200000"/>
-              <a:buFont typeface="Gabriola" panose="04040605051002020D02" pitchFamily="82" charset="0"/>
-              <a:buChar char="›"/>
-            </a:pPr>
-            <a:r>
-              <a:rPr lang="ro-RO" sz="2800">
-                <a:latin typeface="Gabriola" panose="04040605051002020D02" pitchFamily="82" charset="0"/>
-              </a:rPr>
-              <a:t>Implementarea și abordarea originală când vine vorba de aplicație</a:t>
-            </a:r>
-          </a:p>
-          <a:p>
-            <a:pPr>
-              <a:buSzPct val="200000"/>
-              <a:buFont typeface="Gabriola" panose="04040605051002020D02" pitchFamily="82" charset="0"/>
-              <a:buChar char="›"/>
-            </a:pPr>
-            <a:r>
-              <a:rPr lang="ro-RO" sz="2800">
-                <a:latin typeface="Gabriola" panose="04040605051002020D02" pitchFamily="82" charset="0"/>
-              </a:rPr>
-              <a:t>Funcționalitățile oferite:</a:t>
-            </a:r>
-          </a:p>
-          <a:p>
-            <a:pPr lvl="1">
-              <a:buClr>
-                <a:schemeClr val="accent4"/>
-              </a:buClr>
-              <a:buSzPct val="200000"/>
-              <a:buFont typeface="Gabriola" panose="04040605051002020D02" pitchFamily="82" charset="0"/>
-              <a:buChar char="\"/>
-            </a:pPr>
-            <a:r>
-              <a:rPr lang="ro-RO" sz="2400">
-                <a:latin typeface="Gabriola" panose="04040605051002020D02" pitchFamily="82" charset="0"/>
-              </a:rPr>
-              <a:t>Gestionarea cărților</a:t>
-            </a:r>
-          </a:p>
-          <a:p>
-            <a:pPr lvl="1">
-              <a:buClr>
-                <a:schemeClr val="accent4"/>
-              </a:buClr>
-              <a:buSzPct val="200000"/>
-              <a:buFont typeface="Gabriola" panose="04040605051002020D02" pitchFamily="82" charset="0"/>
-              <a:buChar char="\"/>
-            </a:pPr>
-            <a:r>
-              <a:rPr lang="ro-RO" sz="2400">
-                <a:latin typeface="Gabriola" panose="04040605051002020D02" pitchFamily="82" charset="0"/>
-              </a:rPr>
-              <a:t>Citirea acestora direct din aplicație</a:t>
-            </a:r>
-          </a:p>
-          <a:p>
-            <a:pPr lvl="1">
-              <a:buClr>
-                <a:schemeClr val="accent4"/>
-              </a:buClr>
-              <a:buSzPct val="200000"/>
-              <a:buFont typeface="Gabriola" panose="04040605051002020D02" pitchFamily="82" charset="0"/>
-              <a:buChar char="\"/>
-            </a:pPr>
-            <a:r>
-              <a:rPr lang="ro-RO" sz="2400">
-                <a:latin typeface="Gabriola" panose="04040605051002020D02" pitchFamily="82" charset="0"/>
-              </a:rPr>
-              <a:t>Sistemul de recomandări</a:t>
-            </a:r>
-          </a:p>
-          <a:p>
-            <a:pPr lvl="1">
-              <a:buClr>
-                <a:schemeClr val="accent4"/>
-              </a:buClr>
-              <a:buSzPct val="200000"/>
-              <a:buFont typeface="Gabriola" panose="04040605051002020D02" pitchFamily="82" charset="0"/>
-              <a:buChar char="\"/>
-            </a:pPr>
-            <a:r>
-              <a:rPr lang="ro-RO" sz="2400">
-                <a:latin typeface="Gabriola" panose="04040605051002020D02" pitchFamily="82" charset="0"/>
-              </a:rPr>
-              <a:t>Comunitatea</a:t>
-            </a:r>
-            <a:endParaRPr lang="en-US" sz="2400">
-              <a:latin typeface="Gabriola" panose="04040605051002020D02" pitchFamily="82" charset="0"/>
-            </a:endParaRPr>
-          </a:p>
-        </p:txBody>
-      </p:sp>
+          <p:cNvPicPr>
+            <a:picLocks noGrp="1" noChangeAspect="1"/>
+          </p:cNvPicPr>
+          <p:nvPr>
+            <p:ph sz="half" idx="2"/>
+          </p:nvPr>
+        </p:nvPicPr>
+        <p:blipFill>
+          <a:blip r:embed="rId2"/>
+          <a:stretch>
+            <a:fillRect/>
+          </a:stretch>
+        </p:blipFill>
+        <p:spPr>
+          <a:xfrm>
+            <a:off x="6355901" y="2560638"/>
+            <a:ext cx="4369697" cy="3309937"/>
+          </a:xfrm>
+          <a:prstGeom prst="rect">
+            <a:avLst/>
+          </a:prstGeom>
+          <a:ln>
+            <a:noFill/>
+          </a:ln>
+          <a:effectLst>
+            <a:outerShdw blurRad="190500" algn="tl" rotWithShape="0">
+              <a:srgbClr val="000000">
+                <a:alpha val="70000"/>
+              </a:srgbClr>
+            </a:outerShdw>
+          </a:effectLst>
+        </p:spPr>
+      </p:pic>
+      <p:pic>
+        <p:nvPicPr>
+          <p:cNvPr id="6" name="Picture 6" descr="No automatic alt text available.">
+            <a:extLst>
+              <a:ext uri="{FF2B5EF4-FFF2-40B4-BE49-F238E27FC236}">
+                <a16:creationId xmlns:a16="http://schemas.microsoft.com/office/drawing/2014/main" id="{5FF7F44F-C3AE-4B19-AD4C-5F77D262F7AA}"/>
+              </a:ext>
+            </a:extLst>
+          </p:cNvPr>
+          <p:cNvPicPr>
+            <a:picLocks noGrp="1" noChangeAspect="1" noChangeArrowheads="1"/>
+          </p:cNvPicPr>
+          <p:nvPr>
+            <p:ph sz="half" idx="1"/>
+          </p:nvPr>
+        </p:nvPicPr>
+        <p:blipFill>
+          <a:blip r:embed="rId3">
+            <a:extLst>
+              <a:ext uri="{28A0092B-C50C-407E-A947-70E740481C1C}">
+                <a14:useLocalDpi xmlns:a14="http://schemas.microsoft.com/office/drawing/2010/main" val="0"/>
+              </a:ext>
+            </a:extLst>
+          </a:blip>
+          <a:srcRect/>
+          <a:stretch>
+            <a:fillRect/>
+          </a:stretch>
+        </p:blipFill>
+        <p:spPr bwMode="auto">
+          <a:xfrm>
+            <a:off x="1466402" y="3429000"/>
+            <a:ext cx="4309932" cy="1595333"/>
+          </a:xfrm>
+          <a:prstGeom prst="rect">
+            <a:avLst/>
+          </a:prstGeom>
+          <a:ln>
+            <a:noFill/>
+          </a:ln>
+          <a:effectLst>
+            <a:outerShdw blurRad="190500" algn="tl" rotWithShape="0">
+              <a:srgbClr val="000000">
+                <a:alpha val="70000"/>
+              </a:srgbClr>
+            </a:outerShdw>
+          </a:effectLst>
+          <a:extLst>
+            <a:ext uri="{909E8E84-426E-40DD-AFC4-6F175D3DCCD1}">
+              <a14:hiddenFill xmlns:a14="http://schemas.microsoft.com/office/drawing/2010/main">
+                <a:solidFill>
+                  <a:srgbClr val="FFFFFF"/>
+                </a:solidFill>
+              </a14:hiddenFill>
+            </a:ext>
+          </a:extLst>
+        </p:spPr>
+      </p:pic>
     </p:spTree>
     <p:extLst>
       <p:ext uri="{BB962C8B-B14F-4D97-AF65-F5344CB8AC3E}">
-        <p14:creationId xmlns:p14="http://schemas.microsoft.com/office/powerpoint/2010/main" val="1962756593"/>
+        <p14:creationId xmlns:p14="http://schemas.microsoft.com/office/powerpoint/2010/main" val="2147584784"/>
       </p:ext>
     </p:extLst>
   </p:cSld>
   <p:clrMapOvr>
     <a:masterClrMapping/>
   </p:clrMapOvr>
-  <mc:AlternateContent xmlns:mc="http://schemas.openxmlformats.org/markup-compatibility/2006">
-    <mc:Choice xmlns:p14="http://schemas.microsoft.com/office/powerpoint/2010/main" Requires="p14">
-      <p:transition spd="slow" p14:dur="1500">
-        <p:split orient="vert"/>
-      </p:transition>
-    </mc:Choice>
-    <mc:Fallback>
-      <p:transition spd="slow">
-        <p:split orient="vert"/>
-      </p:transition>
-    </mc:Fallback>
-  </mc:AlternateContent>
+  <p:timing>
+    <p:tnLst>
+      <p:par>
+        <p:cTn id="1" dur="indefinite" restart="never" nodeType="tmRoot">
+          <p:childTnLst>
+            <p:seq concurrent="1" nextAc="seek">
+              <p:cTn id="2" dur="indefinite" nodeType="mainSeq">
+                <p:childTnLst>
+                  <p:par>
+                    <p:cTn id="3" fill="hold">
+                      <p:stCondLst>
+                        <p:cond delay="indefinite"/>
+                      </p:stCondLst>
+                      <p:childTnLst>
+                        <p:par>
+                          <p:cTn id="4" fill="hold">
+                            <p:stCondLst>
+                              <p:cond delay="0"/>
+                            </p:stCondLst>
+                            <p:childTnLst>
+                              <p:par>
+                                <p:cTn id="5" presetID="6" presetClass="entr" presetSubtype="16" fill="hold" nodeType="clickEffect">
+                                  <p:stCondLst>
+                                    <p:cond delay="0"/>
+                                  </p:stCondLst>
+                                  <p:childTnLst>
+                                    <p:set>
+                                      <p:cBhvr>
+                                        <p:cTn id="6" dur="1" fill="hold">
+                                          <p:stCondLst>
+                                            <p:cond delay="0"/>
+                                          </p:stCondLst>
+                                        </p:cTn>
+                                        <p:tgtEl>
+                                          <p:spTgt spid="5"/>
+                                        </p:tgtEl>
+                                        <p:attrNameLst>
+                                          <p:attrName>style.visibility</p:attrName>
+                                        </p:attrNameLst>
+                                      </p:cBhvr>
+                                      <p:to>
+                                        <p:strVal val="visible"/>
+                                      </p:to>
+                                    </p:set>
+                                    <p:animEffect transition="in" filter="circle(in)">
+                                      <p:cBhvr>
+                                        <p:cTn id="7" dur="750"/>
+                                        <p:tgtEl>
+                                          <p:spTgt spid="5"/>
+                                        </p:tgtEl>
+                                      </p:cBhvr>
+                                    </p:animEffect>
+                                  </p:childTnLst>
+                                </p:cTn>
+                              </p:par>
+                            </p:childTnLst>
+                          </p:cTn>
+                        </p:par>
+                      </p:childTnLst>
+                    </p:cTn>
+                  </p:par>
+                </p:childTnLst>
+              </p:cTn>
+              <p:prevCondLst>
+                <p:cond evt="onPrev" delay="0">
+                  <p:tgtEl>
+                    <p:sldTgt/>
+                  </p:tgtEl>
+                </p:cond>
+              </p:prevCondLst>
+              <p:nextCondLst>
+                <p:cond evt="onNext" delay="0">
+                  <p:tgtEl>
+                    <p:sldTgt/>
+                  </p:tgtEl>
+                </p:cond>
+              </p:nextCondLst>
+            </p:seq>
+          </p:childTnLst>
+        </p:cTn>
+      </p:par>
+    </p:tnLst>
+  </p:timing>
 </p:sld>
 </file>
 
@@ -9003,13 +9091,13 @@
   <p:clrMapOvr>
     <a:masterClrMapping/>
   </p:clrMapOvr>
-  <mc:AlternateContent xmlns:mc="http://schemas.openxmlformats.org/markup-compatibility/2006">
-    <mc:Choice xmlns:p15="http://schemas.microsoft.com/office/powerpoint/2012/main" Requires="p15">
+  <mc:AlternateContent xmlns:mc="http://schemas.openxmlformats.org/markup-compatibility/2006" xmlns:p15="http://schemas.microsoft.com/office/powerpoint/2012/main">
+    <mc:Choice Requires="p15">
       <p:transition xmlns:p14="http://schemas.microsoft.com/office/powerpoint/2010/main" spd="slow" p14:dur="1250">
-        <p15:prstTrans prst="peelOff"/>
+        <p15:prstTrans prst="pageCurlDouble"/>
       </p:transition>
     </mc:Choice>
-    <mc:Fallback>
+    <mc:Fallback xmlns="">
       <p:transition spd="slow">
         <p:fade/>
       </p:transition>

</xml_diff>

<commit_message>
Made za final modification!
</commit_message>
<xml_diff>
--- a/Licenta2018CorfuAlexandru/ExploreBooks.pptx
+++ b/Licenta2018CorfuAlexandru/ExploreBooks.pptx
@@ -11,14 +11,14 @@
     <p:sldId id="256" r:id="rId2"/>
     <p:sldId id="257" r:id="rId3"/>
     <p:sldId id="258" r:id="rId4"/>
-    <p:sldId id="268" r:id="rId5"/>
-    <p:sldId id="269" r:id="rId6"/>
-    <p:sldId id="270" r:id="rId7"/>
-    <p:sldId id="259" r:id="rId8"/>
-    <p:sldId id="271" r:id="rId9"/>
-    <p:sldId id="260" r:id="rId10"/>
-    <p:sldId id="262" r:id="rId11"/>
-    <p:sldId id="263" r:id="rId12"/>
+    <p:sldId id="270" r:id="rId5"/>
+    <p:sldId id="259" r:id="rId6"/>
+    <p:sldId id="271" r:id="rId7"/>
+    <p:sldId id="274" r:id="rId8"/>
+    <p:sldId id="260" r:id="rId9"/>
+    <p:sldId id="262" r:id="rId10"/>
+    <p:sldId id="273" r:id="rId11"/>
+    <p:sldId id="272" r:id="rId12"/>
     <p:sldId id="264" r:id="rId13"/>
   </p:sldIdLst>
   <p:sldSz cx="12192000" cy="6858000"/>
@@ -208,7 +208,7 @@
           <a:p>
             <a:fld id="{06E26005-0395-4D0E-9653-7BA27BF40DDA}" type="datetimeFigureOut">
               <a:rPr lang="en-US" smtClean="0"/>
-              <a:t>6/29/2018</a:t>
+              <a:t>7/3/2018</a:t>
             </a:fld>
             <a:endParaRPr lang="en-US"/>
           </a:p>
@@ -542,12 +542,6 @@
               <a:rPr lang="ro-RO" i="0"/>
               <a:t>Citirea cărților: deschiderea unui modal ce permite vizualizarea acestora direct din aplicație</a:t>
             </a:r>
-          </a:p>
-          <a:p>
-            <a:r>
-              <a:rPr lang="ro-RO" i="0"/>
-              <a:t>Exprimarea opiniei: prin lăsarea de comentarii aferente cărții respective, marcarea capitolelor favorite, dar și prin nota acordată acesteia</a:t>
-            </a:r>
             <a:endParaRPr lang="ro-RO" i="1"/>
           </a:p>
         </p:txBody>
@@ -632,30 +626,6 @@
           <a:bodyPr/>
           <a:lstStyle/>
           <a:p>
-            <a:r>
-              <a:rPr lang="ro-RO"/>
-              <a:t>Sistem creat astfel încât fiecare utilizator poate să contribuie prin diverse tipuri de recomandări: </a:t>
-            </a:r>
-          </a:p>
-          <a:p>
-            <a:r>
-              <a:rPr lang="ro-RO"/>
-              <a:t>	-recomandarea unei cărți similare cărții citite/vizitate</a:t>
-            </a:r>
-          </a:p>
-          <a:p>
-            <a:r>
-              <a:rPr lang="ro-RO"/>
-              <a:t>	-recomandarile din secțiunea </a:t>
-            </a:r>
-            <a:r>
-              <a:rPr lang="ro-RO" i="1"/>
-              <a:t>List of books</a:t>
-            </a:r>
-            <a:r>
-              <a:rPr lang="ro-RO" i="0"/>
-              <a:t> – crearea unor liste de cărți, pe diverse criterii alese de utilizator</a:t>
-            </a:r>
             <a:endParaRPr lang="en-US"/>
           </a:p>
         </p:txBody>
@@ -686,7 +656,7 @@
     </p:spTree>
     <p:extLst>
       <p:ext uri="{BB962C8B-B14F-4D97-AF65-F5344CB8AC3E}">
-        <p14:creationId xmlns:p14="http://schemas.microsoft.com/office/powerpoint/2010/main" val="2516664419"/>
+        <p14:creationId xmlns:p14="http://schemas.microsoft.com/office/powerpoint/2010/main" val="2553964814"/>
       </p:ext>
     </p:extLst>
   </p:cSld>
@@ -741,22 +711,8 @@
           <a:lstStyle/>
           <a:p>
             <a:r>
-              <a:rPr lang="en-US"/>
-              <a:t>&gt;</a:t>
-            </a:r>
-            <a:r>
               <a:rPr lang="ro-RO"/>
-              <a:t>Sistemul de recomandări bazat pe aplicație va genera utilizatorului recomandări de cărți pe baza istoricului acestuia</a:t>
-            </a:r>
-          </a:p>
-          <a:p>
-            <a:r>
-              <a:rPr lang="en-US"/>
-              <a:t>&gt;Dac</a:t>
-            </a:r>
-            <a:r>
-              <a:rPr lang="ro-RO"/>
-              <a:t>ă este un utilizator nou, va genera cartea cu cea mai mare medie a notelor din aplicație</a:t>
+              <a:t>GoodReads: site pentru tracking a cărților</a:t>
             </a:r>
             <a:endParaRPr lang="en-US"/>
           </a:p>
@@ -788,7 +744,7 @@
     </p:spTree>
     <p:extLst>
       <p:ext uri="{BB962C8B-B14F-4D97-AF65-F5344CB8AC3E}">
-        <p14:creationId xmlns:p14="http://schemas.microsoft.com/office/powerpoint/2010/main" val="2830845392"/>
+        <p14:creationId xmlns:p14="http://schemas.microsoft.com/office/powerpoint/2010/main" val="3803577369"/>
       </p:ext>
     </p:extLst>
   </p:cSld>
@@ -842,7 +798,62 @@
           <a:bodyPr/>
           <a:lstStyle/>
           <a:p>
-            <a:endParaRPr lang="en-US"/>
+            <a:r>
+              <a:rPr lang="en-US"/>
+              <a:t>&gt;ASP.NET:</a:t>
+            </a:r>
+            <a:endParaRPr lang="ro-RO"/>
+          </a:p>
+          <a:p>
+            <a:r>
+              <a:rPr lang="ro-RO"/>
+              <a:t>	</a:t>
+            </a:r>
+            <a:r>
+              <a:rPr lang="en-US"/>
+              <a:t>&gt;ASP.NET Core 2.0 MVC</a:t>
+            </a:r>
+            <a:endParaRPr lang="ro-RO"/>
+          </a:p>
+          <a:p>
+            <a:r>
+              <a:rPr lang="ro-RO"/>
+              <a:t>	</a:t>
+            </a:r>
+            <a:r>
+              <a:rPr lang="en-US"/>
+              <a:t>&gt;.NET framework</a:t>
+            </a:r>
+          </a:p>
+          <a:p>
+            <a:r>
+              <a:rPr lang="en-US"/>
+              <a:t>	&gt;Entity Framework</a:t>
+            </a:r>
+          </a:p>
+          <a:p>
+            <a:r>
+              <a:rPr lang="en-US"/>
+              <a:t>	&gt;Identity</a:t>
+            </a:r>
+          </a:p>
+          <a:p>
+            <a:r>
+              <a:rPr lang="en-US"/>
+              <a:t>&gt;JavaScript:</a:t>
+            </a:r>
+          </a:p>
+          <a:p>
+            <a:r>
+              <a:rPr lang="en-US"/>
+              <a:t>	&gt;jQuery</a:t>
+            </a:r>
+          </a:p>
+          <a:p>
+            <a:r>
+              <a:rPr lang="en-US"/>
+              <a:t>	&gt;AJAX</a:t>
+            </a:r>
           </a:p>
         </p:txBody>
       </p:sp>
@@ -863,7 +874,7 @@
           <a:p>
             <a:fld id="{05500ECC-6B4B-41C2-8885-7ACAF0714D2D}" type="slidenum">
               <a:rPr lang="en-US" smtClean="0"/>
-              <a:t>6</a:t>
+              <a:t>8</a:t>
             </a:fld>
             <a:endParaRPr lang="en-US"/>
           </a:p>
@@ -872,7 +883,7 @@
     </p:spTree>
     <p:extLst>
       <p:ext uri="{BB962C8B-B14F-4D97-AF65-F5344CB8AC3E}">
-        <p14:creationId xmlns:p14="http://schemas.microsoft.com/office/powerpoint/2010/main" val="2553964814"/>
+        <p14:creationId xmlns:p14="http://schemas.microsoft.com/office/powerpoint/2010/main" val="966604121"/>
       </p:ext>
     </p:extLst>
   </p:cSld>
@@ -927,10 +938,15 @@
           <a:lstStyle/>
           <a:p>
             <a:r>
-              <a:rPr lang="ro-RO"/>
-              <a:t>GoodReads: site pentru tracking a cărților</a:t>
-            </a:r>
-            <a:endParaRPr lang="en-US"/>
+              <a:rPr lang="en-US"/>
+              <a:t>&gt;Autentificarea unui utilizator</a:t>
+            </a:r>
+          </a:p>
+          <a:p>
+            <a:r>
+              <a:rPr lang="en-US"/>
+              <a:t>&gt;Navigarea prin paginile aplicatiei: Profile, Settings, Explore, List of books</a:t>
+            </a:r>
           </a:p>
         </p:txBody>
       </p:sp>
@@ -951,7 +967,7 @@
           <a:p>
             <a:fld id="{05500ECC-6B4B-41C2-8885-7ACAF0714D2D}" type="slidenum">
               <a:rPr lang="en-US" smtClean="0"/>
-              <a:t>7</a:t>
+              <a:t>9</a:t>
             </a:fld>
             <a:endParaRPr lang="en-US"/>
           </a:p>
@@ -960,7 +976,7 @@
     </p:spTree>
     <p:extLst>
       <p:ext uri="{BB962C8B-B14F-4D97-AF65-F5344CB8AC3E}">
-        <p14:creationId xmlns:p14="http://schemas.microsoft.com/office/powerpoint/2010/main" val="3803577369"/>
+        <p14:creationId xmlns:p14="http://schemas.microsoft.com/office/powerpoint/2010/main" val="229973589"/>
       </p:ext>
     </p:extLst>
   </p:cSld>
@@ -1016,9 +1032,18 @@
           <a:p>
             <a:r>
               <a:rPr lang="en-US"/>
-              <a:t>&gt;ASP.NET:</a:t>
-            </a:r>
-            <a:endParaRPr lang="ro-RO"/>
+              <a:t>&gt;Concepte legate de diverse pattern-uri arhitecturale (Onion, MVC) sau repository pattern</a:t>
+            </a:r>
+          </a:p>
+          <a:p>
+            <a:r>
+              <a:rPr lang="en-US"/>
+              <a:t>&gt;</a:t>
+            </a:r>
+            <a:r>
+              <a:rPr lang="ro-RO"/>
+              <a:t>Tehnologiile aprofundate: </a:t>
+            </a:r>
           </a:p>
           <a:p>
             <a:r>
@@ -1027,142 +1052,27 @@
             </a:r>
             <a:r>
               <a:rPr lang="en-US"/>
-              <a:t>&gt;ASP.NET Core 2.0 MVC</a:t>
-            </a:r>
-            <a:endParaRPr lang="ro-RO"/>
-          </a:p>
-          <a:p>
+              <a:t>&gt;</a:t>
+            </a:r>
             <a:r>
               <a:rPr lang="ro-RO"/>
-              <a:t>	</a:t>
+              <a:t>ușurința folosirii funcționalităților oferite de </a:t>
             </a:r>
             <a:r>
               <a:rPr lang="en-US"/>
-              <a:t>&gt;.NET framework</a:t>
+              <a:t>ASP .NET</a:t>
             </a:r>
           </a:p>
           <a:p>
             <a:r>
               <a:rPr lang="en-US"/>
-              <a:t>	&gt;Entity Framework</a:t>
-            </a:r>
-          </a:p>
-          <a:p>
-            <a:r>
-              <a:rPr lang="en-US"/>
-              <a:t>	&gt;Identity</a:t>
-            </a:r>
-          </a:p>
-          <a:p>
-            <a:r>
-              <a:rPr lang="en-US"/>
-              <a:t>&gt;JavaScript:</a:t>
-            </a:r>
-          </a:p>
-          <a:p>
-            <a:r>
-              <a:rPr lang="en-US"/>
-              <a:t>	&gt;jQuery</a:t>
-            </a:r>
-          </a:p>
-          <a:p>
-            <a:r>
-              <a:rPr lang="en-US"/>
-              <a:t>	&gt;AJAX</a:t>
-            </a:r>
-          </a:p>
-        </p:txBody>
-      </p:sp>
-      <p:sp>
-        <p:nvSpPr>
-          <p:cNvPr id="4" name="Slide Number Placeholder 3"/>
-          <p:cNvSpPr>
-            <a:spLocks noGrp="1"/>
-          </p:cNvSpPr>
-          <p:nvPr>
-            <p:ph type="sldNum" sz="quarter" idx="10"/>
-          </p:nvPr>
-        </p:nvSpPr>
-        <p:spPr/>
-        <p:txBody>
-          <a:bodyPr/>
-          <a:lstStyle/>
-          <a:p>
-            <a:fld id="{05500ECC-6B4B-41C2-8885-7ACAF0714D2D}" type="slidenum">
-              <a:rPr lang="en-US" smtClean="0"/>
-              <a:t>9</a:t>
-            </a:fld>
+              <a:t>	&gt;</a:t>
+            </a:r>
+            <a:r>
+              <a:rPr lang="ro-RO"/>
+              <a:t>o mai bună înțelegere a elementelor de pe front, dar și a limbajului JavaScript</a:t>
+            </a:r>
             <a:endParaRPr lang="en-US"/>
-          </a:p>
-        </p:txBody>
-      </p:sp>
-    </p:spTree>
-    <p:extLst>
-      <p:ext uri="{BB962C8B-B14F-4D97-AF65-F5344CB8AC3E}">
-        <p14:creationId xmlns:p14="http://schemas.microsoft.com/office/powerpoint/2010/main" val="966604121"/>
-      </p:ext>
-    </p:extLst>
-  </p:cSld>
-  <p:clrMapOvr>
-    <a:masterClrMapping/>
-  </p:clrMapOvr>
-</p:notes>
-</file>
-
-<file path=ppt/notesSlides/notesSlide7.xml><?xml version="1.0" encoding="utf-8"?>
-<p:notes xmlns:a="http://schemas.openxmlformats.org/drawingml/2006/main" xmlns:r="http://schemas.openxmlformats.org/officeDocument/2006/relationships" xmlns:p="http://schemas.openxmlformats.org/presentationml/2006/main">
-  <p:cSld>
-    <p:spTree>
-      <p:nvGrpSpPr>
-        <p:cNvPr id="1" name=""/>
-        <p:cNvGrpSpPr/>
-        <p:nvPr/>
-      </p:nvGrpSpPr>
-      <p:grpSpPr>
-        <a:xfrm>
-          <a:off x="0" y="0"/>
-          <a:ext cx="0" cy="0"/>
-          <a:chOff x="0" y="0"/>
-          <a:chExt cx="0" cy="0"/>
-        </a:xfrm>
-      </p:grpSpPr>
-      <p:sp>
-        <p:nvSpPr>
-          <p:cNvPr id="2" name="Slide Image Placeholder 1"/>
-          <p:cNvSpPr>
-            <a:spLocks noGrp="1" noRot="1" noChangeAspect="1"/>
-          </p:cNvSpPr>
-          <p:nvPr>
-            <p:ph type="sldImg"/>
-          </p:nvPr>
-        </p:nvSpPr>
-        <p:spPr/>
-      </p:sp>
-      <p:sp>
-        <p:nvSpPr>
-          <p:cNvPr id="3" name="Notes Placeholder 2"/>
-          <p:cNvSpPr>
-            <a:spLocks noGrp="1"/>
-          </p:cNvSpPr>
-          <p:nvPr>
-            <p:ph type="body" idx="1"/>
-          </p:nvPr>
-        </p:nvSpPr>
-        <p:spPr/>
-        <p:txBody>
-          <a:bodyPr/>
-          <a:lstStyle/>
-          <a:p>
-            <a:r>
-              <a:rPr lang="en-US"/>
-              <a:t>&gt;Autentificarea unui utilizator</a:t>
-            </a:r>
-          </a:p>
-          <a:p>
-            <a:r>
-              <a:rPr lang="en-US"/>
-              <a:t>&gt;Navigarea prin paginile aplicatiei: Profile, Settings, Explore, List of books</a:t>
-            </a:r>
           </a:p>
         </p:txBody>
       </p:sp>
@@ -1192,130 +1102,7 @@
     </p:spTree>
     <p:extLst>
       <p:ext uri="{BB962C8B-B14F-4D97-AF65-F5344CB8AC3E}">
-        <p14:creationId xmlns:p14="http://schemas.microsoft.com/office/powerpoint/2010/main" val="229973589"/>
-      </p:ext>
-    </p:extLst>
-  </p:cSld>
-  <p:clrMapOvr>
-    <a:masterClrMapping/>
-  </p:clrMapOvr>
-</p:notes>
-</file>
-
-<file path=ppt/notesSlides/notesSlide8.xml><?xml version="1.0" encoding="utf-8"?>
-<p:notes xmlns:a="http://schemas.openxmlformats.org/drawingml/2006/main" xmlns:r="http://schemas.openxmlformats.org/officeDocument/2006/relationships" xmlns:p="http://schemas.openxmlformats.org/presentationml/2006/main">
-  <p:cSld>
-    <p:spTree>
-      <p:nvGrpSpPr>
-        <p:cNvPr id="1" name=""/>
-        <p:cNvGrpSpPr/>
-        <p:nvPr/>
-      </p:nvGrpSpPr>
-      <p:grpSpPr>
-        <a:xfrm>
-          <a:off x="0" y="0"/>
-          <a:ext cx="0" cy="0"/>
-          <a:chOff x="0" y="0"/>
-          <a:chExt cx="0" cy="0"/>
-        </a:xfrm>
-      </p:grpSpPr>
-      <p:sp>
-        <p:nvSpPr>
-          <p:cNvPr id="2" name="Slide Image Placeholder 1"/>
-          <p:cNvSpPr>
-            <a:spLocks noGrp="1" noRot="1" noChangeAspect="1"/>
-          </p:cNvSpPr>
-          <p:nvPr>
-            <p:ph type="sldImg"/>
-          </p:nvPr>
-        </p:nvSpPr>
-        <p:spPr/>
-      </p:sp>
-      <p:sp>
-        <p:nvSpPr>
-          <p:cNvPr id="3" name="Notes Placeholder 2"/>
-          <p:cNvSpPr>
-            <a:spLocks noGrp="1"/>
-          </p:cNvSpPr>
-          <p:nvPr>
-            <p:ph type="body" idx="1"/>
-          </p:nvPr>
-        </p:nvSpPr>
-        <p:spPr/>
-        <p:txBody>
-          <a:bodyPr/>
-          <a:lstStyle/>
-          <a:p>
-            <a:r>
-              <a:rPr lang="en-US"/>
-              <a:t>&gt;Concepte legate de diverse pattern-uri arhitecturale (Onion, MVC) sau repository pattern</a:t>
-            </a:r>
-          </a:p>
-          <a:p>
-            <a:r>
-              <a:rPr lang="en-US"/>
-              <a:t>&gt;</a:t>
-            </a:r>
-            <a:r>
-              <a:rPr lang="ro-RO"/>
-              <a:t>Tehnologiile aprofundate: </a:t>
-            </a:r>
-          </a:p>
-          <a:p>
-            <a:r>
-              <a:rPr lang="ro-RO"/>
-              <a:t>	</a:t>
-            </a:r>
-            <a:r>
-              <a:rPr lang="en-US"/>
-              <a:t>&gt;</a:t>
-            </a:r>
-            <a:r>
-              <a:rPr lang="ro-RO"/>
-              <a:t>ușurința folosirii funcționalităților oferite de .NET framework</a:t>
-            </a:r>
-            <a:endParaRPr lang="en-US"/>
-          </a:p>
-          <a:p>
-            <a:r>
-              <a:rPr lang="en-US"/>
-              <a:t>	&gt;</a:t>
-            </a:r>
-            <a:r>
-              <a:rPr lang="ro-RO"/>
-              <a:t>o mai bună înțelegere a elementelor de pe front, dar și a limbajului JavaScript</a:t>
-            </a:r>
-            <a:endParaRPr lang="en-US"/>
-          </a:p>
-        </p:txBody>
-      </p:sp>
-      <p:sp>
-        <p:nvSpPr>
-          <p:cNvPr id="4" name="Slide Number Placeholder 3"/>
-          <p:cNvSpPr>
-            <a:spLocks noGrp="1"/>
-          </p:cNvSpPr>
-          <p:nvPr>
-            <p:ph type="sldNum" sz="quarter" idx="10"/>
-          </p:nvPr>
-        </p:nvSpPr>
-        <p:spPr/>
-        <p:txBody>
-          <a:bodyPr/>
-          <a:lstStyle/>
-          <a:p>
-            <a:fld id="{05500ECC-6B4B-41C2-8885-7ACAF0714D2D}" type="slidenum">
-              <a:rPr lang="en-US" smtClean="0"/>
-              <a:t>11</a:t>
-            </a:fld>
-            <a:endParaRPr lang="en-US"/>
-          </a:p>
-        </p:txBody>
-      </p:sp>
-    </p:spTree>
-    <p:extLst>
-      <p:ext uri="{BB962C8B-B14F-4D97-AF65-F5344CB8AC3E}">
-        <p14:creationId xmlns:p14="http://schemas.microsoft.com/office/powerpoint/2010/main" val="625813765"/>
+        <p14:creationId xmlns:p14="http://schemas.microsoft.com/office/powerpoint/2010/main" val="322993639"/>
       </p:ext>
     </p:extLst>
   </p:cSld>
@@ -1654,9 +1441,9 @@
           <a:bodyPr/>
           <a:lstStyle/>
           <a:p>
-            <a:fld id="{0135EB83-58DA-4F12-BC5C-B8CA458719B9}" type="datetimeFigureOut">
+            <a:fld id="{18799310-5204-4EC6-B28E-DCCC4E26C893}" type="datetime1">
               <a:rPr lang="en-US" smtClean="0"/>
-              <a:t>6/29/2018</a:t>
+              <a:t>7/3/2018</a:t>
             </a:fld>
             <a:endParaRPr lang="en-US"/>
           </a:p>
@@ -1978,9 +1765,9 @@
           <a:bodyPr/>
           <a:lstStyle/>
           <a:p>
-            <a:fld id="{0135EB83-58DA-4F12-BC5C-B8CA458719B9}" type="datetimeFigureOut">
+            <a:fld id="{DD39B277-7437-4A4D-9E83-E1D69CF0414B}" type="datetime1">
               <a:rPr lang="en-US" smtClean="0"/>
-              <a:t>6/29/2018</a:t>
+              <a:t>7/3/2018</a:t>
             </a:fld>
             <a:endParaRPr lang="en-US"/>
           </a:p>
@@ -2226,9 +2013,9 @@
           <a:bodyPr/>
           <a:lstStyle/>
           <a:p>
-            <a:fld id="{0135EB83-58DA-4F12-BC5C-B8CA458719B9}" type="datetimeFigureOut">
+            <a:fld id="{AC32342E-6410-49E2-8184-EA02EB08C1C1}" type="datetime1">
               <a:rPr lang="en-US" smtClean="0"/>
-              <a:t>6/29/2018</a:t>
+              <a:t>7/3/2018</a:t>
             </a:fld>
             <a:endParaRPr lang="en-US"/>
           </a:p>
@@ -2565,9 +2352,9 @@
           <a:bodyPr/>
           <a:lstStyle/>
           <a:p>
-            <a:fld id="{0135EB83-58DA-4F12-BC5C-B8CA458719B9}" type="datetimeFigureOut">
+            <a:fld id="{748ECC32-2813-4C7C-AF7A-02840F3B5EB1}" type="datetime1">
               <a:rPr lang="en-US" smtClean="0"/>
-              <a:t>6/29/2018</a:t>
+              <a:t>7/3/2018</a:t>
             </a:fld>
             <a:endParaRPr lang="en-US"/>
           </a:p>
@@ -2912,9 +2699,9 @@
           <a:bodyPr/>
           <a:lstStyle/>
           <a:p>
-            <a:fld id="{0135EB83-58DA-4F12-BC5C-B8CA458719B9}" type="datetimeFigureOut">
+            <a:fld id="{AF29D643-DB48-48F4-B198-A4B03F2AF565}" type="datetime1">
               <a:rPr lang="en-US" smtClean="0"/>
-              <a:t>6/29/2018</a:t>
+              <a:t>7/3/2018</a:t>
             </a:fld>
             <a:endParaRPr lang="en-US"/>
           </a:p>
@@ -3286,9 +3073,9 @@
           <a:bodyPr/>
           <a:lstStyle/>
           <a:p>
-            <a:fld id="{0135EB83-58DA-4F12-BC5C-B8CA458719B9}" type="datetimeFigureOut">
+            <a:fld id="{594ABFC9-DF03-46DF-9890-C51DCF92A45E}" type="datetime1">
               <a:rPr lang="en-US" smtClean="0"/>
-              <a:t>6/29/2018</a:t>
+              <a:t>7/3/2018</a:t>
             </a:fld>
             <a:endParaRPr lang="en-US"/>
           </a:p>
@@ -3756,9 +3543,9 @@
           <a:bodyPr/>
           <a:lstStyle/>
           <a:p>
-            <a:fld id="{0135EB83-58DA-4F12-BC5C-B8CA458719B9}" type="datetimeFigureOut">
+            <a:fld id="{67567517-BE26-44A7-A1E9-EB7F29603B9A}" type="datetime1">
               <a:rPr lang="en-US" smtClean="0"/>
-              <a:t>6/29/2018</a:t>
+              <a:t>7/3/2018</a:t>
             </a:fld>
             <a:endParaRPr lang="en-US"/>
           </a:p>
@@ -3961,9 +3748,9 @@
           <a:bodyPr/>
           <a:lstStyle/>
           <a:p>
-            <a:fld id="{0135EB83-58DA-4F12-BC5C-B8CA458719B9}" type="datetimeFigureOut">
+            <a:fld id="{825B9EEA-A49D-46A8-9673-EB06C0B0D8BE}" type="datetime1">
               <a:rPr lang="en-US" smtClean="0"/>
-              <a:t>6/29/2018</a:t>
+              <a:t>7/3/2018</a:t>
             </a:fld>
             <a:endParaRPr lang="en-US"/>
           </a:p>
@@ -4172,9 +3959,9 @@
           <a:bodyPr/>
           <a:lstStyle/>
           <a:p>
-            <a:fld id="{0135EB83-58DA-4F12-BC5C-B8CA458719B9}" type="datetimeFigureOut">
+            <a:fld id="{02C75F2E-8EA8-4AB5-94DB-A385BA88D899}" type="datetime1">
               <a:rPr lang="en-US" smtClean="0"/>
-              <a:t>6/29/2018</a:t>
+              <a:t>7/3/2018</a:t>
             </a:fld>
             <a:endParaRPr lang="en-US"/>
           </a:p>
@@ -4404,9 +4191,9 @@
           <a:bodyPr/>
           <a:lstStyle/>
           <a:p>
-            <a:fld id="{0135EB83-58DA-4F12-BC5C-B8CA458719B9}" type="datetimeFigureOut">
+            <a:fld id="{12DF4575-67C5-4C2C-B9ED-34478E7F5510}" type="datetime1">
               <a:rPr lang="en-US" smtClean="0"/>
-              <a:t>6/29/2018</a:t>
+              <a:t>7/3/2018</a:t>
             </a:fld>
             <a:endParaRPr lang="en-US"/>
           </a:p>
@@ -4652,9 +4439,9 @@
           <a:bodyPr/>
           <a:lstStyle/>
           <a:p>
-            <a:fld id="{0135EB83-58DA-4F12-BC5C-B8CA458719B9}" type="datetimeFigureOut">
+            <a:fld id="{0289DED3-D93D-48F2-8FFB-E1507B40E30D}" type="datetime1">
               <a:rPr lang="en-US" smtClean="0"/>
-              <a:t>6/29/2018</a:t>
+              <a:t>7/3/2018</a:t>
             </a:fld>
             <a:endParaRPr lang="en-US"/>
           </a:p>
@@ -4919,9 +4706,9 @@
           <a:bodyPr/>
           <a:lstStyle/>
           <a:p>
-            <a:fld id="{0135EB83-58DA-4F12-BC5C-B8CA458719B9}" type="datetimeFigureOut">
+            <a:fld id="{05AD0120-E07D-4DD4-910E-109AB166C86A}" type="datetime1">
               <a:rPr lang="en-US" smtClean="0"/>
-              <a:t>6/29/2018</a:t>
+              <a:t>7/3/2018</a:t>
             </a:fld>
             <a:endParaRPr lang="en-US"/>
           </a:p>
@@ -5010,7 +4797,7 @@
   <p:clrMapOvr>
     <a:masterClrMapping/>
   </p:clrMapOvr>
-  <p:extLst>
+  <p:extLst mod="1">
     <p:ext uri="{DCECCB84-F9BA-43D5-87BE-67443E8EF086}">
       <p15:sldGuideLst xmlns:p15="http://schemas.microsoft.com/office/powerpoint/2012/main"/>
     </p:ext>
@@ -5337,9 +5124,9 @@
           <a:bodyPr/>
           <a:lstStyle/>
           <a:p>
-            <a:fld id="{0135EB83-58DA-4F12-BC5C-B8CA458719B9}" type="datetimeFigureOut">
+            <a:fld id="{E2184E0A-F5A1-4966-A14C-0AE25DF1120C}" type="datetime1">
               <a:rPr lang="en-US" smtClean="0"/>
-              <a:t>6/29/2018</a:t>
+              <a:t>7/3/2018</a:t>
             </a:fld>
             <a:endParaRPr lang="en-US"/>
           </a:p>
@@ -5486,9 +5273,9 @@
           <a:bodyPr/>
           <a:lstStyle/>
           <a:p>
-            <a:fld id="{0135EB83-58DA-4F12-BC5C-B8CA458719B9}" type="datetimeFigureOut">
+            <a:fld id="{78717DB1-7AC0-4254-B37E-10A6253240A8}" type="datetime1">
               <a:rPr lang="en-US" smtClean="0"/>
-              <a:t>6/29/2018</a:t>
+              <a:t>7/3/2018</a:t>
             </a:fld>
             <a:endParaRPr lang="en-US"/>
           </a:p>
@@ -5612,9 +5399,9 @@
           <a:bodyPr/>
           <a:lstStyle/>
           <a:p>
-            <a:fld id="{0135EB83-58DA-4F12-BC5C-B8CA458719B9}" type="datetimeFigureOut">
+            <a:fld id="{FA68F4E6-440C-4499-9A96-D9C4445197BA}" type="datetime1">
               <a:rPr lang="en-US" smtClean="0"/>
-              <a:t>6/29/2018</a:t>
+              <a:t>7/3/2018</a:t>
             </a:fld>
             <a:endParaRPr lang="en-US"/>
           </a:p>
@@ -5867,9 +5654,9 @@
           <a:bodyPr/>
           <a:lstStyle/>
           <a:p>
-            <a:fld id="{0135EB83-58DA-4F12-BC5C-B8CA458719B9}" type="datetimeFigureOut">
+            <a:fld id="{7FEA4A58-2C6C-4A3D-BE0A-A5BBAA7989C2}" type="datetime1">
               <a:rPr lang="en-US" smtClean="0"/>
-              <a:t>6/29/2018</a:t>
+              <a:t>7/3/2018</a:t>
             </a:fld>
             <a:endParaRPr lang="en-US"/>
           </a:p>
@@ -5958,7 +5745,7 @@
   <p:clrMapOvr>
     <a:masterClrMapping/>
   </p:clrMapOvr>
-  <p:extLst>
+  <p:extLst mod="1">
     <p:ext uri="{DCECCB84-F9BA-43D5-87BE-67443E8EF086}">
       <p15:sldGuideLst xmlns:p15="http://schemas.microsoft.com/office/powerpoint/2012/main"/>
     </p:ext>
@@ -6187,9 +5974,9 @@
           <a:bodyPr/>
           <a:lstStyle/>
           <a:p>
-            <a:fld id="{0135EB83-58DA-4F12-BC5C-B8CA458719B9}" type="datetimeFigureOut">
+            <a:fld id="{1ADED21A-0C5C-4033-A228-571D55FAADE1}" type="datetime1">
               <a:rPr lang="en-US" smtClean="0"/>
-              <a:t>6/29/2018</a:t>
+              <a:t>7/3/2018</a:t>
             </a:fld>
             <a:endParaRPr lang="en-US"/>
           </a:p>
@@ -6538,9 +6325,9 @@
             </a:lvl1pPr>
           </a:lstStyle>
           <a:p>
-            <a:fld id="{0135EB83-58DA-4F12-BC5C-B8CA458719B9}" type="datetimeFigureOut">
+            <a:fld id="{9FB6491C-38D9-4B38-BF08-D16F21C04254}" type="datetime1">
               <a:rPr lang="en-US" smtClean="0"/>
-              <a:t>6/29/2018</a:t>
+              <a:t>7/3/2018</a:t>
             </a:fld>
             <a:endParaRPr lang="en-US"/>
           </a:p>
@@ -6651,6 +6438,7 @@
     <p:sldLayoutId id="2147484100" r:id="rId16"/>
     <p:sldLayoutId id="2147484101" r:id="rId17"/>
   </p:sldLayoutIdLst>
+  <p:hf hdr="0" ftr="0" dt="0"/>
   <p:txStyles>
     <p:titleStyle>
       <a:lvl1pPr algn="ctr" defTabSz="457200" rtl="0" eaLnBrk="1" latinLnBrk="0" hangingPunct="1">
@@ -7063,7 +6851,7 @@
       </a:lvl9pPr>
     </p:otherStyle>
   </p:txStyles>
-  <p:extLst>
+  <p:extLst mod="1">
     <p:ext uri="{27BBF7A9-308A-43DC-89C8-2F10F3537804}">
       <p15:sldGuideLst xmlns:p15="http://schemas.microsoft.com/office/powerpoint/2012/main"/>
     </p:ext>
@@ -7245,10 +7033,10 @@
       </p:grpSpPr>
       <p:sp>
         <p:nvSpPr>
-          <p:cNvPr id="2" name="Titlu 1">
+          <p:cNvPr id="7" name="Title 6">
             <a:extLst>
               <a:ext uri="{FF2B5EF4-FFF2-40B4-BE49-F238E27FC236}">
-                <a16:creationId xmlns:a16="http://schemas.microsoft.com/office/drawing/2014/main" id="{895EE26D-EA47-4C0F-859C-6211E9F98674}"/>
+                <a16:creationId xmlns:a16="http://schemas.microsoft.com/office/drawing/2014/main" id="{57108BA4-0ACE-4565-A473-405614C4FD21}"/>
               </a:ext>
             </a:extLst>
           </p:cNvPr>
@@ -7264,137 +7052,171 @@
           <a:bodyPr/>
           <a:lstStyle/>
           <a:p>
-            <a:pPr algn="ctr"/>
             <a:r>
               <a:rPr lang="en-US" b="1">
                 <a:latin typeface="Palatino Linotype" panose="02040502050505030304" pitchFamily="18" charset="0"/>
               </a:rPr>
-              <a:t>Demo</a:t>
-            </a:r>
-          </a:p>
-        </p:txBody>
-      </p:sp>
-      <p:pic>
-        <p:nvPicPr>
-          <p:cNvPr id="7" name="Content Placeholder 6">
+              <a:t>Concluzii</a:t>
+            </a:r>
+          </a:p>
+        </p:txBody>
+      </p:sp>
+      <p:sp>
+        <p:nvSpPr>
+          <p:cNvPr id="8" name="Content Placeholder 7">
             <a:extLst>
               <a:ext uri="{FF2B5EF4-FFF2-40B4-BE49-F238E27FC236}">
-                <a16:creationId xmlns:a16="http://schemas.microsoft.com/office/drawing/2014/main" id="{E478D1FB-0A4C-45BA-BDCB-350F71ABB9E0}"/>
+                <a16:creationId xmlns:a16="http://schemas.microsoft.com/office/drawing/2014/main" id="{248D2AA5-85CC-40EB-BB24-1D36346ACA80}"/>
               </a:ext>
             </a:extLst>
           </p:cNvPr>
-          <p:cNvPicPr>
-            <a:picLocks noGrp="1" noChangeAspect="1"/>
-          </p:cNvPicPr>
-          <p:nvPr>
-            <p:ph sz="half" idx="2"/>
-          </p:nvPr>
-        </p:nvPicPr>
-        <p:blipFill>
-          <a:blip r:embed="rId3"/>
-          <a:stretch>
-            <a:fillRect/>
-          </a:stretch>
-        </p:blipFill>
-        <p:spPr>
-          <a:xfrm>
-            <a:off x="1295403" y="3697958"/>
-            <a:ext cx="2690671" cy="2235693"/>
-          </a:xfrm>
-          <a:prstGeom prst="rect">
-            <a:avLst/>
-          </a:prstGeom>
-        </p:spPr>
-      </p:pic>
-      <p:pic>
-        <p:nvPicPr>
-          <p:cNvPr id="8" name="Content Placeholder 7">
+          <p:cNvSpPr>
+            <a:spLocks noGrp="1"/>
+          </p:cNvSpPr>
+          <p:nvPr>
+            <p:ph idx="1"/>
+          </p:nvPr>
+        </p:nvSpPr>
+        <p:spPr/>
+        <p:txBody>
+          <a:bodyPr/>
+          <a:lstStyle/>
+          <a:p>
+            <a:pPr>
+              <a:buSzPct val="200000"/>
+              <a:buFont typeface="Gabriola" panose="04040605051002020D02" pitchFamily="82" charset="0"/>
+              <a:buChar char="›"/>
+            </a:pPr>
+            <a:r>
+              <a:rPr lang="en-US" sz="2800" b="1">
+                <a:latin typeface="Gabriola" panose="04040605051002020D02" pitchFamily="82" charset="0"/>
+              </a:rPr>
+              <a:t>Scopul aplica</a:t>
+            </a:r>
+            <a:r>
+              <a:rPr lang="ro-RO" sz="2800" b="1">
+                <a:latin typeface="Gabriola" panose="04040605051002020D02" pitchFamily="82" charset="0"/>
+              </a:rPr>
+              <a:t>ției </a:t>
+            </a:r>
+            <a:r>
+              <a:rPr lang="ro-RO" sz="2800">
+                <a:latin typeface="Gabriola" panose="04040605051002020D02" pitchFamily="82" charset="0"/>
+              </a:rPr>
+              <a:t>– </a:t>
+            </a:r>
+            <a:r>
+              <a:rPr lang="en-US" sz="2800">
+                <a:latin typeface="Gabriola" panose="04040605051002020D02" pitchFamily="82" charset="0"/>
+              </a:rPr>
+              <a:t>un mediu pl</a:t>
+            </a:r>
+            <a:r>
+              <a:rPr lang="ro-RO" sz="2800">
+                <a:latin typeface="Gabriola" panose="04040605051002020D02" pitchFamily="82" charset="0"/>
+              </a:rPr>
+              <a:t>ăcut ce oferă cititorilor oportunități pe diverse planuri</a:t>
+            </a:r>
+          </a:p>
+          <a:p>
+            <a:pPr>
+              <a:buSzPct val="200000"/>
+              <a:buFont typeface="Gabriola" panose="04040605051002020D02" pitchFamily="82" charset="0"/>
+              <a:buChar char="›"/>
+            </a:pPr>
+            <a:r>
+              <a:rPr lang="en-US" sz="2800" b="1">
+                <a:latin typeface="Gabriola" panose="04040605051002020D02" pitchFamily="82" charset="0"/>
+              </a:rPr>
+              <a:t>Evolu</a:t>
+            </a:r>
+            <a:r>
+              <a:rPr lang="ro-RO" sz="2800" b="1">
+                <a:latin typeface="Gabriola" panose="04040605051002020D02" pitchFamily="82" charset="0"/>
+              </a:rPr>
+              <a:t>ția ideilor </a:t>
+            </a:r>
+            <a:r>
+              <a:rPr lang="ro-RO" sz="2800">
+                <a:latin typeface="Gabriola" panose="04040605051002020D02" pitchFamily="82" charset="0"/>
+              </a:rPr>
+              <a:t>– dezvoltarea sau apariția unor funcționalități pe parcursul realizării aplicației</a:t>
+            </a:r>
+          </a:p>
+          <a:p>
+            <a:pPr>
+              <a:buSzPct val="200000"/>
+              <a:buFont typeface="Gabriola" panose="04040605051002020D02" pitchFamily="82" charset="0"/>
+              <a:buChar char="›"/>
+            </a:pPr>
+            <a:r>
+              <a:rPr lang="ro-RO" sz="2800" b="1">
+                <a:latin typeface="Gabriola" panose="04040605051002020D02" pitchFamily="82" charset="0"/>
+              </a:rPr>
+              <a:t>Experiența dobândită </a:t>
+            </a:r>
+            <a:r>
+              <a:rPr lang="ro-RO" sz="2800">
+                <a:latin typeface="Gabriola" panose="04040605051002020D02" pitchFamily="82" charset="0"/>
+              </a:rPr>
+              <a:t>– pe plan tehnic, prin înțelegerea unor concepte sau tehnologii</a:t>
+            </a:r>
+          </a:p>
+          <a:p>
+            <a:endParaRPr lang="en-US"/>
+          </a:p>
+        </p:txBody>
+      </p:sp>
+      <p:sp>
+        <p:nvSpPr>
+          <p:cNvPr id="9" name="Slide Number Placeholder 8">
             <a:extLst>
               <a:ext uri="{FF2B5EF4-FFF2-40B4-BE49-F238E27FC236}">
-                <a16:creationId xmlns:a16="http://schemas.microsoft.com/office/drawing/2014/main" id="{45C7C4F9-28D0-4AD8-89D8-3992A1E737E5}"/>
+                <a16:creationId xmlns:a16="http://schemas.microsoft.com/office/drawing/2014/main" id="{9DBC4D3E-9DEE-415B-9A49-225BE2EB68DF}"/>
               </a:ext>
             </a:extLst>
           </p:cNvPr>
-          <p:cNvPicPr>
-            <a:picLocks noGrp="1" noChangeAspect="1"/>
-          </p:cNvPicPr>
-          <p:nvPr>
-            <p:ph sz="quarter" idx="4"/>
-          </p:nvPr>
-        </p:nvPicPr>
-        <p:blipFill>
-          <a:blip r:embed="rId4"/>
-          <a:stretch>
-            <a:fillRect/>
-          </a:stretch>
-        </p:blipFill>
+          <p:cNvSpPr>
+            <a:spLocks noGrp="1"/>
+          </p:cNvSpPr>
+          <p:nvPr>
+            <p:ph type="sldNum" sz="quarter" idx="12"/>
+          </p:nvPr>
+        </p:nvSpPr>
         <p:spPr>
           <a:xfrm>
-            <a:off x="8205928" y="3784459"/>
-            <a:ext cx="2747045" cy="2272453"/>
+            <a:off x="5824650" y="6332794"/>
+            <a:ext cx="542697" cy="279400"/>
           </a:xfrm>
-          <a:prstGeom prst="rect">
-            <a:avLst/>
-          </a:prstGeom>
         </p:spPr>
-      </p:pic>
-      <p:pic>
-        <p:nvPicPr>
-          <p:cNvPr id="9" name="Picture 8">
-            <a:extLst>
-              <a:ext uri="{FF2B5EF4-FFF2-40B4-BE49-F238E27FC236}">
-                <a16:creationId xmlns:a16="http://schemas.microsoft.com/office/drawing/2014/main" id="{02CEDAB6-3CEF-432D-8B83-C18D0A1F687C}"/>
-              </a:ext>
-            </a:extLst>
-          </p:cNvPr>
-          <p:cNvPicPr>
-            <a:picLocks noChangeAspect="1"/>
-          </p:cNvPicPr>
-          <p:nvPr/>
-        </p:nvPicPr>
-        <p:blipFill>
-          <a:blip r:embed="rId5"/>
-          <a:stretch>
-            <a:fillRect/>
-          </a:stretch>
-        </p:blipFill>
-        <p:spPr>
-          <a:xfrm>
-            <a:off x="4722477" y="2711203"/>
-            <a:ext cx="2747045" cy="1973509"/>
-          </a:xfrm>
-          <a:prstGeom prst="rect">
-            <a:avLst/>
-          </a:prstGeom>
-          <a:ln>
-            <a:solidFill>
-              <a:schemeClr val="tx1"/>
-            </a:solidFill>
-          </a:ln>
-        </p:spPr>
-      </p:pic>
+        <p:txBody>
+          <a:bodyPr/>
+          <a:lstStyle/>
+          <a:p>
+            <a:pPr algn="ctr"/>
+            <a:r>
+              <a:rPr lang="en-US" sz="2800" b="1">
+                <a:solidFill>
+                  <a:schemeClr val="bg1"/>
+                </a:solidFill>
+                <a:latin typeface="Palatino Linotype" panose="02040502050505030304" pitchFamily="18" charset="0"/>
+              </a:rPr>
+              <a:t>9</a:t>
+            </a:r>
+          </a:p>
+        </p:txBody>
+      </p:sp>
     </p:spTree>
     <p:extLst>
       <p:ext uri="{BB962C8B-B14F-4D97-AF65-F5344CB8AC3E}">
-        <p14:creationId xmlns:p14="http://schemas.microsoft.com/office/powerpoint/2010/main" val="2947156239"/>
+        <p14:creationId xmlns:p14="http://schemas.microsoft.com/office/powerpoint/2010/main" val="3940126560"/>
       </p:ext>
     </p:extLst>
   </p:cSld>
   <p:clrMapOvr>
     <a:masterClrMapping/>
   </p:clrMapOvr>
-  <mc:AlternateContent xmlns:mc="http://schemas.openxmlformats.org/markup-compatibility/2006" xmlns:p15="http://schemas.microsoft.com/office/powerpoint/2012/main">
-    <mc:Choice Requires="p15">
-      <p:transition xmlns:p14="http://schemas.microsoft.com/office/powerpoint/2010/main" spd="slow" p14:dur="1250">
-        <p15:prstTrans prst="pageCurlDouble"/>
-      </p:transition>
-    </mc:Choice>
-    <mc:Fallback xmlns="">
-      <p:transition spd="slow">
-        <p:fade/>
-      </p:transition>
-    </mc:Fallback>
-  </mc:AlternateContent>
+  <p:transition/>
 </p:sld>
 </file>
 
@@ -7417,10 +7239,10 @@
       </p:grpSpPr>
       <p:sp>
         <p:nvSpPr>
-          <p:cNvPr id="2" name="Titlu 1">
+          <p:cNvPr id="2" name="Title 1">
             <a:extLst>
               <a:ext uri="{FF2B5EF4-FFF2-40B4-BE49-F238E27FC236}">
-                <a16:creationId xmlns:a16="http://schemas.microsoft.com/office/drawing/2014/main" id="{B787117F-C480-4CA6-B7C7-0CE94FDDAB15}"/>
+                <a16:creationId xmlns:a16="http://schemas.microsoft.com/office/drawing/2014/main" id="{64B26B38-AEDA-48AA-BF82-AEBC0B6DABA6}"/>
               </a:ext>
             </a:extLst>
           </p:cNvPr>
@@ -7436,25 +7258,21 @@
           <a:bodyPr/>
           <a:lstStyle/>
           <a:p>
-            <a:pPr algn="ctr"/>
-            <a:r>
-              <a:rPr lang="en-US" b="1" err="1">
+            <a:r>
+              <a:rPr lang="en-US" b="1">
                 <a:latin typeface="Palatino Linotype" panose="02040502050505030304" pitchFamily="18" charset="0"/>
               </a:rPr>
-              <a:t>Concluzii</a:t>
-            </a:r>
-            <a:endParaRPr lang="en-US" b="1">
-              <a:latin typeface="Palatino Linotype" panose="02040502050505030304" pitchFamily="18" charset="0"/>
-            </a:endParaRPr>
-          </a:p>
-        </p:txBody>
-      </p:sp>
-      <p:sp>
-        <p:nvSpPr>
-          <p:cNvPr id="3" name="Substituent conținut 2">
+              <a:t>Q&amp;A</a:t>
+            </a:r>
+          </a:p>
+        </p:txBody>
+      </p:sp>
+      <p:sp>
+        <p:nvSpPr>
+          <p:cNvPr id="3" name="Slide Number Placeholder 2">
             <a:extLst>
               <a:ext uri="{FF2B5EF4-FFF2-40B4-BE49-F238E27FC236}">
-                <a16:creationId xmlns:a16="http://schemas.microsoft.com/office/drawing/2014/main" id="{BDF5B156-9D7C-49EC-8FC2-13520FC941B2}"/>
+                <a16:creationId xmlns:a16="http://schemas.microsoft.com/office/drawing/2014/main" id="{BB1AA734-153A-4BD9-9558-9119FE230F24}"/>
               </a:ext>
             </a:extLst>
           </p:cNvPr>
@@ -7462,109 +7280,43 @@
             <a:spLocks noGrp="1"/>
           </p:cNvSpPr>
           <p:nvPr>
-            <p:ph idx="1"/>
-          </p:nvPr>
-        </p:nvSpPr>
-        <p:spPr/>
+            <p:ph type="sldNum" sz="quarter" idx="12"/>
+          </p:nvPr>
+        </p:nvSpPr>
+        <p:spPr>
+          <a:xfrm>
+            <a:off x="5824651" y="6342626"/>
+            <a:ext cx="542697" cy="279400"/>
+          </a:xfrm>
+        </p:spPr>
         <p:txBody>
           <a:bodyPr/>
           <a:lstStyle/>
           <a:p>
-            <a:pPr>
-              <a:buSzPct val="200000"/>
-              <a:buFont typeface="Gabriola" panose="04040605051002020D02" pitchFamily="82" charset="0"/>
-              <a:buChar char="›"/>
-            </a:pPr>
+            <a:pPr algn="ctr"/>
             <a:r>
               <a:rPr lang="en-US" sz="2800" b="1">
-                <a:latin typeface="Gabriola" panose="04040605051002020D02" pitchFamily="82" charset="0"/>
+                <a:solidFill>
+                  <a:schemeClr val="bg1"/>
+                </a:solidFill>
+                <a:latin typeface="Palatino Linotype" panose="02040502050505030304" pitchFamily="18" charset="0"/>
               </a:rPr>
-              <a:t>Scopul aplica</a:t>
-            </a:r>
-            <a:r>
-              <a:rPr lang="ro-RO" sz="2800" b="1">
-                <a:latin typeface="Gabriola" panose="04040605051002020D02" pitchFamily="82" charset="0"/>
-              </a:rPr>
-              <a:t>ției </a:t>
-            </a:r>
-            <a:r>
-              <a:rPr lang="ro-RO" sz="2800">
-                <a:latin typeface="Gabriola" panose="04040605051002020D02" pitchFamily="82" charset="0"/>
-              </a:rPr>
-              <a:t>– inovatoare când vine vorba de funcționalități</a:t>
-            </a:r>
-          </a:p>
-          <a:p>
-            <a:pPr>
-              <a:buSzPct val="200000"/>
-              <a:buFont typeface="Gabriola" panose="04040605051002020D02" pitchFamily="82" charset="0"/>
-              <a:buChar char="›"/>
-            </a:pPr>
-            <a:r>
-              <a:rPr lang="en-US" sz="2800" b="1">
-                <a:latin typeface="Gabriola" panose="04040605051002020D02" pitchFamily="82" charset="0"/>
-              </a:rPr>
-              <a:t>Evolu</a:t>
-            </a:r>
-            <a:r>
-              <a:rPr lang="ro-RO" sz="2800" b="1">
-                <a:latin typeface="Gabriola" panose="04040605051002020D02" pitchFamily="82" charset="0"/>
-              </a:rPr>
-              <a:t>ția ideilor </a:t>
-            </a:r>
-            <a:r>
-              <a:rPr lang="ro-RO" sz="2800">
-                <a:latin typeface="Gabriola" panose="04040605051002020D02" pitchFamily="82" charset="0"/>
-              </a:rPr>
-              <a:t>– dezvoltarea sau apariția unor funcționalități pe parcursul realizării aplicației</a:t>
-            </a:r>
-          </a:p>
-          <a:p>
-            <a:pPr>
-              <a:buSzPct val="200000"/>
-              <a:buFont typeface="Gabriola" panose="04040605051002020D02" pitchFamily="82" charset="0"/>
-              <a:buChar char="›"/>
-            </a:pPr>
-            <a:r>
-              <a:rPr lang="ro-RO" sz="2800" b="1">
-                <a:latin typeface="Gabriola" panose="04040605051002020D02" pitchFamily="82" charset="0"/>
-              </a:rPr>
-              <a:t>Experiența dobândită </a:t>
-            </a:r>
-            <a:r>
-              <a:rPr lang="ro-RO" sz="2800">
-                <a:latin typeface="Gabriola" panose="04040605051002020D02" pitchFamily="82" charset="0"/>
-              </a:rPr>
-              <a:t>– pe plan tehnic, prin înțelegerea unor concepte sau tehnologii</a:t>
-            </a:r>
-          </a:p>
-          <a:p>
-            <a:endParaRPr lang="en-US"/>
+              <a:t>10</a:t>
+            </a:r>
           </a:p>
         </p:txBody>
       </p:sp>
     </p:spTree>
     <p:extLst>
       <p:ext uri="{BB962C8B-B14F-4D97-AF65-F5344CB8AC3E}">
-        <p14:creationId xmlns:p14="http://schemas.microsoft.com/office/powerpoint/2010/main" val="3514780396"/>
+        <p14:creationId xmlns:p14="http://schemas.microsoft.com/office/powerpoint/2010/main" val="4173406241"/>
       </p:ext>
     </p:extLst>
   </p:cSld>
   <p:clrMapOvr>
     <a:masterClrMapping/>
   </p:clrMapOvr>
-  <mc:AlternateContent xmlns:mc="http://schemas.openxmlformats.org/markup-compatibility/2006" xmlns:p15="http://schemas.microsoft.com/office/powerpoint/2012/main">
-    <mc:Choice Requires="p15">
-      <p:transition xmlns:p14="http://schemas.microsoft.com/office/powerpoint/2010/main" spd="slow" p14:dur="1250">
-        <p15:prstTrans prst="pageCurlDouble"/>
-      </p:transition>
-    </mc:Choice>
-    <mc:Fallback xmlns="">
-      <p:transition spd="slow">
-        <p:fade/>
-      </p:transition>
-    </mc:Fallback>
-  </mc:AlternateContent>
+  <p:transition/>
 </p:sld>
 </file>
 
@@ -7626,6 +7378,45 @@
           </a:p>
         </p:txBody>
       </p:sp>
+      <p:sp>
+        <p:nvSpPr>
+          <p:cNvPr id="2" name="Slide Number Placeholder 1">
+            <a:extLst>
+              <a:ext uri="{FF2B5EF4-FFF2-40B4-BE49-F238E27FC236}">
+                <a16:creationId xmlns:a16="http://schemas.microsoft.com/office/drawing/2014/main" id="{D7A32942-25BC-4228-9DB3-EC2C3748D7E0}"/>
+              </a:ext>
+            </a:extLst>
+          </p:cNvPr>
+          <p:cNvSpPr>
+            <a:spLocks noGrp="1"/>
+          </p:cNvSpPr>
+          <p:nvPr>
+            <p:ph type="sldNum" sz="quarter" idx="12"/>
+          </p:nvPr>
+        </p:nvSpPr>
+        <p:spPr>
+          <a:xfrm>
+            <a:off x="5824651" y="6342626"/>
+            <a:ext cx="542697" cy="279400"/>
+          </a:xfrm>
+        </p:spPr>
+        <p:txBody>
+          <a:bodyPr/>
+          <a:lstStyle/>
+          <a:p>
+            <a:pPr algn="ctr"/>
+            <a:r>
+              <a:rPr lang="en-US" sz="2800" b="1">
+                <a:solidFill>
+                  <a:schemeClr val="bg1"/>
+                </a:solidFill>
+                <a:latin typeface="Palatino Linotype" panose="02040502050505030304" pitchFamily="18" charset="0"/>
+              </a:rPr>
+              <a:t>11</a:t>
+            </a:r>
+          </a:p>
+        </p:txBody>
+      </p:sp>
     </p:spTree>
     <p:extLst>
       <p:ext uri="{BB962C8B-B14F-4D97-AF65-F5344CB8AC3E}">
@@ -7636,14 +7427,14 @@
   <p:clrMapOvr>
     <a:masterClrMapping/>
   </p:clrMapOvr>
-  <mc:AlternateContent xmlns:mc="http://schemas.openxmlformats.org/markup-compatibility/2006" xmlns:p14="http://schemas.microsoft.com/office/powerpoint/2010/main">
-    <mc:Choice Requires="p14">
-      <p:transition spd="slow" p14:dur="3400">
+  <mc:AlternateContent xmlns:mc="http://schemas.openxmlformats.org/markup-compatibility/2006">
+    <mc:Choice xmlns:p14="http://schemas.microsoft.com/office/powerpoint/2010/main" Requires="p14">
+      <p:transition>
         <p14:reveal/>
       </p:transition>
     </mc:Choice>
-    <mc:Fallback xmlns="">
-      <p:transition spd="slow">
+    <mc:Fallback>
+      <p:transition>
         <p:fade/>
       </p:transition>
     </mc:Fallback>
@@ -7726,7 +7517,7 @@
         </p:spPr>
         <p:txBody>
           <a:bodyPr>
-            <a:normAutofit/>
+            <a:normAutofit fontScale="92500" lnSpcReduction="20000"/>
           </a:bodyPr>
           <a:lstStyle/>
           <a:p>
@@ -7774,6 +7565,24 @@
                 <a:latin typeface="Gabriola" panose="04040605051002020D02" pitchFamily="82" charset="0"/>
               </a:rPr>
               <a:t>ții similare</a:t>
+            </a:r>
+          </a:p>
+          <a:p>
+            <a:pPr>
+              <a:buSzPct val="200000"/>
+              <a:buFont typeface="Gabriola" panose="04040605051002020D02" pitchFamily="82" charset="0"/>
+              <a:buChar char="›"/>
+            </a:pPr>
+            <a:r>
+              <a:rPr lang="ro-RO" sz="2800">
+                <a:solidFill>
+                  <a:schemeClr val="accent6">
+                    <a:lumMod val="50000"/>
+                  </a:schemeClr>
+                </a:solidFill>
+                <a:latin typeface="Gabriola" panose="04040605051002020D02" pitchFamily="82" charset="0"/>
+              </a:rPr>
+              <a:t>Contribuții</a:t>
             </a:r>
           </a:p>
           <a:p>
@@ -7819,24 +7628,6 @@
               </a:rPr>
               <a:t>Demo</a:t>
             </a:r>
-          </a:p>
-          <a:p>
-            <a:pPr>
-              <a:buSzPct val="200000"/>
-              <a:buFont typeface="Gabriola" panose="04040605051002020D02" pitchFamily="82" charset="0"/>
-              <a:buChar char="›"/>
-            </a:pPr>
-            <a:r>
-              <a:rPr lang="ro-RO" sz="2800">
-                <a:solidFill>
-                  <a:schemeClr val="accent6">
-                    <a:lumMod val="50000"/>
-                  </a:schemeClr>
-                </a:solidFill>
-                <a:latin typeface="Gabriola" panose="04040605051002020D02" pitchFamily="82" charset="0"/>
-              </a:rPr>
-              <a:t>Concluzii</a:t>
-            </a:r>
             <a:endParaRPr lang="en-US" sz="2800">
               <a:solidFill>
                 <a:schemeClr val="accent6">
@@ -7845,6 +7636,50 @@
               </a:solidFill>
               <a:latin typeface="Gabriola" panose="04040605051002020D02" pitchFamily="82" charset="0"/>
             </a:endParaRPr>
+          </a:p>
+          <a:p>
+            <a:pPr>
+              <a:buSzPct val="200000"/>
+              <a:buFont typeface="Gabriola" panose="04040605051002020D02" pitchFamily="82" charset="0"/>
+              <a:buChar char="›"/>
+            </a:pPr>
+            <a:r>
+              <a:rPr lang="en-US" sz="2800">
+                <a:solidFill>
+                  <a:schemeClr val="accent6">
+                    <a:lumMod val="50000"/>
+                  </a:schemeClr>
+                </a:solidFill>
+                <a:latin typeface="Gabriola" panose="04040605051002020D02" pitchFamily="82" charset="0"/>
+              </a:rPr>
+              <a:t>Concluzii</a:t>
+            </a:r>
+            <a:endParaRPr lang="ro-RO" sz="2800">
+              <a:solidFill>
+                <a:schemeClr val="accent6">
+                  <a:lumMod val="50000"/>
+                </a:schemeClr>
+              </a:solidFill>
+              <a:latin typeface="Gabriola" panose="04040605051002020D02" pitchFamily="82" charset="0"/>
+            </a:endParaRPr>
+          </a:p>
+          <a:p>
+            <a:pPr>
+              <a:buSzPct val="200000"/>
+              <a:buFont typeface="Gabriola" panose="04040605051002020D02" pitchFamily="82" charset="0"/>
+              <a:buChar char="›"/>
+            </a:pPr>
+            <a:r>
+              <a:rPr lang="en-US" sz="2800">
+                <a:solidFill>
+                  <a:schemeClr val="accent6">
+                    <a:lumMod val="50000"/>
+                  </a:schemeClr>
+                </a:solidFill>
+                <a:latin typeface="Gabriola" panose="04040605051002020D02" pitchFamily="82" charset="0"/>
+              </a:rPr>
+              <a:t>Q&amp;A</a:t>
+            </a:r>
           </a:p>
         </p:txBody>
       </p:sp>
@@ -7858,14 +7693,14 @@
   <p:clrMapOvr>
     <a:masterClrMapping/>
   </p:clrMapOvr>
-  <mc:AlternateContent xmlns:mc="http://schemas.openxmlformats.org/markup-compatibility/2006" xmlns:p159="http://schemas.microsoft.com/office/powerpoint/2015/09/main">
-    <mc:Choice Requires="p159">
-      <p:transition xmlns:p14="http://schemas.microsoft.com/office/powerpoint/2010/main" spd="slow" p14:dur="2000">
+  <mc:AlternateContent xmlns:mc="http://schemas.openxmlformats.org/markup-compatibility/2006">
+    <mc:Choice xmlns:p159="http://schemas.microsoft.com/office/powerpoint/2015/09/main" Requires="p159">
+      <p:transition>
         <p159:morph option="byObject"/>
       </p:transition>
     </mc:Choice>
-    <mc:Fallback xmlns="">
-      <p:transition spd="slow">
+    <mc:Fallback>
+      <p:transition>
         <p:fade/>
       </p:transition>
     </mc:Fallback>
@@ -7940,7 +7775,12 @@
             <p:ph idx="1"/>
           </p:nvPr>
         </p:nvSpPr>
-        <p:spPr/>
+        <p:spPr>
+          <a:xfrm>
+            <a:off x="1295402" y="2864408"/>
+            <a:ext cx="9601196" cy="3318936"/>
+          </a:xfrm>
+        </p:spPr>
         <p:txBody>
           <a:bodyPr/>
           <a:lstStyle/>
@@ -7951,26 +7791,84 @@
               <a:buChar char="›"/>
             </a:pPr>
             <a:r>
+              <a:rPr lang="en-US" sz="2800" b="1">
+                <a:latin typeface="Gabriola" panose="04040605051002020D02" pitchFamily="82" charset="0"/>
+              </a:rPr>
+              <a:t>ExploreBooks - </a:t>
+            </a:r>
+            <a:r>
+              <a:rPr lang="en-US" sz="2800">
+                <a:latin typeface="Gabriola" panose="04040605051002020D02" pitchFamily="82" charset="0"/>
+              </a:rPr>
+              <a:t>aplica</a:t>
+            </a:r>
+            <a:r>
               <a:rPr lang="ro-RO" sz="2800">
                 <a:latin typeface="Gabriola" panose="04040605051002020D02" pitchFamily="82" charset="0"/>
               </a:rPr>
-              <a:t>A</a:t>
+              <a:t>ție </a:t>
             </a:r>
             <a:r>
               <a:rPr lang="en-US" sz="2800">
                 <a:latin typeface="Gabriola" panose="04040605051002020D02" pitchFamily="82" charset="0"/>
               </a:rPr>
-              <a:t>plica</a:t>
+              <a:t>web </a:t>
             </a:r>
             <a:r>
               <a:rPr lang="ro-RO" sz="2800">
                 <a:latin typeface="Gabriola" panose="04040605051002020D02" pitchFamily="82" charset="0"/>
               </a:rPr>
-              <a:t>ție dedicată gestionării, citirii și exprimării opiniei în legătură cu cărțile citite</a:t>
+              <a:t>ce permite descoperirea, gestionarea și citirea cărților a căror drepturi de autor au expirat</a:t>
             </a:r>
           </a:p>
           <a:p>
             <a:endParaRPr lang="ro-RO" i="1"/>
+          </a:p>
+        </p:txBody>
+      </p:sp>
+      <p:sp>
+        <p:nvSpPr>
+          <p:cNvPr id="4" name="Slide Number Placeholder 3">
+            <a:extLst>
+              <a:ext uri="{FF2B5EF4-FFF2-40B4-BE49-F238E27FC236}">
+                <a16:creationId xmlns:a16="http://schemas.microsoft.com/office/drawing/2014/main" id="{A32BDCB8-B359-416C-80A7-71CC484E6260}"/>
+              </a:ext>
+            </a:extLst>
+          </p:cNvPr>
+          <p:cNvSpPr>
+            <a:spLocks noGrp="1"/>
+          </p:cNvSpPr>
+          <p:nvPr>
+            <p:ph type="sldNum" sz="quarter" idx="12"/>
+          </p:nvPr>
+        </p:nvSpPr>
+        <p:spPr>
+          <a:xfrm>
+            <a:off x="5824651" y="6322961"/>
+            <a:ext cx="542697" cy="279400"/>
+          </a:xfrm>
+        </p:spPr>
+        <p:txBody>
+          <a:bodyPr/>
+          <a:lstStyle/>
+          <a:p>
+            <a:pPr algn="ctr"/>
+            <a:fld id="{1FA03AA4-19DA-4C46-8EA1-48621787B7D1}" type="slidenum">
+              <a:rPr lang="en-US" sz="2800" b="1" smtClean="0">
+                <a:solidFill>
+                  <a:schemeClr val="bg1"/>
+                </a:solidFill>
+                <a:latin typeface="Palatino Linotype" panose="02040502050505030304" pitchFamily="18" charset="0"/>
+              </a:rPr>
+              <a:pPr algn="ctr"/>
+              <a:t>3</a:t>
+            </a:fld>
+            <a:endParaRPr lang="en-US" b="1">
+              <a:solidFill>
+                <a:schemeClr val="bg1"/>
+              </a:solidFill>
+              <a:latin typeface="Palatino Linotype" panose="02040502050505030304" pitchFamily="18" charset="0"/>
+            </a:endParaRPr>
           </a:p>
         </p:txBody>
       </p:sp>
@@ -7984,14 +7882,14 @@
   <p:clrMapOvr>
     <a:masterClrMapping/>
   </p:clrMapOvr>
-  <mc:AlternateContent xmlns:mc="http://schemas.openxmlformats.org/markup-compatibility/2006" xmlns:p15="http://schemas.microsoft.com/office/powerpoint/2012/main">
-    <mc:Choice Requires="p15">
-      <p:transition xmlns:p14="http://schemas.microsoft.com/office/powerpoint/2010/main" spd="slow" p14:dur="1250">
+  <mc:AlternateContent xmlns:mc="http://schemas.openxmlformats.org/markup-compatibility/2006">
+    <mc:Choice xmlns:p15="http://schemas.microsoft.com/office/powerpoint/2012/main" Requires="p15">
+      <p:transition>
         <p15:prstTrans prst="pageCurlDouble"/>
       </p:transition>
     </mc:Choice>
-    <mc:Fallback xmlns="">
-      <p:transition spd="slow">
+    <mc:Fallback>
+      <p:transition>
         <p:fade/>
       </p:transition>
     </mc:Fallback>
@@ -8021,275 +7919,6 @@
           <p:cNvPr id="2" name="Title 1">
             <a:extLst>
               <a:ext uri="{FF2B5EF4-FFF2-40B4-BE49-F238E27FC236}">
-                <a16:creationId xmlns:a16="http://schemas.microsoft.com/office/drawing/2014/main" id="{773F2DFE-2CCF-4423-BDC0-3280AA238CEA}"/>
-              </a:ext>
-            </a:extLst>
-          </p:cNvPr>
-          <p:cNvSpPr>
-            <a:spLocks noGrp="1"/>
-          </p:cNvSpPr>
-          <p:nvPr>
-            <p:ph type="title"/>
-          </p:nvPr>
-        </p:nvSpPr>
-        <p:spPr/>
-        <p:txBody>
-          <a:bodyPr/>
-          <a:lstStyle/>
-          <a:p>
-            <a:r>
-              <a:rPr lang="ro-RO" b="1">
-                <a:latin typeface="Palatino Linotype" panose="02040502050505030304" pitchFamily="18" charset="0"/>
-              </a:rPr>
-              <a:t>Tema și motivația lucrării</a:t>
-            </a:r>
-            <a:endParaRPr lang="en-US"/>
-          </a:p>
-        </p:txBody>
-      </p:sp>
-      <p:sp>
-        <p:nvSpPr>
-          <p:cNvPr id="3" name="Content Placeholder 2">
-            <a:extLst>
-              <a:ext uri="{FF2B5EF4-FFF2-40B4-BE49-F238E27FC236}">
-                <a16:creationId xmlns:a16="http://schemas.microsoft.com/office/drawing/2014/main" id="{E9305ABE-E93C-445F-9D24-C67514662D19}"/>
-              </a:ext>
-            </a:extLst>
-          </p:cNvPr>
-          <p:cNvSpPr>
-            <a:spLocks noGrp="1"/>
-          </p:cNvSpPr>
-          <p:nvPr>
-            <p:ph idx="1"/>
-          </p:nvPr>
-        </p:nvSpPr>
-        <p:spPr/>
-        <p:txBody>
-          <a:bodyPr>
-            <a:normAutofit/>
-          </a:bodyPr>
-          <a:lstStyle/>
-          <a:p>
-            <a:pPr>
-              <a:buSzPct val="200000"/>
-              <a:buFont typeface="Gabriola" panose="04040605051002020D02" pitchFamily="82" charset="0"/>
-              <a:buChar char="›"/>
-            </a:pPr>
-            <a:r>
-              <a:rPr lang="ro-RO" sz="2800">
-                <a:latin typeface="Gabriola" panose="04040605051002020D02" pitchFamily="82" charset="0"/>
-              </a:rPr>
-              <a:t>A</a:t>
-            </a:r>
-            <a:r>
-              <a:rPr lang="en-US" sz="2800">
-                <a:latin typeface="Gabriola" panose="04040605051002020D02" pitchFamily="82" charset="0"/>
-              </a:rPr>
-              <a:t>plica</a:t>
-            </a:r>
-            <a:r>
-              <a:rPr lang="ro-RO" sz="2800">
-                <a:latin typeface="Gabriola" panose="04040605051002020D02" pitchFamily="82" charset="0"/>
-              </a:rPr>
-              <a:t>ție dedicată gestionării, citirii și exprimării opiniei în legătură cu cărțile citite</a:t>
-            </a:r>
-          </a:p>
-          <a:p>
-            <a:pPr>
-              <a:buSzPct val="200000"/>
-              <a:buFont typeface="Gabriola" panose="04040605051002020D02" pitchFamily="82" charset="0"/>
-              <a:buChar char="›"/>
-            </a:pPr>
-            <a:r>
-              <a:rPr lang="ro-RO" sz="2800">
-                <a:latin typeface="Gabriola" panose="04040605051002020D02" pitchFamily="82" charset="0"/>
-              </a:rPr>
-              <a:t>Sistem de recomandări – în mod direct, prin comunitate</a:t>
-            </a:r>
-            <a:endParaRPr lang="en-US" sz="2800">
-              <a:latin typeface="Gabriola" panose="04040605051002020D02" pitchFamily="82" charset="0"/>
-            </a:endParaRPr>
-          </a:p>
-        </p:txBody>
-      </p:sp>
-    </p:spTree>
-    <p:extLst>
-      <p:ext uri="{BB962C8B-B14F-4D97-AF65-F5344CB8AC3E}">
-        <p14:creationId xmlns:p14="http://schemas.microsoft.com/office/powerpoint/2010/main" val="4038772312"/>
-      </p:ext>
-    </p:extLst>
-  </p:cSld>
-  <p:clrMapOvr>
-    <a:masterClrMapping/>
-  </p:clrMapOvr>
-  <p:transition spd="slow">
-    <p:wipe/>
-  </p:transition>
-</p:sld>
-</file>
-
-<file path=ppt/slides/slide5.xml><?xml version="1.0" encoding="utf-8"?>
-<p:sld xmlns:a="http://schemas.openxmlformats.org/drawingml/2006/main" xmlns:r="http://schemas.openxmlformats.org/officeDocument/2006/relationships" xmlns:p="http://schemas.openxmlformats.org/presentationml/2006/main">
-  <p:cSld>
-    <p:spTree>
-      <p:nvGrpSpPr>
-        <p:cNvPr id="1" name=""/>
-        <p:cNvGrpSpPr/>
-        <p:nvPr/>
-      </p:nvGrpSpPr>
-      <p:grpSpPr>
-        <a:xfrm>
-          <a:off x="0" y="0"/>
-          <a:ext cx="0" cy="0"/>
-          <a:chOff x="0" y="0"/>
-          <a:chExt cx="0" cy="0"/>
-        </a:xfrm>
-      </p:grpSpPr>
-      <p:sp>
-        <p:nvSpPr>
-          <p:cNvPr id="2" name="Title 1">
-            <a:extLst>
-              <a:ext uri="{FF2B5EF4-FFF2-40B4-BE49-F238E27FC236}">
-                <a16:creationId xmlns:a16="http://schemas.microsoft.com/office/drawing/2014/main" id="{635776C4-CE4D-4276-A9BC-2B235FA38FDD}"/>
-              </a:ext>
-            </a:extLst>
-          </p:cNvPr>
-          <p:cNvSpPr>
-            <a:spLocks noGrp="1"/>
-          </p:cNvSpPr>
-          <p:nvPr>
-            <p:ph type="title"/>
-          </p:nvPr>
-        </p:nvSpPr>
-        <p:spPr/>
-        <p:txBody>
-          <a:bodyPr/>
-          <a:lstStyle/>
-          <a:p>
-            <a:r>
-              <a:rPr lang="ro-RO" b="1">
-                <a:latin typeface="Palatino Linotype" panose="02040502050505030304" pitchFamily="18" charset="0"/>
-              </a:rPr>
-              <a:t>Tema și motivația lucrării</a:t>
-            </a:r>
-            <a:endParaRPr lang="en-US"/>
-          </a:p>
-        </p:txBody>
-      </p:sp>
-      <p:sp>
-        <p:nvSpPr>
-          <p:cNvPr id="3" name="Content Placeholder 2">
-            <a:extLst>
-              <a:ext uri="{FF2B5EF4-FFF2-40B4-BE49-F238E27FC236}">
-                <a16:creationId xmlns:a16="http://schemas.microsoft.com/office/drawing/2014/main" id="{0A81F117-ED56-44B7-9102-B2122522FBC3}"/>
-              </a:ext>
-            </a:extLst>
-          </p:cNvPr>
-          <p:cNvSpPr>
-            <a:spLocks noGrp="1"/>
-          </p:cNvSpPr>
-          <p:nvPr>
-            <p:ph idx="1"/>
-          </p:nvPr>
-        </p:nvSpPr>
-        <p:spPr/>
-        <p:txBody>
-          <a:bodyPr/>
-          <a:lstStyle/>
-          <a:p>
-            <a:pPr>
-              <a:buSzPct val="200000"/>
-              <a:buFont typeface="Gabriola" panose="04040605051002020D02" pitchFamily="82" charset="0"/>
-              <a:buChar char="›"/>
-            </a:pPr>
-            <a:r>
-              <a:rPr lang="ro-RO" sz="2800">
-                <a:latin typeface="Gabriola" panose="04040605051002020D02" pitchFamily="82" charset="0"/>
-              </a:rPr>
-              <a:t>A</a:t>
-            </a:r>
-            <a:r>
-              <a:rPr lang="en-US" sz="2800">
-                <a:latin typeface="Gabriola" panose="04040605051002020D02" pitchFamily="82" charset="0"/>
-              </a:rPr>
-              <a:t>plica</a:t>
-            </a:r>
-            <a:r>
-              <a:rPr lang="ro-RO" sz="2800">
-                <a:latin typeface="Gabriola" panose="04040605051002020D02" pitchFamily="82" charset="0"/>
-              </a:rPr>
-              <a:t>ție dedicată gestionării, citirii și exprimării opiniei în legătură cu cărțile citite</a:t>
-            </a:r>
-          </a:p>
-          <a:p>
-            <a:pPr>
-              <a:buSzPct val="200000"/>
-              <a:buFont typeface="Gabriola" panose="04040605051002020D02" pitchFamily="82" charset="0"/>
-              <a:buChar char="›"/>
-            </a:pPr>
-            <a:r>
-              <a:rPr lang="ro-RO" sz="2800">
-                <a:latin typeface="Gabriola" panose="04040605051002020D02" pitchFamily="82" charset="0"/>
-              </a:rPr>
-              <a:t>Sistem de recomandări – în mod direct, prin comunitate</a:t>
-            </a:r>
-          </a:p>
-          <a:p>
-            <a:pPr>
-              <a:buSzPct val="200000"/>
-              <a:buFont typeface="Gabriola" panose="04040605051002020D02" pitchFamily="82" charset="0"/>
-              <a:buChar char="›"/>
-            </a:pPr>
-            <a:r>
-              <a:rPr lang="ro-RO" sz="2800">
-                <a:latin typeface="Gabriola" panose="04040605051002020D02" pitchFamily="82" charset="0"/>
-              </a:rPr>
-              <a:t>Sistem de recomandări – în mod indirect, prin aplicație</a:t>
-            </a:r>
-            <a:endParaRPr lang="en-US" sz="2800">
-              <a:latin typeface="Gabriola" panose="04040605051002020D02" pitchFamily="82" charset="0"/>
-            </a:endParaRPr>
-          </a:p>
-        </p:txBody>
-      </p:sp>
-    </p:spTree>
-    <p:extLst>
-      <p:ext uri="{BB962C8B-B14F-4D97-AF65-F5344CB8AC3E}">
-        <p14:creationId xmlns:p14="http://schemas.microsoft.com/office/powerpoint/2010/main" val="2726187520"/>
-      </p:ext>
-    </p:extLst>
-  </p:cSld>
-  <p:clrMapOvr>
-    <a:masterClrMapping/>
-  </p:clrMapOvr>
-  <p:transition spd="slow">
-    <p:wipe/>
-  </p:transition>
-</p:sld>
-</file>
-
-<file path=ppt/slides/slide6.xml><?xml version="1.0" encoding="utf-8"?>
-<p:sld xmlns:a="http://schemas.openxmlformats.org/drawingml/2006/main" xmlns:r="http://schemas.openxmlformats.org/officeDocument/2006/relationships" xmlns:p="http://schemas.openxmlformats.org/presentationml/2006/main">
-  <p:cSld>
-    <p:spTree>
-      <p:nvGrpSpPr>
-        <p:cNvPr id="1" name=""/>
-        <p:cNvGrpSpPr/>
-        <p:nvPr/>
-      </p:nvGrpSpPr>
-      <p:grpSpPr>
-        <a:xfrm>
-          <a:off x="0" y="0"/>
-          <a:ext cx="0" cy="0"/>
-          <a:chOff x="0" y="0"/>
-          <a:chExt cx="0" cy="0"/>
-        </a:xfrm>
-      </p:grpSpPr>
-      <p:sp>
-        <p:nvSpPr>
-          <p:cNvPr id="2" name="Title 1">
-            <a:extLst>
-              <a:ext uri="{FF2B5EF4-FFF2-40B4-BE49-F238E27FC236}">
                 <a16:creationId xmlns:a16="http://schemas.microsoft.com/office/drawing/2014/main" id="{2A6B6B52-EA57-47E5-AE46-FD1DF6E10B13}"/>
               </a:ext>
             </a:extLst>
@@ -8332,7 +7961,12 @@
             <p:ph idx="1"/>
           </p:nvPr>
         </p:nvSpPr>
-        <p:spPr/>
+        <p:spPr>
+          <a:xfrm>
+            <a:off x="1295402" y="2285999"/>
+            <a:ext cx="9601196" cy="3318936"/>
+          </a:xfrm>
+        </p:spPr>
         <p:txBody>
           <a:bodyPr/>
           <a:lstStyle/>
@@ -8342,24 +7976,9 @@
               <a:buFont typeface="Gabriola" panose="04040605051002020D02" pitchFamily="82" charset="0"/>
               <a:buChar char="›"/>
             </a:pPr>
-            <a:r>
-              <a:rPr lang="ro-RO" sz="2800">
-                <a:latin typeface="Gabriola" panose="04040605051002020D02" pitchFamily="82" charset="0"/>
-              </a:rPr>
-              <a:t>A</a:t>
-            </a:r>
-            <a:r>
-              <a:rPr lang="en-US" sz="2800">
-                <a:latin typeface="Gabriola" panose="04040605051002020D02" pitchFamily="82" charset="0"/>
-              </a:rPr>
-              <a:t>plica</a:t>
-            </a:r>
-            <a:r>
-              <a:rPr lang="ro-RO" sz="2800">
-                <a:latin typeface="Gabriola" panose="04040605051002020D02" pitchFamily="82" charset="0"/>
-              </a:rPr>
-              <a:t>ție dedicată gestionării, citirii și exprimării opiniei în legătură cu cărțile citite</a:t>
-            </a:r>
+            <a:endParaRPr lang="en-US" sz="2800">
+              <a:latin typeface="Gabriola" panose="04040605051002020D02" pitchFamily="82" charset="0"/>
+            </a:endParaRPr>
           </a:p>
           <a:p>
             <a:pPr>
@@ -8368,11 +7987,38 @@
               <a:buChar char="›"/>
             </a:pPr>
             <a:r>
+              <a:rPr lang="en-US" sz="2800" b="1">
+                <a:latin typeface="Gabriola" panose="04040605051002020D02" pitchFamily="82" charset="0"/>
+              </a:rPr>
+              <a:t>ExploreBooks - </a:t>
+            </a:r>
+            <a:r>
+              <a:rPr lang="en-US" sz="2800">
+                <a:latin typeface="Gabriola" panose="04040605051002020D02" pitchFamily="82" charset="0"/>
+              </a:rPr>
+              <a:t>aplica</a:t>
+            </a:r>
+            <a:r>
               <a:rPr lang="ro-RO" sz="2800">
                 <a:latin typeface="Gabriola" panose="04040605051002020D02" pitchFamily="82" charset="0"/>
               </a:rPr>
-              <a:t>Sistem de recomandări – în mod direct, prin comunitate</a:t>
-            </a:r>
+              <a:t>ție </a:t>
+            </a:r>
+            <a:r>
+              <a:rPr lang="en-US" sz="2800">
+                <a:latin typeface="Gabriola" panose="04040605051002020D02" pitchFamily="82" charset="0"/>
+              </a:rPr>
+              <a:t>web </a:t>
+            </a:r>
+            <a:r>
+              <a:rPr lang="ro-RO" sz="2800">
+                <a:latin typeface="Gabriola" panose="04040605051002020D02" pitchFamily="82" charset="0"/>
+              </a:rPr>
+              <a:t>ce permite descoperirea, gestionarea și citirea cărților a căror drepturi de autor au expirat</a:t>
+            </a:r>
+            <a:endParaRPr lang="en-US" sz="2800">
+              <a:latin typeface="Gabriola" panose="04040605051002020D02" pitchFamily="82" charset="0"/>
+            </a:endParaRPr>
           </a:p>
           <a:p>
             <a:pPr>
@@ -8381,19 +8027,6 @@
               <a:buChar char="›"/>
             </a:pPr>
             <a:r>
-              <a:rPr lang="ro-RO" sz="2800">
-                <a:latin typeface="Gabriola" panose="04040605051002020D02" pitchFamily="82" charset="0"/>
-              </a:rPr>
-              <a:t>Sistem de recomandări – în mod indirect, prin aplicație</a:t>
-            </a:r>
-          </a:p>
-          <a:p>
-            <a:pPr>
-              <a:buSzPct val="200000"/>
-              <a:buFont typeface="Gabriola" panose="04040605051002020D02" pitchFamily="82" charset="0"/>
-              <a:buChar char="›"/>
-            </a:pPr>
-            <a:r>
               <a:rPr lang="ro-RO" sz="2800" b="1">
                 <a:latin typeface="Gabriola" panose="04040605051002020D02" pitchFamily="82" charset="0"/>
               </a:rPr>
@@ -8407,6 +8040,52 @@
             </a:r>
             <a:endParaRPr lang="en-US" sz="2800">
               <a:latin typeface="Gabriola" panose="04040605051002020D02" pitchFamily="82" charset="0"/>
+            </a:endParaRPr>
+          </a:p>
+        </p:txBody>
+      </p:sp>
+      <p:sp>
+        <p:nvSpPr>
+          <p:cNvPr id="4" name="Slide Number Placeholder 3">
+            <a:extLst>
+              <a:ext uri="{FF2B5EF4-FFF2-40B4-BE49-F238E27FC236}">
+                <a16:creationId xmlns:a16="http://schemas.microsoft.com/office/drawing/2014/main" id="{3465B5C5-E1BC-4E6E-9F0E-14CA5106109F}"/>
+              </a:ext>
+            </a:extLst>
+          </p:cNvPr>
+          <p:cNvSpPr>
+            <a:spLocks noGrp="1"/>
+          </p:cNvSpPr>
+          <p:nvPr>
+            <p:ph type="sldNum" sz="quarter" idx="12"/>
+          </p:nvPr>
+        </p:nvSpPr>
+        <p:spPr>
+          <a:xfrm>
+            <a:off x="5824651" y="6322962"/>
+            <a:ext cx="542697" cy="279400"/>
+          </a:xfrm>
+        </p:spPr>
+        <p:txBody>
+          <a:bodyPr/>
+          <a:lstStyle/>
+          <a:p>
+            <a:pPr algn="ctr"/>
+            <a:fld id="{1FA03AA4-19DA-4C46-8EA1-48621787B7D1}" type="slidenum">
+              <a:rPr lang="en-US" sz="2800" b="1" smtClean="0">
+                <a:solidFill>
+                  <a:schemeClr val="bg1"/>
+                </a:solidFill>
+                <a:latin typeface="Palatino Linotype" panose="02040502050505030304" pitchFamily="18" charset="0"/>
+              </a:rPr>
+              <a:pPr algn="ctr"/>
+              <a:t>4</a:t>
+            </a:fld>
+            <a:endParaRPr lang="en-US" b="1">
+              <a:solidFill>
+                <a:schemeClr val="bg1"/>
+              </a:solidFill>
+              <a:latin typeface="Palatino Linotype" panose="02040502050505030304" pitchFamily="18" charset="0"/>
             </a:endParaRPr>
           </a:p>
         </p:txBody>
@@ -8421,13 +8100,13 @@
   <p:clrMapOvr>
     <a:masterClrMapping/>
   </p:clrMapOvr>
-  <p:transition spd="slow">
+  <p:transition>
     <p:wipe/>
   </p:transition>
 </p:sld>
 </file>
 
-<file path=ppt/slides/slide7.xml><?xml version="1.0" encoding="utf-8"?>
+<file path=ppt/slides/slide5.xml><?xml version="1.0" encoding="utf-8"?>
 <p:sld xmlns:a="http://schemas.openxmlformats.org/drawingml/2006/main" xmlns:r="http://schemas.openxmlformats.org/officeDocument/2006/relationships" xmlns:p="http://schemas.openxmlformats.org/presentationml/2006/main">
   <p:cSld>
     <p:spTree>
@@ -8534,6 +8213,51 @@
           </a:extLst>
         </p:spPr>
       </p:pic>
+      <p:sp>
+        <p:nvSpPr>
+          <p:cNvPr id="5" name="Slide Number Placeholder 2">
+            <a:extLst>
+              <a:ext uri="{FF2B5EF4-FFF2-40B4-BE49-F238E27FC236}">
+                <a16:creationId xmlns:a16="http://schemas.microsoft.com/office/drawing/2014/main" id="{AE7BF8C7-5E73-4568-AB29-32262E091496}"/>
+              </a:ext>
+            </a:extLst>
+          </p:cNvPr>
+          <p:cNvSpPr>
+            <a:spLocks noGrp="1"/>
+          </p:cNvSpPr>
+          <p:nvPr>
+            <p:ph type="sldNum" sz="quarter" idx="12"/>
+          </p:nvPr>
+        </p:nvSpPr>
+        <p:spPr>
+          <a:xfrm>
+            <a:off x="5824651" y="6313129"/>
+            <a:ext cx="542697" cy="279400"/>
+          </a:xfrm>
+        </p:spPr>
+        <p:txBody>
+          <a:bodyPr/>
+          <a:lstStyle/>
+          <a:p>
+            <a:pPr algn="ctr"/>
+            <a:r>
+              <a:rPr lang="ro-RO" sz="2800" b="1">
+                <a:solidFill>
+                  <a:schemeClr val="bg1"/>
+                </a:solidFill>
+                <a:latin typeface="Palatino Linotype" panose="02040502050505030304" pitchFamily="18" charset="0"/>
+              </a:rPr>
+              <a:t>5</a:t>
+            </a:r>
+            <a:endParaRPr lang="en-US" sz="2800" b="1">
+              <a:solidFill>
+                <a:schemeClr val="bg1"/>
+              </a:solidFill>
+              <a:latin typeface="Palatino Linotype" panose="02040502050505030304" pitchFamily="18" charset="0"/>
+            </a:endParaRPr>
+          </a:p>
+        </p:txBody>
+      </p:sp>
     </p:spTree>
     <p:extLst>
       <p:ext uri="{BB962C8B-B14F-4D97-AF65-F5344CB8AC3E}">
@@ -8544,14 +8268,14 @@
   <p:clrMapOvr>
     <a:masterClrMapping/>
   </p:clrMapOvr>
-  <mc:AlternateContent xmlns:mc="http://schemas.openxmlformats.org/markup-compatibility/2006" xmlns:p15="http://schemas.microsoft.com/office/powerpoint/2012/main">
-    <mc:Choice Requires="p15">
-      <p:transition xmlns:p14="http://schemas.microsoft.com/office/powerpoint/2010/main" spd="slow" p14:dur="1250">
+  <mc:AlternateContent xmlns:mc="http://schemas.openxmlformats.org/markup-compatibility/2006">
+    <mc:Choice xmlns:p15="http://schemas.microsoft.com/office/powerpoint/2012/main" Requires="p15">
+      <p:transition>
         <p15:prstTrans prst="pageCurlDouble"/>
       </p:transition>
     </mc:Choice>
-    <mc:Fallback xmlns="">
-      <p:transition spd="slow">
+    <mc:Fallback>
+      <p:transition>
         <p:fade/>
       </p:transition>
     </mc:Fallback>
@@ -8688,7 +8412,7 @@
 </p:sld>
 </file>
 
-<file path=ppt/slides/slide8.xml><?xml version="1.0" encoding="utf-8"?>
+<file path=ppt/slides/slide6.xml><?xml version="1.0" encoding="utf-8"?>
 <p:sld xmlns:a="http://schemas.openxmlformats.org/drawingml/2006/main" xmlns:r="http://schemas.openxmlformats.org/officeDocument/2006/relationships" xmlns:p="http://schemas.openxmlformats.org/presentationml/2006/main">
   <p:cSld>
     <p:spTree>
@@ -8721,7 +8445,12 @@
             <p:ph type="title"/>
           </p:nvPr>
         </p:nvSpPr>
-        <p:spPr/>
+        <p:spPr>
+          <a:xfrm>
+            <a:off x="1295402" y="991964"/>
+            <a:ext cx="9601196" cy="1303867"/>
+          </a:xfrm>
+        </p:spPr>
         <p:txBody>
           <a:bodyPr/>
           <a:lstStyle/>
@@ -8836,6 +8565,51 @@
           </a:extLst>
         </p:spPr>
       </p:pic>
+      <p:sp>
+        <p:nvSpPr>
+          <p:cNvPr id="3" name="Slide Number Placeholder 2">
+            <a:extLst>
+              <a:ext uri="{FF2B5EF4-FFF2-40B4-BE49-F238E27FC236}">
+                <a16:creationId xmlns:a16="http://schemas.microsoft.com/office/drawing/2014/main" id="{5617515A-5550-4767-8D19-4694784119C5}"/>
+              </a:ext>
+            </a:extLst>
+          </p:cNvPr>
+          <p:cNvSpPr>
+            <a:spLocks noGrp="1"/>
+          </p:cNvSpPr>
+          <p:nvPr>
+            <p:ph type="sldNum" sz="quarter" idx="12"/>
+          </p:nvPr>
+        </p:nvSpPr>
+        <p:spPr>
+          <a:xfrm>
+            <a:off x="5824651" y="6313129"/>
+            <a:ext cx="542697" cy="279400"/>
+          </a:xfrm>
+        </p:spPr>
+        <p:txBody>
+          <a:bodyPr/>
+          <a:lstStyle/>
+          <a:p>
+            <a:pPr algn="ctr"/>
+            <a:r>
+              <a:rPr lang="ro-RO" sz="2800" b="1">
+                <a:solidFill>
+                  <a:schemeClr val="bg1"/>
+                </a:solidFill>
+                <a:latin typeface="Palatino Linotype" panose="02040502050505030304" pitchFamily="18" charset="0"/>
+              </a:rPr>
+              <a:t>5</a:t>
+            </a:r>
+            <a:endParaRPr lang="en-US" sz="2800" b="1">
+              <a:solidFill>
+                <a:schemeClr val="bg1"/>
+              </a:solidFill>
+              <a:latin typeface="Palatino Linotype" panose="02040502050505030304" pitchFamily="18" charset="0"/>
+            </a:endParaRPr>
+          </a:p>
+        </p:txBody>
+      </p:sp>
     </p:spTree>
     <p:extLst>
       <p:ext uri="{BB962C8B-B14F-4D97-AF65-F5344CB8AC3E}">
@@ -8846,6 +8620,7 @@
   <p:clrMapOvr>
     <a:masterClrMapping/>
   </p:clrMapOvr>
+  <p:transition/>
   <p:timing>
     <p:tnLst>
       <p:par>
@@ -8892,7 +8667,7 @@
                                     </p:set>
                                     <p:animEffect transition="in" filter="circle(in)">
                                       <p:cBhvr>
-                                        <p:cTn id="7" dur="750"/>
+                                        <p:cTn id="7" dur="250"/>
                                         <p:tgtEl>
                                           <p:spTgt spid="5"/>
                                         </p:tgtEl>
@@ -8932,6 +8707,405 @@
 </p:sld>
 </file>
 
+<file path=ppt/slides/slide7.xml><?xml version="1.0" encoding="utf-8"?>
+<p:sld xmlns:a="http://schemas.openxmlformats.org/drawingml/2006/main" xmlns:r="http://schemas.openxmlformats.org/officeDocument/2006/relationships" xmlns:p="http://schemas.openxmlformats.org/presentationml/2006/main">
+  <p:cSld>
+    <p:spTree>
+      <p:nvGrpSpPr>
+        <p:cNvPr id="1" name=""/>
+        <p:cNvGrpSpPr/>
+        <p:nvPr/>
+      </p:nvGrpSpPr>
+      <p:grpSpPr>
+        <a:xfrm>
+          <a:off x="0" y="0"/>
+          <a:ext cx="0" cy="0"/>
+          <a:chOff x="0" y="0"/>
+          <a:chExt cx="0" cy="0"/>
+        </a:xfrm>
+      </p:grpSpPr>
+      <p:sp>
+        <p:nvSpPr>
+          <p:cNvPr id="5" name="Title 4">
+            <a:extLst>
+              <a:ext uri="{FF2B5EF4-FFF2-40B4-BE49-F238E27FC236}">
+                <a16:creationId xmlns:a16="http://schemas.microsoft.com/office/drawing/2014/main" id="{ECB29CC3-7DB9-4033-8B80-B82260D4FAD4}"/>
+              </a:ext>
+            </a:extLst>
+          </p:cNvPr>
+          <p:cNvSpPr>
+            <a:spLocks noGrp="1"/>
+          </p:cNvSpPr>
+          <p:nvPr>
+            <p:ph type="title"/>
+          </p:nvPr>
+        </p:nvSpPr>
+        <p:spPr/>
+        <p:txBody>
+          <a:bodyPr/>
+          <a:lstStyle/>
+          <a:p>
+            <a:r>
+              <a:rPr lang="ro-RO" b="1">
+                <a:latin typeface="Palatino Linotype" panose="02040502050505030304" pitchFamily="18" charset="0"/>
+              </a:rPr>
+              <a:t>Contribuții</a:t>
+            </a:r>
+            <a:endParaRPr lang="en-US" b="1">
+              <a:latin typeface="Palatino Linotype" panose="02040502050505030304" pitchFamily="18" charset="0"/>
+            </a:endParaRPr>
+          </a:p>
+        </p:txBody>
+      </p:sp>
+      <p:sp>
+        <p:nvSpPr>
+          <p:cNvPr id="6" name="Content Placeholder 5">
+            <a:extLst>
+              <a:ext uri="{FF2B5EF4-FFF2-40B4-BE49-F238E27FC236}">
+                <a16:creationId xmlns:a16="http://schemas.microsoft.com/office/drawing/2014/main" id="{5F375D19-523C-4D1A-9E8A-6EECA6F3C32C}"/>
+              </a:ext>
+            </a:extLst>
+          </p:cNvPr>
+          <p:cNvSpPr>
+            <a:spLocks noGrp="1"/>
+          </p:cNvSpPr>
+          <p:nvPr>
+            <p:ph idx="1"/>
+          </p:nvPr>
+        </p:nvSpPr>
+        <p:spPr>
+          <a:xfrm>
+            <a:off x="1295402" y="2649928"/>
+            <a:ext cx="9601196" cy="3318936"/>
+          </a:xfrm>
+        </p:spPr>
+        <p:txBody>
+          <a:bodyPr>
+            <a:normAutofit/>
+          </a:bodyPr>
+          <a:lstStyle/>
+          <a:p>
+            <a:pPr>
+              <a:buSzPct val="200000"/>
+              <a:buFont typeface="Gabriola" panose="04040605051002020D02" pitchFamily="82" charset="0"/>
+              <a:buChar char="›"/>
+            </a:pPr>
+            <a:r>
+              <a:rPr lang="ro-RO" sz="2800">
+                <a:latin typeface="Gabriola" panose="04040605051002020D02" pitchFamily="82" charset="0"/>
+              </a:rPr>
+              <a:t>Posibilitatea de citire și vizualizare a progresului realizat</a:t>
+            </a:r>
+          </a:p>
+          <a:p>
+            <a:pPr>
+              <a:buSzPct val="200000"/>
+              <a:buFont typeface="Gabriola" panose="04040605051002020D02" pitchFamily="82" charset="0"/>
+              <a:buChar char="›"/>
+            </a:pPr>
+            <a:r>
+              <a:rPr lang="ro-RO" sz="2800">
+                <a:latin typeface="Gabriola" panose="04040605051002020D02" pitchFamily="82" charset="0"/>
+              </a:rPr>
+              <a:t>Sistem de statistici pe diverse categorii</a:t>
+            </a:r>
+          </a:p>
+          <a:p>
+            <a:pPr>
+              <a:buSzPct val="200000"/>
+              <a:buFont typeface="Gabriola" panose="04040605051002020D02" pitchFamily="82" charset="0"/>
+              <a:buChar char="›"/>
+            </a:pPr>
+            <a:r>
+              <a:rPr lang="ro-RO" sz="2800">
+                <a:latin typeface="Gabriola" panose="04040605051002020D02" pitchFamily="82" charset="0"/>
+              </a:rPr>
+              <a:t>Sistem de recomandări</a:t>
+            </a:r>
+          </a:p>
+          <a:p>
+            <a:pPr>
+              <a:buSzPct val="200000"/>
+              <a:buFont typeface="Gabriola" panose="04040605051002020D02" pitchFamily="82" charset="0"/>
+              <a:buChar char="›"/>
+            </a:pPr>
+            <a:r>
+              <a:rPr lang="ro-RO" sz="2800">
+                <a:latin typeface="Gabriola" panose="04040605051002020D02" pitchFamily="82" charset="0"/>
+              </a:rPr>
+              <a:t>Interacțiune cu ceilalți utilizatori</a:t>
+            </a:r>
+            <a:endParaRPr lang="en-US" sz="2800">
+              <a:latin typeface="Gabriola" panose="04040605051002020D02" pitchFamily="82" charset="0"/>
+            </a:endParaRPr>
+          </a:p>
+        </p:txBody>
+      </p:sp>
+      <p:sp>
+        <p:nvSpPr>
+          <p:cNvPr id="7" name="Slide Number Placeholder 6">
+            <a:extLst>
+              <a:ext uri="{FF2B5EF4-FFF2-40B4-BE49-F238E27FC236}">
+                <a16:creationId xmlns:a16="http://schemas.microsoft.com/office/drawing/2014/main" id="{E94F8F9D-0BEE-4596-9359-35218BC737E6}"/>
+              </a:ext>
+            </a:extLst>
+          </p:cNvPr>
+          <p:cNvSpPr>
+            <a:spLocks noGrp="1"/>
+          </p:cNvSpPr>
+          <p:nvPr>
+            <p:ph type="sldNum" sz="quarter" idx="12"/>
+          </p:nvPr>
+        </p:nvSpPr>
+        <p:spPr>
+          <a:xfrm>
+            <a:off x="5824650" y="6332793"/>
+            <a:ext cx="542697" cy="279400"/>
+          </a:xfrm>
+        </p:spPr>
+        <p:txBody>
+          <a:bodyPr/>
+          <a:lstStyle/>
+          <a:p>
+            <a:pPr algn="ctr"/>
+            <a:r>
+              <a:rPr lang="ro-RO" sz="2800" b="1">
+                <a:solidFill>
+                  <a:schemeClr val="bg1"/>
+                </a:solidFill>
+                <a:latin typeface="Palatino Linotype" panose="02040502050505030304" pitchFamily="18" charset="0"/>
+              </a:rPr>
+              <a:t>6</a:t>
+            </a:r>
+            <a:endParaRPr lang="en-US" sz="2800" b="1">
+              <a:solidFill>
+                <a:schemeClr val="bg1"/>
+              </a:solidFill>
+              <a:latin typeface="Palatino Linotype" panose="02040502050505030304" pitchFamily="18" charset="0"/>
+            </a:endParaRPr>
+          </a:p>
+        </p:txBody>
+      </p:sp>
+    </p:spTree>
+    <p:extLst>
+      <p:ext uri="{BB962C8B-B14F-4D97-AF65-F5344CB8AC3E}">
+        <p14:creationId xmlns:p14="http://schemas.microsoft.com/office/powerpoint/2010/main" val="877646209"/>
+      </p:ext>
+    </p:extLst>
+  </p:cSld>
+  <p:clrMapOvr>
+    <a:masterClrMapping/>
+  </p:clrMapOvr>
+  <p:transition/>
+</p:sld>
+</file>
+
+<file path=ppt/slides/slide8.xml><?xml version="1.0" encoding="utf-8"?>
+<p:sld xmlns:a="http://schemas.openxmlformats.org/drawingml/2006/main" xmlns:r="http://schemas.openxmlformats.org/officeDocument/2006/relationships" xmlns:p="http://schemas.openxmlformats.org/presentationml/2006/main">
+  <p:cSld>
+    <p:spTree>
+      <p:nvGrpSpPr>
+        <p:cNvPr id="1" name=""/>
+        <p:cNvGrpSpPr/>
+        <p:nvPr/>
+      </p:nvGrpSpPr>
+      <p:grpSpPr>
+        <a:xfrm>
+          <a:off x="0" y="0"/>
+          <a:ext cx="0" cy="0"/>
+          <a:chOff x="0" y="0"/>
+          <a:chExt cx="0" cy="0"/>
+        </a:xfrm>
+      </p:grpSpPr>
+      <p:sp>
+        <p:nvSpPr>
+          <p:cNvPr id="2" name="Titlu 1">
+            <a:extLst>
+              <a:ext uri="{FF2B5EF4-FFF2-40B4-BE49-F238E27FC236}">
+                <a16:creationId xmlns:a16="http://schemas.microsoft.com/office/drawing/2014/main" id="{1E430F7C-367C-4232-9B3F-237E35CF50F0}"/>
+              </a:ext>
+            </a:extLst>
+          </p:cNvPr>
+          <p:cNvSpPr>
+            <a:spLocks noGrp="1"/>
+          </p:cNvSpPr>
+          <p:nvPr>
+            <p:ph type="title"/>
+          </p:nvPr>
+        </p:nvSpPr>
+        <p:spPr/>
+        <p:txBody>
+          <a:bodyPr/>
+          <a:lstStyle/>
+          <a:p>
+            <a:pPr algn="ctr"/>
+            <a:r>
+              <a:rPr lang="ro-RO" b="1">
+                <a:latin typeface="Palatino Linotype" panose="02040502050505030304" pitchFamily="18" charset="0"/>
+              </a:rPr>
+              <a:t>Tehnologiile </a:t>
+            </a:r>
+            <a:r>
+              <a:rPr lang="en-US" b="1" err="1">
+                <a:latin typeface="Palatino Linotype" panose="02040502050505030304" pitchFamily="18" charset="0"/>
+              </a:rPr>
+              <a:t>utilizate</a:t>
+            </a:r>
+            <a:endParaRPr lang="en-US" b="1">
+              <a:latin typeface="Palatino Linotype" panose="02040502050505030304" pitchFamily="18" charset="0"/>
+            </a:endParaRPr>
+          </a:p>
+        </p:txBody>
+      </p:sp>
+      <p:sp>
+        <p:nvSpPr>
+          <p:cNvPr id="3" name="Substituent conținut 2">
+            <a:extLst>
+              <a:ext uri="{FF2B5EF4-FFF2-40B4-BE49-F238E27FC236}">
+                <a16:creationId xmlns:a16="http://schemas.microsoft.com/office/drawing/2014/main" id="{75A99387-AE5F-45F5-8C9A-F0DB4C914995}"/>
+              </a:ext>
+            </a:extLst>
+          </p:cNvPr>
+          <p:cNvSpPr>
+            <a:spLocks noGrp="1"/>
+          </p:cNvSpPr>
+          <p:nvPr>
+            <p:ph idx="1"/>
+          </p:nvPr>
+        </p:nvSpPr>
+        <p:spPr/>
+        <p:txBody>
+          <a:bodyPr>
+            <a:normAutofit/>
+          </a:bodyPr>
+          <a:lstStyle/>
+          <a:p>
+            <a:pPr>
+              <a:buSzPct val="200000"/>
+              <a:buFont typeface="Gabriola" panose="04040605051002020D02" pitchFamily="82" charset="0"/>
+              <a:buChar char="›"/>
+            </a:pPr>
+            <a:r>
+              <a:rPr lang="en-US" sz="2800">
+                <a:latin typeface="Gabriola" panose="04040605051002020D02" pitchFamily="82" charset="0"/>
+              </a:rPr>
+              <a:t>ASP .NET</a:t>
+            </a:r>
+          </a:p>
+          <a:p>
+            <a:pPr>
+              <a:buSzPct val="200000"/>
+              <a:buFont typeface="Gabriola" panose="04040605051002020D02" pitchFamily="82" charset="0"/>
+              <a:buChar char="›"/>
+            </a:pPr>
+            <a:r>
+              <a:rPr lang="en-US" sz="2800">
+                <a:latin typeface="Gabriola" panose="04040605051002020D02" pitchFamily="82" charset="0"/>
+              </a:rPr>
+              <a:t>SQL Server Express</a:t>
+            </a:r>
+          </a:p>
+          <a:p>
+            <a:pPr>
+              <a:buSzPct val="200000"/>
+              <a:buFont typeface="Gabriola" panose="04040605051002020D02" pitchFamily="82" charset="0"/>
+              <a:buChar char="›"/>
+            </a:pPr>
+            <a:r>
+              <a:rPr lang="en-US" sz="2800">
+                <a:latin typeface="Gabriola" panose="04040605051002020D02" pitchFamily="82" charset="0"/>
+              </a:rPr>
+              <a:t>HTML, CSS &amp; JavaScript</a:t>
+            </a:r>
+          </a:p>
+          <a:p>
+            <a:pPr>
+              <a:buSzPct val="200000"/>
+              <a:buFont typeface="Gabriola" panose="04040605051002020D02" pitchFamily="82" charset="0"/>
+              <a:buChar char="›"/>
+            </a:pPr>
+            <a:r>
+              <a:rPr lang="en-US" sz="2800">
+                <a:latin typeface="Gabriola" panose="04040605051002020D02" pitchFamily="82" charset="0"/>
+              </a:rPr>
+              <a:t>Bootstrap 4</a:t>
+            </a:r>
+            <a:endParaRPr lang="en-US" sz="3200">
+              <a:latin typeface="Gabriola" panose="04040605051002020D02" pitchFamily="82" charset="0"/>
+            </a:endParaRPr>
+          </a:p>
+        </p:txBody>
+      </p:sp>
+      <p:sp>
+        <p:nvSpPr>
+          <p:cNvPr id="4" name="Slide Number Placeholder 3">
+            <a:extLst>
+              <a:ext uri="{FF2B5EF4-FFF2-40B4-BE49-F238E27FC236}">
+                <a16:creationId xmlns:a16="http://schemas.microsoft.com/office/drawing/2014/main" id="{AF8318C7-C911-47B3-9732-6A311FD49956}"/>
+              </a:ext>
+            </a:extLst>
+          </p:cNvPr>
+          <p:cNvSpPr>
+            <a:spLocks noGrp="1"/>
+          </p:cNvSpPr>
+          <p:nvPr>
+            <p:ph type="sldNum" sz="quarter" idx="12"/>
+          </p:nvPr>
+        </p:nvSpPr>
+        <p:spPr>
+          <a:xfrm>
+            <a:off x="5824650" y="6313129"/>
+            <a:ext cx="542697" cy="279400"/>
+          </a:xfrm>
+        </p:spPr>
+        <p:txBody>
+          <a:bodyPr/>
+          <a:lstStyle/>
+          <a:p>
+            <a:pPr algn="ctr"/>
+            <a:r>
+              <a:rPr lang="ro-RO" sz="2800" b="1">
+                <a:solidFill>
+                  <a:schemeClr val="bg1"/>
+                </a:solidFill>
+                <a:latin typeface="Palatino Linotype" panose="02040502050505030304" pitchFamily="18" charset="0"/>
+              </a:rPr>
+              <a:t>7</a:t>
+            </a:r>
+            <a:endParaRPr lang="en-US" sz="2800" b="1">
+              <a:solidFill>
+                <a:schemeClr val="bg1"/>
+              </a:solidFill>
+              <a:latin typeface="Palatino Linotype" panose="02040502050505030304" pitchFamily="18" charset="0"/>
+            </a:endParaRPr>
+          </a:p>
+        </p:txBody>
+      </p:sp>
+    </p:spTree>
+    <p:extLst>
+      <p:ext uri="{BB962C8B-B14F-4D97-AF65-F5344CB8AC3E}">
+        <p14:creationId xmlns:p14="http://schemas.microsoft.com/office/powerpoint/2010/main" val="2594655161"/>
+      </p:ext>
+    </p:extLst>
+  </p:cSld>
+  <p:clrMapOvr>
+    <a:masterClrMapping/>
+  </p:clrMapOvr>
+  <mc:AlternateContent xmlns:mc="http://schemas.openxmlformats.org/markup-compatibility/2006">
+    <mc:Choice xmlns:p15="http://schemas.microsoft.com/office/powerpoint/2012/main" Requires="p15">
+      <p:transition>
+        <p15:prstTrans prst="pageCurlDouble"/>
+      </p:transition>
+    </mc:Choice>
+    <mc:Fallback>
+      <p:transition>
+        <p:fade/>
+      </p:transition>
+    </mc:Fallback>
+  </mc:AlternateContent>
+</p:sld>
+</file>
+
 <file path=ppt/slides/slide9.xml><?xml version="1.0" encoding="utf-8"?>
 <p:sld xmlns:a="http://schemas.openxmlformats.org/drawingml/2006/main" xmlns:r="http://schemas.openxmlformats.org/officeDocument/2006/relationships" xmlns:p="http://schemas.openxmlformats.org/presentationml/2006/main">
   <p:cSld>
@@ -8954,7 +9128,7 @@
           <p:cNvPr id="2" name="Titlu 1">
             <a:extLst>
               <a:ext uri="{FF2B5EF4-FFF2-40B4-BE49-F238E27FC236}">
-                <a16:creationId xmlns:a16="http://schemas.microsoft.com/office/drawing/2014/main" id="{1E430F7C-367C-4232-9B3F-237E35CF50F0}"/>
+                <a16:creationId xmlns:a16="http://schemas.microsoft.com/office/drawing/2014/main" id="{895EE26D-EA47-4C0F-859C-6211E9F98674}"/>
               </a:ext>
             </a:extLst>
           </p:cNvPr>
@@ -8972,111 +9146,148 @@
           <a:p>
             <a:pPr algn="ctr"/>
             <a:r>
-              <a:rPr lang="ro-RO" b="1">
+              <a:rPr lang="en-US" b="1">
                 <a:latin typeface="Palatino Linotype" panose="02040502050505030304" pitchFamily="18" charset="0"/>
               </a:rPr>
-              <a:t>Tehnologiile </a:t>
-            </a:r>
-            <a:r>
-              <a:rPr lang="en-US" b="1" err="1">
-                <a:latin typeface="Palatino Linotype" panose="02040502050505030304" pitchFamily="18" charset="0"/>
-              </a:rPr>
-              <a:t>utilizate</a:t>
-            </a:r>
-            <a:endParaRPr lang="en-US" b="1">
-              <a:latin typeface="Palatino Linotype" panose="02040502050505030304" pitchFamily="18" charset="0"/>
-            </a:endParaRPr>
-          </a:p>
-        </p:txBody>
-      </p:sp>
-      <p:sp>
-        <p:nvSpPr>
-          <p:cNvPr id="3" name="Substituent conținut 2">
+              <a:t>Demo</a:t>
+            </a:r>
+          </a:p>
+        </p:txBody>
+      </p:sp>
+      <p:pic>
+        <p:nvPicPr>
+          <p:cNvPr id="7" name="Content Placeholder 6">
             <a:extLst>
               <a:ext uri="{FF2B5EF4-FFF2-40B4-BE49-F238E27FC236}">
-                <a16:creationId xmlns:a16="http://schemas.microsoft.com/office/drawing/2014/main" id="{75A99387-AE5F-45F5-8C9A-F0DB4C914995}"/>
+                <a16:creationId xmlns:a16="http://schemas.microsoft.com/office/drawing/2014/main" id="{E478D1FB-0A4C-45BA-BDCB-350F71ABB9E0}"/>
               </a:ext>
             </a:extLst>
           </p:cNvPr>
-          <p:cNvSpPr>
-            <a:spLocks noGrp="1"/>
-          </p:cNvSpPr>
-          <p:nvPr>
-            <p:ph idx="1"/>
-          </p:nvPr>
-        </p:nvSpPr>
-        <p:spPr/>
-        <p:txBody>
-          <a:bodyPr>
-            <a:normAutofit/>
-          </a:bodyPr>
-          <a:lstStyle/>
-          <a:p>
-            <a:pPr>
-              <a:buSzPct val="200000"/>
-              <a:buFont typeface="Gabriola" panose="04040605051002020D02" pitchFamily="82" charset="0"/>
-              <a:buChar char="›"/>
-            </a:pPr>
-            <a:r>
-              <a:rPr lang="en-US" sz="2800">
-                <a:latin typeface="Gabriola" panose="04040605051002020D02" pitchFamily="82" charset="0"/>
+          <p:cNvPicPr>
+            <a:picLocks noGrp="1" noChangeAspect="1"/>
+          </p:cNvPicPr>
+          <p:nvPr>
+            <p:ph sz="half" idx="2"/>
+          </p:nvPr>
+        </p:nvPicPr>
+        <p:blipFill>
+          <a:blip r:embed="rId3"/>
+          <a:stretch>
+            <a:fillRect/>
+          </a:stretch>
+        </p:blipFill>
+        <p:spPr>
+          <a:xfrm>
+            <a:off x="1295403" y="3697958"/>
+            <a:ext cx="2690671" cy="2235693"/>
+          </a:xfrm>
+          <a:prstGeom prst="rect">
+            <a:avLst/>
+          </a:prstGeom>
+        </p:spPr>
+      </p:pic>
+      <p:pic>
+        <p:nvPicPr>
+          <p:cNvPr id="8" name="Content Placeholder 7">
+            <a:extLst>
+              <a:ext uri="{FF2B5EF4-FFF2-40B4-BE49-F238E27FC236}">
+                <a16:creationId xmlns:a16="http://schemas.microsoft.com/office/drawing/2014/main" id="{45C7C4F9-28D0-4AD8-89D8-3992A1E737E5}"/>
+              </a:ext>
+            </a:extLst>
+          </p:cNvPr>
+          <p:cNvPicPr>
+            <a:picLocks noGrp="1" noChangeAspect="1"/>
+          </p:cNvPicPr>
+          <p:nvPr>
+            <p:ph sz="quarter" idx="4"/>
+          </p:nvPr>
+        </p:nvPicPr>
+        <p:blipFill>
+          <a:blip r:embed="rId4"/>
+          <a:stretch>
+            <a:fillRect/>
+          </a:stretch>
+        </p:blipFill>
+        <p:spPr>
+          <a:xfrm>
+            <a:off x="8205928" y="3784459"/>
+            <a:ext cx="2747045" cy="2272453"/>
+          </a:xfrm>
+          <a:prstGeom prst="rect">
+            <a:avLst/>
+          </a:prstGeom>
+        </p:spPr>
+      </p:pic>
+      <p:pic>
+        <p:nvPicPr>
+          <p:cNvPr id="9" name="Picture 8">
+            <a:extLst>
+              <a:ext uri="{FF2B5EF4-FFF2-40B4-BE49-F238E27FC236}">
+                <a16:creationId xmlns:a16="http://schemas.microsoft.com/office/drawing/2014/main" id="{02CEDAB6-3CEF-432D-8B83-C18D0A1F687C}"/>
+              </a:ext>
+            </a:extLst>
+          </p:cNvPr>
+          <p:cNvPicPr>
+            <a:picLocks noChangeAspect="1"/>
+          </p:cNvPicPr>
+          <p:nvPr/>
+        </p:nvPicPr>
+        <p:blipFill>
+          <a:blip r:embed="rId5"/>
+          <a:stretch>
+            <a:fillRect/>
+          </a:stretch>
+        </p:blipFill>
+        <p:spPr>
+          <a:xfrm>
+            <a:off x="4722477" y="2711203"/>
+            <a:ext cx="2747045" cy="1973509"/>
+          </a:xfrm>
+          <a:prstGeom prst="rect">
+            <a:avLst/>
+          </a:prstGeom>
+          <a:ln>
+            <a:solidFill>
+              <a:schemeClr val="tx1"/>
+            </a:solidFill>
+          </a:ln>
+        </p:spPr>
+      </p:pic>
+      <p:sp>
+        <p:nvSpPr>
+          <p:cNvPr id="3" name="Slide Number Placeholder 2">
+            <a:extLst>
+              <a:ext uri="{FF2B5EF4-FFF2-40B4-BE49-F238E27FC236}">
+                <a16:creationId xmlns:a16="http://schemas.microsoft.com/office/drawing/2014/main" id="{88468536-BDD2-4249-BC03-CC8A2463E12B}"/>
+              </a:ext>
+            </a:extLst>
+          </p:cNvPr>
+          <p:cNvSpPr>
+            <a:spLocks noGrp="1"/>
+          </p:cNvSpPr>
+          <p:nvPr>
+            <p:ph type="sldNum" sz="quarter" idx="12"/>
+          </p:nvPr>
+        </p:nvSpPr>
+        <p:spPr>
+          <a:xfrm>
+            <a:off x="5821683" y="6322962"/>
+            <a:ext cx="548631" cy="279400"/>
+          </a:xfrm>
+        </p:spPr>
+        <p:txBody>
+          <a:bodyPr/>
+          <a:lstStyle/>
+          <a:p>
+            <a:pPr algn="ctr"/>
+            <a:r>
+              <a:rPr lang="en-US" sz="2800" b="1">
+                <a:solidFill>
+                  <a:schemeClr val="bg1"/>
+                </a:solidFill>
+                <a:latin typeface="Palatino Linotype" panose="02040502050505030304" pitchFamily="18" charset="0"/>
               </a:rPr>
-              <a:t>ASP.NET Core</a:t>
-            </a:r>
-          </a:p>
-          <a:p>
-            <a:pPr>
-              <a:buSzPct val="200000"/>
-              <a:buFont typeface="Gabriola" panose="04040605051002020D02" pitchFamily="82" charset="0"/>
-              <a:buChar char="›"/>
-            </a:pPr>
-            <a:r>
-              <a:rPr lang="en-US" sz="2800">
-                <a:latin typeface="Gabriola" panose="04040605051002020D02" pitchFamily="82" charset="0"/>
-              </a:rPr>
-              <a:t>SQL Server Express</a:t>
-            </a:r>
-          </a:p>
-          <a:p>
-            <a:pPr>
-              <a:buSzPct val="200000"/>
-              <a:buFont typeface="Gabriola" panose="04040605051002020D02" pitchFamily="82" charset="0"/>
-              <a:buChar char="›"/>
-            </a:pPr>
-            <a:r>
-              <a:rPr lang="en-US" sz="2800">
-                <a:latin typeface="Gabriola" panose="04040605051002020D02" pitchFamily="82" charset="0"/>
-              </a:rPr>
-              <a:t>HTML, CSS &amp; JavaScript</a:t>
-            </a:r>
-            <a:endParaRPr lang="ro-RO" sz="2800">
-              <a:latin typeface="Gabriola" panose="04040605051002020D02" pitchFamily="82" charset="0"/>
-            </a:endParaRPr>
-          </a:p>
-          <a:p>
-            <a:pPr>
-              <a:buSzPct val="200000"/>
-              <a:buFont typeface="Gabriola" panose="04040605051002020D02" pitchFamily="82" charset="0"/>
-              <a:buChar char="›"/>
-            </a:pPr>
-            <a:r>
-              <a:rPr lang="en-US" sz="2800">
-                <a:latin typeface="Gabriola" panose="04040605051002020D02" pitchFamily="82" charset="0"/>
-              </a:rPr>
-              <a:t>Bootstrap 4</a:t>
-            </a:r>
-          </a:p>
-          <a:p>
-            <a:pPr>
-              <a:buSzPct val="200000"/>
-              <a:buFont typeface="Gabriola" panose="04040605051002020D02" pitchFamily="82" charset="0"/>
-              <a:buChar char="›"/>
-            </a:pPr>
-            <a:r>
-              <a:rPr lang="en-US" sz="2800">
-                <a:latin typeface="Gabriola" panose="04040605051002020D02" pitchFamily="82" charset="0"/>
-              </a:rPr>
-              <a:t>Version control: Github (GUI: SourceTree)</a:t>
+              <a:t>8</a:t>
             </a:r>
           </a:p>
         </p:txBody>
@@ -9084,21 +9295,21 @@
     </p:spTree>
     <p:extLst>
       <p:ext uri="{BB962C8B-B14F-4D97-AF65-F5344CB8AC3E}">
-        <p14:creationId xmlns:p14="http://schemas.microsoft.com/office/powerpoint/2010/main" val="2594655161"/>
+        <p14:creationId xmlns:p14="http://schemas.microsoft.com/office/powerpoint/2010/main" val="2947156239"/>
       </p:ext>
     </p:extLst>
   </p:cSld>
   <p:clrMapOvr>
     <a:masterClrMapping/>
   </p:clrMapOvr>
-  <mc:AlternateContent xmlns:mc="http://schemas.openxmlformats.org/markup-compatibility/2006" xmlns:p15="http://schemas.microsoft.com/office/powerpoint/2012/main">
-    <mc:Choice Requires="p15">
-      <p:transition xmlns:p14="http://schemas.microsoft.com/office/powerpoint/2010/main" spd="slow" p14:dur="1250">
+  <mc:AlternateContent xmlns:mc="http://schemas.openxmlformats.org/markup-compatibility/2006">
+    <mc:Choice xmlns:p15="http://schemas.microsoft.com/office/powerpoint/2012/main" Requires="p15">
+      <p:transition>
         <p15:prstTrans prst="pageCurlDouble"/>
       </p:transition>
     </mc:Choice>
-    <mc:Fallback xmlns="">
-      <p:transition spd="slow">
+    <mc:Fallback>
+      <p:transition>
         <p:fade/>
       </p:transition>
     </mc:Fallback>

</xml_diff>